<commit_message>
Überarbeitung Powerpoint und Bilder eingefügt
</commit_message>
<xml_diff>
--- a/Endvortrag.pptx
+++ b/Endvortrag.pptx
@@ -5,7 +5,7 @@
     <p:sldMasterId id="2147483648" r:id="rId1"/>
   </p:sldMasterIdLst>
   <p:notesMasterIdLst>
-    <p:notesMasterId r:id="rId12"/>
+    <p:notesMasterId r:id="rId14"/>
   </p:notesMasterIdLst>
   <p:sldIdLst>
     <p:sldId id="258" r:id="rId2"/>
@@ -15,9 +15,11 @@
     <p:sldId id="266" r:id="rId6"/>
     <p:sldId id="269" r:id="rId7"/>
     <p:sldId id="270" r:id="rId8"/>
-    <p:sldId id="271" r:id="rId9"/>
-    <p:sldId id="261" r:id="rId10"/>
-    <p:sldId id="265" r:id="rId11"/>
+    <p:sldId id="273" r:id="rId9"/>
+    <p:sldId id="271" r:id="rId10"/>
+    <p:sldId id="261" r:id="rId11"/>
+    <p:sldId id="265" r:id="rId12"/>
+    <p:sldId id="272" r:id="rId13"/>
   </p:sldIdLst>
   <p:sldSz cx="12192000" cy="6858000"/>
   <p:notesSz cx="6858000" cy="9144000"/>
@@ -138,6 +140,18 @@
 </p:presentation>
 </file>
 
+<file path=ppt/commentAuthors.xml><?xml version="1.0" encoding="utf-8"?>
+<p:cmAuthorLst xmlns:a="http://schemas.openxmlformats.org/drawingml/2006/main" xmlns:r="http://schemas.openxmlformats.org/officeDocument/2006/relationships" xmlns:p="http://schemas.openxmlformats.org/presentationml/2006/main">
+  <p:cmAuthor id="1" name="Gregor Erdmann" initials="GE" lastIdx="1" clrIdx="0">
+    <p:extLst>
+      <p:ext uri="{19B8F6BF-5375-455C-9EA6-DF929625EA0E}">
+        <p15:presenceInfo xmlns:p15="http://schemas.microsoft.com/office/powerpoint/2012/main" userId="3597758c54440d8b" providerId="Windows Live"/>
+      </p:ext>
+    </p:extLst>
+  </p:cmAuthor>
+</p:cmAuthorLst>
+</file>
+
 <file path=ppt/notesMasters/notesMaster1.xml><?xml version="1.0" encoding="utf-8"?>
 <p:notesMaster xmlns:a="http://schemas.openxmlformats.org/drawingml/2006/main" xmlns:r="http://schemas.openxmlformats.org/officeDocument/2006/relationships" xmlns:p="http://schemas.openxmlformats.org/presentationml/2006/main">
   <p:cSld>
@@ -220,7 +234,7 @@
           <a:p>
             <a:fld id="{827C43CF-120A-484B-B881-0ADA2055594B}" type="datetimeFigureOut">
               <a:rPr lang="de-DE" smtClean="0"/>
-              <a:t>22.06.2023</a:t>
+              <a:t>23.06.2023</a:t>
             </a:fld>
             <a:endParaRPr lang="de-DE"/>
           </a:p>
@@ -4619,6 +4633,318 @@
       </p:grpSpPr>
       <p:sp>
         <p:nvSpPr>
+          <p:cNvPr id="3" name="Titel 2">
+            <a:extLst>
+              <a:ext uri="{FF2B5EF4-FFF2-40B4-BE49-F238E27FC236}">
+                <a16:creationId xmlns:a16="http://schemas.microsoft.com/office/drawing/2014/main" id="{41D17C19-0B97-4976-BF14-DCC052365CE5}"/>
+              </a:ext>
+            </a:extLst>
+          </p:cNvPr>
+          <p:cNvSpPr>
+            <a:spLocks noGrp="1"/>
+          </p:cNvSpPr>
+          <p:nvPr>
+            <p:ph type="title"/>
+          </p:nvPr>
+        </p:nvSpPr>
+        <p:spPr/>
+        <p:txBody>
+          <a:bodyPr/>
+          <a:lstStyle/>
+          <a:p>
+            <a:r>
+              <a:rPr lang="de-DE" dirty="0"/>
+              <a:t>3. Aktueller Arbeitsstand</a:t>
+            </a:r>
+          </a:p>
+        </p:txBody>
+      </p:sp>
+      <p:pic>
+        <p:nvPicPr>
+          <p:cNvPr id="10" name="Inhaltsplatzhalter 9">
+            <a:extLst>
+              <a:ext uri="{FF2B5EF4-FFF2-40B4-BE49-F238E27FC236}">
+                <a16:creationId xmlns:a16="http://schemas.microsoft.com/office/drawing/2014/main" id="{2F82BF73-288C-1906-C49F-FFCF358F55F5}"/>
+              </a:ext>
+            </a:extLst>
+          </p:cNvPr>
+          <p:cNvPicPr>
+            <a:picLocks noGrp="1" noChangeAspect="1"/>
+          </p:cNvPicPr>
+          <p:nvPr>
+            <p:ph idx="1"/>
+          </p:nvPr>
+        </p:nvPicPr>
+        <p:blipFill>
+          <a:blip r:embed="rId2"/>
+          <a:stretch>
+            <a:fillRect/>
+          </a:stretch>
+        </p:blipFill>
+        <p:spPr>
+          <a:xfrm>
+            <a:off x="2314665" y="1159389"/>
+            <a:ext cx="1933004" cy="3470275"/>
+          </a:xfrm>
+        </p:spPr>
+      </p:pic>
+      <p:pic>
+        <p:nvPicPr>
+          <p:cNvPr id="8" name="Grafik 7">
+            <a:extLst>
+              <a:ext uri="{FF2B5EF4-FFF2-40B4-BE49-F238E27FC236}">
+                <a16:creationId xmlns:a16="http://schemas.microsoft.com/office/drawing/2014/main" id="{FD19025E-6EAA-4275-3380-069017AC2BF2}"/>
+              </a:ext>
+            </a:extLst>
+          </p:cNvPr>
+          <p:cNvPicPr>
+            <a:picLocks noChangeAspect="1"/>
+          </p:cNvPicPr>
+          <p:nvPr/>
+        </p:nvPicPr>
+        <p:blipFill>
+          <a:blip r:embed="rId3"/>
+          <a:stretch>
+            <a:fillRect/>
+          </a:stretch>
+        </p:blipFill>
+        <p:spPr>
+          <a:xfrm>
+            <a:off x="527434" y="1159389"/>
+            <a:ext cx="1787231" cy="3469945"/>
+          </a:xfrm>
+          <a:prstGeom prst="rect">
+            <a:avLst/>
+          </a:prstGeom>
+        </p:spPr>
+      </p:pic>
+      <p:sp>
+        <p:nvSpPr>
+          <p:cNvPr id="11" name="Textfeld 10">
+            <a:extLst>
+              <a:ext uri="{FF2B5EF4-FFF2-40B4-BE49-F238E27FC236}">
+                <a16:creationId xmlns:a16="http://schemas.microsoft.com/office/drawing/2014/main" id="{1D28E38E-8ECF-1EC8-E277-796F781DA73C}"/>
+              </a:ext>
+            </a:extLst>
+          </p:cNvPr>
+          <p:cNvSpPr txBox="1"/>
+          <p:nvPr/>
+        </p:nvSpPr>
+        <p:spPr>
+          <a:xfrm>
+            <a:off x="527434" y="4667994"/>
+            <a:ext cx="4538995" cy="954107"/>
+          </a:xfrm>
+          <a:prstGeom prst="rect">
+            <a:avLst/>
+          </a:prstGeom>
+          <a:noFill/>
+        </p:spPr>
+        <p:txBody>
+          <a:bodyPr wrap="square" rtlCol="0">
+            <a:spAutoFit/>
+          </a:bodyPr>
+          <a:lstStyle/>
+          <a:p>
+            <a:r>
+              <a:rPr lang="de-DE" sz="1400" dirty="0">
+                <a:latin typeface="Open Sans" pitchFamily="2" charset="0"/>
+                <a:ea typeface="Open Sans" pitchFamily="2" charset="0"/>
+                <a:cs typeface="Open Sans" pitchFamily="2" charset="0"/>
+              </a:rPr>
+              <a:t>Abb. 2: Änderung Feuerleiter (links original, </a:t>
+            </a:r>
+            <a:br>
+              <a:rPr lang="de-DE" sz="1400" dirty="0">
+                <a:latin typeface="Open Sans" pitchFamily="2" charset="0"/>
+                <a:ea typeface="Open Sans" pitchFamily="2" charset="0"/>
+                <a:cs typeface="Open Sans" pitchFamily="2" charset="0"/>
+              </a:rPr>
+            </a:br>
+            <a:r>
+              <a:rPr lang="de-DE" sz="1400" dirty="0">
+                <a:latin typeface="Open Sans" pitchFamily="2" charset="0"/>
+                <a:ea typeface="Open Sans" pitchFamily="2" charset="0"/>
+                <a:cs typeface="Open Sans" pitchFamily="2" charset="0"/>
+              </a:rPr>
+              <a:t>rechts bearbeitet)</a:t>
+            </a:r>
+          </a:p>
+          <a:p>
+            <a:endParaRPr lang="de-DE" sz="1400" dirty="0">
+              <a:latin typeface="Open Sans" pitchFamily="2" charset="0"/>
+              <a:ea typeface="Open Sans" pitchFamily="2" charset="0"/>
+              <a:cs typeface="Open Sans" pitchFamily="2" charset="0"/>
+            </a:endParaRPr>
+          </a:p>
+          <a:p>
+            <a:r>
+              <a:rPr lang="de-DE" sz="1400" dirty="0">
+                <a:solidFill>
+                  <a:srgbClr val="FF0000"/>
+                </a:solidFill>
+                <a:latin typeface="Open Sans" pitchFamily="2" charset="0"/>
+                <a:ea typeface="Open Sans" pitchFamily="2" charset="0"/>
+                <a:cs typeface="Open Sans" pitchFamily="2" charset="0"/>
+              </a:rPr>
+              <a:t>Bilder in Folien mit </a:t>
+            </a:r>
+            <a:r>
+              <a:rPr lang="de-DE" sz="1400" dirty="0" err="1">
+                <a:solidFill>
+                  <a:srgbClr val="FF0000"/>
+                </a:solidFill>
+                <a:latin typeface="Open Sans" pitchFamily="2" charset="0"/>
+                <a:ea typeface="Open Sans" pitchFamily="2" charset="0"/>
+                <a:cs typeface="Open Sans" pitchFamily="2" charset="0"/>
+              </a:rPr>
+              <a:t>text</a:t>
+            </a:r>
+            <a:r>
+              <a:rPr lang="de-DE" sz="1400" dirty="0">
+                <a:solidFill>
+                  <a:srgbClr val="FF0000"/>
+                </a:solidFill>
+                <a:latin typeface="Open Sans" pitchFamily="2" charset="0"/>
+                <a:ea typeface="Open Sans" pitchFamily="2" charset="0"/>
+                <a:cs typeface="Open Sans" pitchFamily="2" charset="0"/>
+              </a:rPr>
+              <a:t> einarbeiten</a:t>
+            </a:r>
+          </a:p>
+        </p:txBody>
+      </p:sp>
+      <p:pic>
+        <p:nvPicPr>
+          <p:cNvPr id="13" name="Grafik 12">
+            <a:extLst>
+              <a:ext uri="{FF2B5EF4-FFF2-40B4-BE49-F238E27FC236}">
+                <a16:creationId xmlns:a16="http://schemas.microsoft.com/office/drawing/2014/main" id="{CC347108-6754-F1A8-2CB6-D37BD94D22E8}"/>
+              </a:ext>
+            </a:extLst>
+          </p:cNvPr>
+          <p:cNvPicPr>
+            <a:picLocks noChangeAspect="1"/>
+          </p:cNvPicPr>
+          <p:nvPr/>
+        </p:nvPicPr>
+        <p:blipFill>
+          <a:blip r:embed="rId4"/>
+          <a:stretch>
+            <a:fillRect/>
+          </a:stretch>
+        </p:blipFill>
+        <p:spPr>
+          <a:xfrm>
+            <a:off x="6096000" y="1159388"/>
+            <a:ext cx="2759790" cy="3469945"/>
+          </a:xfrm>
+          <a:prstGeom prst="rect">
+            <a:avLst/>
+          </a:prstGeom>
+        </p:spPr>
+      </p:pic>
+      <p:pic>
+        <p:nvPicPr>
+          <p:cNvPr id="15" name="Grafik 14">
+            <a:extLst>
+              <a:ext uri="{FF2B5EF4-FFF2-40B4-BE49-F238E27FC236}">
+                <a16:creationId xmlns:a16="http://schemas.microsoft.com/office/drawing/2014/main" id="{980A97F8-154D-7988-9264-5DB38582AAB0}"/>
+              </a:ext>
+            </a:extLst>
+          </p:cNvPr>
+          <p:cNvPicPr>
+            <a:picLocks noChangeAspect="1"/>
+          </p:cNvPicPr>
+          <p:nvPr/>
+        </p:nvPicPr>
+        <p:blipFill>
+          <a:blip r:embed="rId5"/>
+          <a:stretch>
+            <a:fillRect/>
+          </a:stretch>
+        </p:blipFill>
+        <p:spPr>
+          <a:xfrm>
+            <a:off x="8861491" y="1159389"/>
+            <a:ext cx="2916849" cy="3469944"/>
+          </a:xfrm>
+          <a:prstGeom prst="rect">
+            <a:avLst/>
+          </a:prstGeom>
+        </p:spPr>
+      </p:pic>
+      <p:sp>
+        <p:nvSpPr>
+          <p:cNvPr id="16" name="Textfeld 15">
+            <a:extLst>
+              <a:ext uri="{FF2B5EF4-FFF2-40B4-BE49-F238E27FC236}">
+                <a16:creationId xmlns:a16="http://schemas.microsoft.com/office/drawing/2014/main" id="{B79298AC-4E80-9ADF-BC11-5EF0BAD22014}"/>
+              </a:ext>
+            </a:extLst>
+          </p:cNvPr>
+          <p:cNvSpPr txBox="1"/>
+          <p:nvPr/>
+        </p:nvSpPr>
+        <p:spPr>
+          <a:xfrm>
+            <a:off x="6096000" y="4677166"/>
+            <a:ext cx="5682340" cy="307777"/>
+          </a:xfrm>
+          <a:prstGeom prst="rect">
+            <a:avLst/>
+          </a:prstGeom>
+          <a:noFill/>
+        </p:spPr>
+        <p:txBody>
+          <a:bodyPr wrap="square" rtlCol="0">
+            <a:spAutoFit/>
+          </a:bodyPr>
+          <a:lstStyle/>
+          <a:p>
+            <a:r>
+              <a:rPr lang="de-DE" sz="1400" dirty="0">
+                <a:latin typeface="Open Sans" pitchFamily="2" charset="0"/>
+                <a:ea typeface="Open Sans" pitchFamily="2" charset="0"/>
+                <a:cs typeface="Open Sans" pitchFamily="2" charset="0"/>
+              </a:rPr>
+              <a:t>Abb. 3: Darstellung Fenster (links Revit, rechts AutoCAD)</a:t>
+            </a:r>
+          </a:p>
+        </p:txBody>
+      </p:sp>
+    </p:spTree>
+    <p:extLst>
+      <p:ext uri="{BB962C8B-B14F-4D97-AF65-F5344CB8AC3E}">
+        <p14:creationId xmlns:p14="http://schemas.microsoft.com/office/powerpoint/2010/main" val="130291041"/>
+      </p:ext>
+    </p:extLst>
+  </p:cSld>
+  <p:clrMapOvr>
+    <a:masterClrMapping/>
+  </p:clrMapOvr>
+</p:sld>
+</file>
+
+<file path=ppt/slides/slide11.xml><?xml version="1.0" encoding="utf-8"?>
+<p:sld xmlns:a="http://schemas.openxmlformats.org/drawingml/2006/main" xmlns:r="http://schemas.openxmlformats.org/officeDocument/2006/relationships" xmlns:p="http://schemas.openxmlformats.org/presentationml/2006/main">
+  <p:cSld>
+    <p:spTree>
+      <p:nvGrpSpPr>
+        <p:cNvPr id="1" name=""/>
+        <p:cNvGrpSpPr/>
+        <p:nvPr/>
+      </p:nvGrpSpPr>
+      <p:grpSpPr>
+        <a:xfrm>
+          <a:off x="0" y="0"/>
+          <a:ext cx="0" cy="0"/>
+          <a:chOff x="0" y="0"/>
+          <a:chExt cx="0" cy="0"/>
+        </a:xfrm>
+      </p:grpSpPr>
+      <p:sp>
+        <p:nvSpPr>
           <p:cNvPr id="2" name="Inhaltsplatzhalter 1">
             <a:extLst>
               <a:ext uri="{FF2B5EF4-FFF2-40B4-BE49-F238E27FC236}">
@@ -4730,6 +5056,22 @@
             <a:r>
               <a:rPr lang="de-DE" dirty="0"/>
               <a:t>danach Entpacken und Reinigen der Bauteile</a:t>
+            </a:r>
+          </a:p>
+          <a:p>
+            <a:endParaRPr lang="de-DE" dirty="0"/>
+          </a:p>
+          <a:p>
+            <a:pPr marL="0" indent="0">
+              <a:buNone/>
+            </a:pPr>
+            <a:r>
+              <a:rPr lang="de-DE" dirty="0">
+                <a:solidFill>
+                  <a:srgbClr val="FF0000"/>
+                </a:solidFill>
+              </a:rPr>
+              <a:t>Folie rausschmeißen?</a:t>
             </a:r>
           </a:p>
         </p:txBody>
@@ -4766,6 +5108,419 @@
     <p:extLst>
       <p:ext uri="{BB962C8B-B14F-4D97-AF65-F5344CB8AC3E}">
         <p14:creationId xmlns:p14="http://schemas.microsoft.com/office/powerpoint/2010/main" val="2177359727"/>
+      </p:ext>
+    </p:extLst>
+  </p:cSld>
+  <p:clrMapOvr>
+    <a:masterClrMapping/>
+  </p:clrMapOvr>
+</p:sld>
+</file>
+
+<file path=ppt/slides/slide12.xml><?xml version="1.0" encoding="utf-8"?>
+<p:sld xmlns:a="http://schemas.openxmlformats.org/drawingml/2006/main" xmlns:r="http://schemas.openxmlformats.org/officeDocument/2006/relationships" xmlns:p="http://schemas.openxmlformats.org/presentationml/2006/main">
+  <p:cSld>
+    <p:spTree>
+      <p:nvGrpSpPr>
+        <p:cNvPr id="1" name=""/>
+        <p:cNvGrpSpPr/>
+        <p:nvPr/>
+      </p:nvGrpSpPr>
+      <p:grpSpPr>
+        <a:xfrm>
+          <a:off x="0" y="0"/>
+          <a:ext cx="0" cy="0"/>
+          <a:chOff x="0" y="0"/>
+          <a:chExt cx="0" cy="0"/>
+        </a:xfrm>
+      </p:grpSpPr>
+      <p:sp>
+        <p:nvSpPr>
+          <p:cNvPr id="2" name="Inhaltsplatzhalter 1">
+            <a:extLst>
+              <a:ext uri="{FF2B5EF4-FFF2-40B4-BE49-F238E27FC236}">
+                <a16:creationId xmlns:a16="http://schemas.microsoft.com/office/drawing/2014/main" id="{FFC0B4D5-909B-43B4-B2D9-D1960C962473}"/>
+              </a:ext>
+            </a:extLst>
+          </p:cNvPr>
+          <p:cNvSpPr>
+            <a:spLocks noGrp="1"/>
+          </p:cNvSpPr>
+          <p:nvPr>
+            <p:ph idx="1"/>
+          </p:nvPr>
+        </p:nvSpPr>
+        <p:spPr/>
+        <p:txBody>
+          <a:bodyPr/>
+          <a:lstStyle/>
+          <a:p>
+            <a:r>
+              <a:rPr lang="de-DE" dirty="0">
+                <a:solidFill>
+                  <a:srgbClr val="FF0000"/>
+                </a:solidFill>
+              </a:rPr>
+              <a:t>Fehler bei Verteilung des Materials</a:t>
+            </a:r>
+          </a:p>
+          <a:p>
+            <a:r>
+              <a:rPr lang="de-DE" dirty="0">
+                <a:solidFill>
+                  <a:srgbClr val="FF0000"/>
+                </a:solidFill>
+              </a:rPr>
+              <a:t> Auspacken Bauraum</a:t>
+            </a:r>
+          </a:p>
+          <a:p>
+            <a:r>
+              <a:rPr lang="de-DE" dirty="0">
+                <a:solidFill>
+                  <a:srgbClr val="FF0000"/>
+                </a:solidFill>
+              </a:rPr>
+              <a:t>Einschätzung Qualität Probedruck</a:t>
+            </a:r>
+          </a:p>
+        </p:txBody>
+      </p:sp>
+      <p:sp>
+        <p:nvSpPr>
+          <p:cNvPr id="3" name="Titel 2">
+            <a:extLst>
+              <a:ext uri="{FF2B5EF4-FFF2-40B4-BE49-F238E27FC236}">
+                <a16:creationId xmlns:a16="http://schemas.microsoft.com/office/drawing/2014/main" id="{2F916FFD-816A-458E-A4AB-A32CB6ECF4FA}"/>
+              </a:ext>
+            </a:extLst>
+          </p:cNvPr>
+          <p:cNvSpPr>
+            <a:spLocks noGrp="1"/>
+          </p:cNvSpPr>
+          <p:nvPr>
+            <p:ph type="title"/>
+          </p:nvPr>
+        </p:nvSpPr>
+        <p:spPr/>
+        <p:txBody>
+          <a:bodyPr/>
+          <a:lstStyle/>
+          <a:p>
+            <a:r>
+              <a:rPr lang="de-DE" dirty="0"/>
+              <a:t>4.1 Druckprozess - Probedruck</a:t>
+            </a:r>
+          </a:p>
+        </p:txBody>
+      </p:sp>
+      <p:grpSp>
+        <p:nvGrpSpPr>
+          <p:cNvPr id="9" name="Gruppieren 8">
+            <a:extLst>
+              <a:ext uri="{FF2B5EF4-FFF2-40B4-BE49-F238E27FC236}">
+                <a16:creationId xmlns:a16="http://schemas.microsoft.com/office/drawing/2014/main" id="{6045C1FE-352C-7C2F-B9CD-BDAA1F7E70AB}"/>
+              </a:ext>
+            </a:extLst>
+          </p:cNvPr>
+          <p:cNvGrpSpPr/>
+          <p:nvPr/>
+        </p:nvGrpSpPr>
+        <p:grpSpPr>
+          <a:xfrm>
+            <a:off x="5181235" y="1243197"/>
+            <a:ext cx="6203980" cy="4069286"/>
+            <a:chOff x="8033077" y="794454"/>
+            <a:chExt cx="6203980" cy="4069286"/>
+          </a:xfrm>
+        </p:grpSpPr>
+        <p:grpSp>
+          <p:nvGrpSpPr>
+            <p:cNvPr id="4" name="Gruppieren 3">
+              <a:extLst>
+                <a:ext uri="{FF2B5EF4-FFF2-40B4-BE49-F238E27FC236}">
+                  <a16:creationId xmlns:a16="http://schemas.microsoft.com/office/drawing/2014/main" id="{591CE8B6-7721-02AC-D69B-49AE1634E415}"/>
+                </a:ext>
+              </a:extLst>
+            </p:cNvPr>
+            <p:cNvGrpSpPr/>
+            <p:nvPr/>
+          </p:nvGrpSpPr>
+          <p:grpSpPr>
+            <a:xfrm>
+              <a:off x="8033077" y="794454"/>
+              <a:ext cx="6203980" cy="4069286"/>
+              <a:chOff x="6807431" y="2999851"/>
+              <a:chExt cx="4538995" cy="2977197"/>
+            </a:xfrm>
+          </p:grpSpPr>
+          <p:sp>
+            <p:nvSpPr>
+              <p:cNvPr id="5" name="Textfeld 4">
+                <a:extLst>
+                  <a:ext uri="{FF2B5EF4-FFF2-40B4-BE49-F238E27FC236}">
+                    <a16:creationId xmlns:a16="http://schemas.microsoft.com/office/drawing/2014/main" id="{6B92C27C-39E9-BE94-71E1-E9571547C89B}"/>
+                  </a:ext>
+                </a:extLst>
+              </p:cNvPr>
+              <p:cNvSpPr txBox="1"/>
+              <p:nvPr/>
+            </p:nvSpPr>
+            <p:spPr>
+              <a:xfrm>
+                <a:off x="6807431" y="5751870"/>
+                <a:ext cx="4538995" cy="225178"/>
+              </a:xfrm>
+              <a:prstGeom prst="rect">
+                <a:avLst/>
+              </a:prstGeom>
+              <a:noFill/>
+            </p:spPr>
+            <p:txBody>
+              <a:bodyPr wrap="square" rtlCol="0">
+                <a:spAutoFit/>
+              </a:bodyPr>
+              <a:lstStyle/>
+              <a:p>
+                <a:r>
+                  <a:rPr lang="de-DE" sz="1400" dirty="0">
+                    <a:latin typeface="Open Sans" pitchFamily="2" charset="0"/>
+                    <a:ea typeface="Open Sans" pitchFamily="2" charset="0"/>
+                    <a:cs typeface="Open Sans" pitchFamily="2" charset="0"/>
+                  </a:rPr>
+                  <a:t>Abb. </a:t>
+                </a:r>
+                <a:r>
+                  <a:rPr lang="de-DE" sz="1400" dirty="0">
+                    <a:solidFill>
+                      <a:srgbClr val="FF0000"/>
+                    </a:solidFill>
+                    <a:latin typeface="Open Sans" pitchFamily="2" charset="0"/>
+                    <a:ea typeface="Open Sans" pitchFamily="2" charset="0"/>
+                    <a:cs typeface="Open Sans" pitchFamily="2" charset="0"/>
+                  </a:rPr>
+                  <a:t>XX</a:t>
+                </a:r>
+                <a:r>
+                  <a:rPr lang="de-DE" sz="1400" dirty="0">
+                    <a:latin typeface="Open Sans" pitchFamily="2" charset="0"/>
+                    <a:ea typeface="Open Sans" pitchFamily="2" charset="0"/>
+                    <a:cs typeface="Open Sans" pitchFamily="2" charset="0"/>
+                  </a:rPr>
+                  <a:t>: Fehler bei Materialverteilung</a:t>
+                </a:r>
+              </a:p>
+            </p:txBody>
+          </p:sp>
+          <p:pic>
+            <p:nvPicPr>
+              <p:cNvPr id="6" name="Grafik 5">
+                <a:extLst>
+                  <a:ext uri="{FF2B5EF4-FFF2-40B4-BE49-F238E27FC236}">
+                    <a16:creationId xmlns:a16="http://schemas.microsoft.com/office/drawing/2014/main" id="{857FC714-A27E-4CCC-C164-C1FA8B5DF30C}"/>
+                  </a:ext>
+                </a:extLst>
+              </p:cNvPr>
+              <p:cNvPicPr>
+                <a:picLocks noChangeAspect="1"/>
+              </p:cNvPicPr>
+              <p:nvPr/>
+            </p:nvPicPr>
+            <p:blipFill>
+              <a:blip r:embed="rId2" cstate="print">
+                <a:extLst>
+                  <a:ext uri="{28A0092B-C50C-407E-A947-70E740481C1C}">
+                    <a14:useLocalDpi xmlns:a14="http://schemas.microsoft.com/office/drawing/2010/main" val="0"/>
+                  </a:ext>
+                </a:extLst>
+              </a:blip>
+              <a:srcRect/>
+              <a:stretch/>
+            </p:blipFill>
+            <p:spPr>
+              <a:xfrm rot="5400000">
+                <a:off x="6569960" y="3343853"/>
+                <a:ext cx="2752020" cy="2064015"/>
+              </a:xfrm>
+              <a:prstGeom prst="rect">
+                <a:avLst/>
+              </a:prstGeom>
+            </p:spPr>
+          </p:pic>
+        </p:grpSp>
+        <p:sp>
+          <p:nvSpPr>
+            <p:cNvPr id="8" name="Ellipse 7">
+              <a:extLst>
+                <a:ext uri="{FF2B5EF4-FFF2-40B4-BE49-F238E27FC236}">
+                  <a16:creationId xmlns:a16="http://schemas.microsoft.com/office/drawing/2014/main" id="{E44D2B6C-B0F6-5E19-28C3-65E23D86AC44}"/>
+                </a:ext>
+              </a:extLst>
+            </p:cNvPr>
+            <p:cNvSpPr/>
+            <p:nvPr/>
+          </p:nvSpPr>
+          <p:spPr>
+            <a:xfrm>
+              <a:off x="9384007" y="2900456"/>
+              <a:ext cx="591809" cy="591809"/>
+            </a:xfrm>
+            <a:prstGeom prst="ellipse">
+              <a:avLst/>
+            </a:prstGeom>
+            <a:noFill/>
+            <a:ln w="9525" cap="flat" cmpd="sng" algn="ctr">
+              <a:solidFill>
+                <a:schemeClr val="accent1"/>
+              </a:solidFill>
+              <a:prstDash val="solid"/>
+              <a:round/>
+              <a:headEnd type="none" w="med" len="med"/>
+              <a:tailEnd type="none" w="med" len="med"/>
+            </a:ln>
+          </p:spPr>
+          <p:style>
+            <a:lnRef idx="0">
+              <a:scrgbClr r="0" g="0" b="0"/>
+            </a:lnRef>
+            <a:fillRef idx="0">
+              <a:scrgbClr r="0" g="0" b="0"/>
+            </a:fillRef>
+            <a:effectRef idx="0">
+              <a:scrgbClr r="0" g="0" b="0"/>
+            </a:effectRef>
+            <a:fontRef idx="minor">
+              <a:schemeClr val="accent1"/>
+            </a:fontRef>
+          </p:style>
+          <p:txBody>
+            <a:bodyPr rtlCol="0" anchor="ctr"/>
+            <a:lstStyle/>
+            <a:p>
+              <a:pPr algn="ctr"/>
+              <a:endParaRPr lang="de-DE"/>
+            </a:p>
+          </p:txBody>
+        </p:sp>
+      </p:grpSp>
+      <p:grpSp>
+        <p:nvGrpSpPr>
+          <p:cNvPr id="11" name="Gruppieren 10">
+            <a:extLst>
+              <a:ext uri="{FF2B5EF4-FFF2-40B4-BE49-F238E27FC236}">
+                <a16:creationId xmlns:a16="http://schemas.microsoft.com/office/drawing/2014/main" id="{48522FC5-1395-BC1C-CDF2-6574D9E1A69B}"/>
+              </a:ext>
+            </a:extLst>
+          </p:cNvPr>
+          <p:cNvGrpSpPr/>
+          <p:nvPr/>
+        </p:nvGrpSpPr>
+        <p:grpSpPr>
+          <a:xfrm>
+            <a:off x="8524947" y="1243198"/>
+            <a:ext cx="6203980" cy="4069285"/>
+            <a:chOff x="6807431" y="2999851"/>
+            <a:chExt cx="4538995" cy="2977197"/>
+          </a:xfrm>
+        </p:grpSpPr>
+        <p:sp>
+          <p:nvSpPr>
+            <p:cNvPr id="13" name="Textfeld 12">
+              <a:extLst>
+                <a:ext uri="{FF2B5EF4-FFF2-40B4-BE49-F238E27FC236}">
+                  <a16:creationId xmlns:a16="http://schemas.microsoft.com/office/drawing/2014/main" id="{2480BC14-736B-5D45-BC4E-29B3518CF911}"/>
+                </a:ext>
+              </a:extLst>
+            </p:cNvPr>
+            <p:cNvSpPr txBox="1"/>
+            <p:nvPr/>
+          </p:nvSpPr>
+          <p:spPr>
+            <a:xfrm>
+              <a:off x="6807431" y="5751870"/>
+              <a:ext cx="4538995" cy="225178"/>
+            </a:xfrm>
+            <a:prstGeom prst="rect">
+              <a:avLst/>
+            </a:prstGeom>
+            <a:noFill/>
+          </p:spPr>
+          <p:txBody>
+            <a:bodyPr wrap="square" rtlCol="0">
+              <a:spAutoFit/>
+            </a:bodyPr>
+            <a:lstStyle/>
+            <a:p>
+              <a:r>
+                <a:rPr lang="de-DE" sz="1400" dirty="0">
+                  <a:latin typeface="Open Sans" pitchFamily="2" charset="0"/>
+                  <a:ea typeface="Open Sans" pitchFamily="2" charset="0"/>
+                  <a:cs typeface="Open Sans" pitchFamily="2" charset="0"/>
+                </a:rPr>
+                <a:t>Abb. </a:t>
+              </a:r>
+              <a:r>
+                <a:rPr lang="de-DE" sz="1400" dirty="0">
+                  <a:solidFill>
+                    <a:srgbClr val="FF0000"/>
+                  </a:solidFill>
+                  <a:latin typeface="Open Sans" pitchFamily="2" charset="0"/>
+                  <a:ea typeface="Open Sans" pitchFamily="2" charset="0"/>
+                  <a:cs typeface="Open Sans" pitchFamily="2" charset="0"/>
+                </a:rPr>
+                <a:t>XX</a:t>
+              </a:r>
+              <a:r>
+                <a:rPr lang="de-DE" sz="1400" dirty="0">
+                  <a:latin typeface="Open Sans" pitchFamily="2" charset="0"/>
+                  <a:ea typeface="Open Sans" pitchFamily="2" charset="0"/>
+                  <a:cs typeface="Open Sans" pitchFamily="2" charset="0"/>
+                </a:rPr>
+                <a:t>: Auspacken Probedruck</a:t>
+              </a:r>
+            </a:p>
+          </p:txBody>
+        </p:sp>
+        <p:pic>
+          <p:nvPicPr>
+            <p:cNvPr id="14" name="Grafik 13">
+              <a:extLst>
+                <a:ext uri="{FF2B5EF4-FFF2-40B4-BE49-F238E27FC236}">
+                  <a16:creationId xmlns:a16="http://schemas.microsoft.com/office/drawing/2014/main" id="{FA31DE9F-A28F-C3DA-947E-6DFA1AC07B04}"/>
+                </a:ext>
+              </a:extLst>
+            </p:cNvPr>
+            <p:cNvPicPr>
+              <a:picLocks noChangeAspect="1"/>
+            </p:cNvPicPr>
+            <p:nvPr/>
+          </p:nvPicPr>
+          <p:blipFill>
+            <a:blip r:embed="rId3" cstate="print">
+              <a:extLst>
+                <a:ext uri="{28A0092B-C50C-407E-A947-70E740481C1C}">
+                  <a14:useLocalDpi xmlns:a14="http://schemas.microsoft.com/office/drawing/2010/main" val="0"/>
+                </a:ext>
+              </a:extLst>
+            </a:blip>
+            <a:srcRect/>
+            <a:stretch/>
+          </p:blipFill>
+          <p:spPr>
+            <a:xfrm rot="5400000">
+              <a:off x="6569960" y="3343854"/>
+              <a:ext cx="2752020" cy="2064014"/>
+            </a:xfrm>
+            <a:prstGeom prst="rect">
+              <a:avLst/>
+            </a:prstGeom>
+          </p:spPr>
+        </p:pic>
+      </p:grpSp>
+    </p:spTree>
+    <p:extLst>
+      <p:ext uri="{BB962C8B-B14F-4D97-AF65-F5344CB8AC3E}">
+        <p14:creationId xmlns:p14="http://schemas.microsoft.com/office/powerpoint/2010/main" val="2285473230"/>
       </p:ext>
     </p:extLst>
   </p:cSld>
@@ -4838,7 +5593,15 @@
             </a:pPr>
             <a:r>
               <a:rPr lang="de-DE" sz="2400" dirty="0"/>
-              <a:t>Modellbereinigung</a:t>
+              <a:t>Modellbereinigung </a:t>
+            </a:r>
+            <a:r>
+              <a:rPr lang="de-DE" sz="2400" dirty="0">
+                <a:solidFill>
+                  <a:srgbClr val="FF0000"/>
+                </a:solidFill>
+              </a:rPr>
+              <a:t>und Bearbeitung</a:t>
             </a:r>
           </a:p>
           <a:p>
@@ -4900,6 +5663,16 @@
             <a:r>
               <a:rPr lang="de-DE" sz="2400" dirty="0"/>
               <a:t>Druckprozess</a:t>
+            </a:r>
+          </a:p>
+          <a:p>
+            <a:pPr marL="800100" lvl="1" indent="-342900">
+              <a:buFont typeface="+mj-lt"/>
+              <a:buAutoNum type="arabicPeriod"/>
+            </a:pPr>
+            <a:r>
+              <a:rPr lang="de-DE" sz="2400" dirty="0"/>
+              <a:t>Probedruck</a:t>
             </a:r>
           </a:p>
           <a:p>
@@ -5026,6 +5799,31 @@
               <a:rPr lang="de-DE" dirty="0"/>
               <a:t>Software: </a:t>
             </a:r>
+            <a:r>
+              <a:rPr lang="de-DE" dirty="0">
+                <a:solidFill>
+                  <a:srgbClr val="FF0000"/>
+                </a:solidFill>
+              </a:rPr>
+              <a:t>Software erst nach den </a:t>
+            </a:r>
+            <a:r>
+              <a:rPr lang="de-DE" dirty="0" err="1">
+                <a:solidFill>
+                  <a:srgbClr val="FF0000"/>
+                </a:solidFill>
+              </a:rPr>
+              <a:t>Forshcungsfragen</a:t>
+            </a:r>
+            <a:r>
+              <a:rPr lang="de-DE" dirty="0">
+                <a:solidFill>
+                  <a:srgbClr val="FF0000"/>
+                </a:solidFill>
+              </a:rPr>
+              <a:t> vorstellen?</a:t>
+            </a:r>
+            <a:endParaRPr lang="de-DE" dirty="0"/>
           </a:p>
           <a:p>
             <a:pPr lvl="1"/>
@@ -5047,6 +5845,17 @@
             <a:r>
               <a:rPr lang="de-DE" dirty="0"/>
               <a:t>Autodesk AutoCAD 2023</a:t>
+            </a:r>
+          </a:p>
+          <a:p>
+            <a:pPr lvl="1"/>
+            <a:r>
+              <a:rPr lang="de-DE" dirty="0">
+                <a:solidFill>
+                  <a:srgbClr val="FF0000"/>
+                </a:solidFill>
+              </a:rPr>
+              <a:t>Autodesk AutoCAD Architecture 2023?</a:t>
             </a:r>
           </a:p>
           <a:p>
@@ -5598,7 +6407,20 @@
               </a:rPr>
               <a:t>Zugriff auf aktuellen Stand für alle gewährleistet</a:t>
             </a:r>
-            <a:endParaRPr lang="de-DE" dirty="0"/>
+          </a:p>
+          <a:p>
+            <a:pPr marL="0" indent="0">
+              <a:buNone/>
+            </a:pPr>
+            <a:r>
+              <a:rPr lang="de-DE" dirty="0">
+                <a:solidFill>
+                  <a:srgbClr val="FF0000"/>
+                </a:solidFill>
+                <a:sym typeface="Wingdings" panose="05000000000000000000" pitchFamily="2" charset="2"/>
+              </a:rPr>
+              <a:t>Folie komplett rauschmeißen?</a:t>
+            </a:r>
           </a:p>
         </p:txBody>
       </p:sp>
@@ -5677,15 +6499,7 @@
             <a:pPr lvl="1"/>
             <a:r>
               <a:rPr lang="de-DE" dirty="0"/>
-              <a:t>Dicken der </a:t>
-            </a:r>
-            <a:r>
-              <a:rPr lang="de-DE" dirty="0" err="1"/>
-              <a:t>Fassadenelemtepfosten</a:t>
-            </a:r>
-            <a:r>
-              <a:rPr lang="de-DE" dirty="0"/>
-              <a:t> [Typ bearbeiten]</a:t>
+              <a:t>Dicken der Fassadenelemente Pfosten [Typ bearbeiten]</a:t>
             </a:r>
           </a:p>
           <a:p>
@@ -5758,7 +6572,14 @@
           <a:bodyPr/>
           <a:lstStyle/>
           <a:p>
-            <a:endParaRPr lang="de-DE"/>
+            <a:r>
+              <a:rPr lang="de-DE" dirty="0">
+                <a:solidFill>
+                  <a:srgbClr val="FF0000"/>
+                </a:solidFill>
+              </a:rPr>
+              <a:t>3.1 Bearbeitung in Revit</a:t>
+            </a:r>
           </a:p>
         </p:txBody>
       </p:sp>
@@ -5836,19 +6657,39 @@
             <a:pPr lvl="1"/>
             <a:r>
               <a:rPr lang="de-DE" dirty="0"/>
-              <a:t>Export der </a:t>
-            </a:r>
-            <a:r>
-              <a:rPr lang="de-DE" dirty="0" err="1"/>
-              <a:t>Viellächennetze</a:t>
-            </a:r>
-            <a:r>
-              <a:rPr lang="de-DE" dirty="0"/>
-              <a:t> als .</a:t>
+              <a:t>Export der Vielflächennetze als .</a:t>
             </a:r>
             <a:r>
               <a:rPr lang="de-DE" dirty="0" err="1"/>
               <a:t>dxf</a:t>
+            </a:r>
+            <a:r>
+              <a:rPr lang="de-DE" dirty="0"/>
+              <a:t> </a:t>
+            </a:r>
+            <a:r>
+              <a:rPr lang="de-DE" dirty="0" err="1">
+                <a:solidFill>
+                  <a:srgbClr val="FF0000"/>
+                </a:solidFill>
+              </a:rPr>
+              <a:t>dxf</a:t>
+            </a:r>
+            <a:r>
+              <a:rPr lang="de-DE" dirty="0">
+                <a:solidFill>
+                  <a:srgbClr val="FF0000"/>
+                </a:solidFill>
+              </a:rPr>
+              <a:t>? Nicht </a:t>
+            </a:r>
+            <a:r>
+              <a:rPr lang="de-DE" dirty="0" err="1">
+                <a:solidFill>
+                  <a:srgbClr val="FF0000"/>
+                </a:solidFill>
+              </a:rPr>
+              <a:t>dwg</a:t>
             </a:r>
             <a:endParaRPr lang="de-DE" dirty="0"/>
           </a:p>
@@ -5879,7 +6720,14 @@
           <a:bodyPr/>
           <a:lstStyle/>
           <a:p>
-            <a:endParaRPr lang="de-DE"/>
+            <a:r>
+              <a:rPr lang="de-DE" dirty="0">
+                <a:solidFill>
+                  <a:srgbClr val="FF0000"/>
+                </a:solidFill>
+              </a:rPr>
+              <a:t>3.2 Bearbeitung in AutoCAD</a:t>
+            </a:r>
           </a:p>
         </p:txBody>
       </p:sp>
@@ -5936,43 +6784,7 @@
           <a:p>
             <a:r>
               <a:rPr lang="de-DE" dirty="0"/>
-              <a:t>In Magics </a:t>
-            </a:r>
-          </a:p>
-          <a:p>
-            <a:pPr lvl="1"/>
-            <a:r>
-              <a:rPr lang="de-DE" dirty="0"/>
-              <a:t>Skalieren [Skalieren]</a:t>
-            </a:r>
-          </a:p>
-          <a:p>
-            <a:pPr lvl="1"/>
-            <a:r>
-              <a:rPr lang="de-DE" dirty="0"/>
-              <a:t>Schnitte [Vielfachschnitte] [Schneiden]</a:t>
-            </a:r>
-          </a:p>
-          <a:p>
-            <a:pPr lvl="1"/>
-            <a:r>
-              <a:rPr lang="de-DE" dirty="0"/>
-              <a:t>Löcher füllen [Lochfüllmodus]</a:t>
-            </a:r>
-          </a:p>
-          <a:p>
-            <a:pPr lvl="1"/>
-            <a:r>
-              <a:rPr lang="de-DE" dirty="0"/>
-              <a:t>Reparaturstatus verändern bis nur noch eine Shell und keine Probleme übrig sind [Schrumpffolie] [verschiedene Auto-</a:t>
-            </a:r>
-            <a:r>
-              <a:rPr lang="de-DE" dirty="0" err="1"/>
-              <a:t>Repair</a:t>
-            </a:r>
-            <a:r>
-              <a:rPr lang="de-DE" dirty="0"/>
-              <a:t>-Tools]</a:t>
+              <a:t>Erster Export nach Magics stark fehlerbehaftet</a:t>
             </a:r>
           </a:p>
         </p:txBody>
@@ -5998,14 +6810,228 @@
           <a:bodyPr/>
           <a:lstStyle/>
           <a:p>
-            <a:endParaRPr lang="de-DE"/>
+            <a:r>
+              <a:rPr lang="de-DE" dirty="0">
+                <a:solidFill>
+                  <a:srgbClr val="FF0000"/>
+                </a:solidFill>
+              </a:rPr>
+              <a:t>3.3 Bearbeitung in Magics</a:t>
+            </a:r>
           </a:p>
         </p:txBody>
       </p:sp>
+      <p:grpSp>
+        <p:nvGrpSpPr>
+          <p:cNvPr id="14" name="Gruppieren 13">
+            <a:extLst>
+              <a:ext uri="{FF2B5EF4-FFF2-40B4-BE49-F238E27FC236}">
+                <a16:creationId xmlns:a16="http://schemas.microsoft.com/office/drawing/2014/main" id="{1D2E674F-C100-9530-279F-81088CAED516}"/>
+              </a:ext>
+            </a:extLst>
+          </p:cNvPr>
+          <p:cNvGrpSpPr/>
+          <p:nvPr/>
+        </p:nvGrpSpPr>
+        <p:grpSpPr>
+          <a:xfrm>
+            <a:off x="2491519" y="2485259"/>
+            <a:ext cx="7208961" cy="3187931"/>
+            <a:chOff x="2296357" y="2467504"/>
+            <a:chExt cx="7208961" cy="3187931"/>
+          </a:xfrm>
+        </p:grpSpPr>
+        <p:grpSp>
+          <p:nvGrpSpPr>
+            <p:cNvPr id="5" name="Gruppieren 4">
+              <a:extLst>
+                <a:ext uri="{FF2B5EF4-FFF2-40B4-BE49-F238E27FC236}">
+                  <a16:creationId xmlns:a16="http://schemas.microsoft.com/office/drawing/2014/main" id="{D7F18251-0CD6-8FF2-919A-2DFCA5514EAC}"/>
+                </a:ext>
+              </a:extLst>
+            </p:cNvPr>
+            <p:cNvGrpSpPr/>
+            <p:nvPr/>
+          </p:nvGrpSpPr>
+          <p:grpSpPr>
+            <a:xfrm>
+              <a:off x="2296357" y="2467506"/>
+              <a:ext cx="6203980" cy="3187929"/>
+              <a:chOff x="6807431" y="3644675"/>
+              <a:chExt cx="4538995" cy="2332373"/>
+            </a:xfrm>
+          </p:grpSpPr>
+          <p:sp>
+            <p:nvSpPr>
+              <p:cNvPr id="7" name="Textfeld 6">
+                <a:extLst>
+                  <a:ext uri="{FF2B5EF4-FFF2-40B4-BE49-F238E27FC236}">
+                    <a16:creationId xmlns:a16="http://schemas.microsoft.com/office/drawing/2014/main" id="{E639D9C9-E1EF-2688-72E0-4B9FA7C30624}"/>
+                  </a:ext>
+                </a:extLst>
+              </p:cNvPr>
+              <p:cNvSpPr txBox="1"/>
+              <p:nvPr/>
+            </p:nvSpPr>
+            <p:spPr>
+              <a:xfrm>
+                <a:off x="6807431" y="5751870"/>
+                <a:ext cx="4538995" cy="225178"/>
+              </a:xfrm>
+              <a:prstGeom prst="rect">
+                <a:avLst/>
+              </a:prstGeom>
+              <a:noFill/>
+            </p:spPr>
+            <p:txBody>
+              <a:bodyPr wrap="square" rtlCol="0">
+                <a:spAutoFit/>
+              </a:bodyPr>
+              <a:lstStyle/>
+              <a:p>
+                <a:r>
+                  <a:rPr lang="de-DE" sz="1400" dirty="0">
+                    <a:latin typeface="Open Sans" pitchFamily="2" charset="0"/>
+                    <a:ea typeface="Open Sans" pitchFamily="2" charset="0"/>
+                    <a:cs typeface="Open Sans" pitchFamily="2" charset="0"/>
+                  </a:rPr>
+                  <a:t>Abb. </a:t>
+                </a:r>
+                <a:r>
+                  <a:rPr lang="de-DE" sz="1400" dirty="0">
+                    <a:solidFill>
+                      <a:srgbClr val="FF0000"/>
+                    </a:solidFill>
+                    <a:latin typeface="Open Sans" pitchFamily="2" charset="0"/>
+                    <a:ea typeface="Open Sans" pitchFamily="2" charset="0"/>
+                    <a:cs typeface="Open Sans" pitchFamily="2" charset="0"/>
+                  </a:rPr>
+                  <a:t>XX</a:t>
+                </a:r>
+                <a:r>
+                  <a:rPr lang="de-DE" sz="1400" dirty="0">
+                    <a:latin typeface="Open Sans" pitchFamily="2" charset="0"/>
+                    <a:ea typeface="Open Sans" pitchFamily="2" charset="0"/>
+                    <a:cs typeface="Open Sans" pitchFamily="2" charset="0"/>
+                  </a:rPr>
+                  <a:t>: Stützen in Revit – AutoCAD – Magics </a:t>
+                </a:r>
+              </a:p>
+            </p:txBody>
+          </p:sp>
+          <p:pic>
+            <p:nvPicPr>
+              <p:cNvPr id="8" name="Grafik 7">
+                <a:extLst>
+                  <a:ext uri="{FF2B5EF4-FFF2-40B4-BE49-F238E27FC236}">
+                    <a16:creationId xmlns:a16="http://schemas.microsoft.com/office/drawing/2014/main" id="{F2F65079-FFB8-B4C9-3D2A-DF150AEC64CB}"/>
+                  </a:ext>
+                </a:extLst>
+              </p:cNvPr>
+              <p:cNvPicPr>
+                <a:picLocks noChangeAspect="1"/>
+              </p:cNvPicPr>
+              <p:nvPr/>
+            </p:nvPicPr>
+            <p:blipFill>
+              <a:blip r:embed="rId2">
+                <a:extLst>
+                  <a:ext uri="{28A0092B-C50C-407E-A947-70E740481C1C}">
+                    <a14:useLocalDpi xmlns:a14="http://schemas.microsoft.com/office/drawing/2010/main" val="0"/>
+                  </a:ext>
+                </a:extLst>
+              </a:blip>
+              <a:srcRect/>
+              <a:stretch/>
+            </p:blipFill>
+            <p:spPr>
+              <a:xfrm>
+                <a:off x="6868852" y="3644675"/>
+                <a:ext cx="1595654" cy="2064015"/>
+              </a:xfrm>
+              <a:prstGeom prst="rect">
+                <a:avLst/>
+              </a:prstGeom>
+            </p:spPr>
+          </p:pic>
+        </p:grpSp>
+        <p:pic>
+          <p:nvPicPr>
+            <p:cNvPr id="10" name="Grafik 9">
+              <a:extLst>
+                <a:ext uri="{FF2B5EF4-FFF2-40B4-BE49-F238E27FC236}">
+                  <a16:creationId xmlns:a16="http://schemas.microsoft.com/office/drawing/2014/main" id="{2FE2ECFF-2427-865A-4A1C-CBCB49B75548}"/>
+                </a:ext>
+              </a:extLst>
+            </p:cNvPr>
+            <p:cNvPicPr>
+              <a:picLocks noChangeAspect="1"/>
+            </p:cNvPicPr>
+            <p:nvPr/>
+          </p:nvPicPr>
+          <p:blipFill>
+            <a:blip r:embed="rId3">
+              <a:extLst>
+                <a:ext uri="{28A0092B-C50C-407E-A947-70E740481C1C}">
+                  <a14:useLocalDpi xmlns:a14="http://schemas.microsoft.com/office/drawing/2010/main" val="0"/>
+                </a:ext>
+              </a:extLst>
+            </a:blip>
+            <a:stretch>
+              <a:fillRect/>
+            </a:stretch>
+          </p:blipFill>
+          <p:spPr>
+            <a:xfrm>
+              <a:off x="4561277" y="2467505"/>
+              <a:ext cx="2250807" cy="2850425"/>
+            </a:xfrm>
+            <a:prstGeom prst="rect">
+              <a:avLst/>
+            </a:prstGeom>
+          </p:spPr>
+        </p:pic>
+        <p:pic>
+          <p:nvPicPr>
+            <p:cNvPr id="12" name="Grafik 11">
+              <a:extLst>
+                <a:ext uri="{FF2B5EF4-FFF2-40B4-BE49-F238E27FC236}">
+                  <a16:creationId xmlns:a16="http://schemas.microsoft.com/office/drawing/2014/main" id="{78AF9891-8541-6220-BF14-8B6D1DA88BFF}"/>
+                </a:ext>
+              </a:extLst>
+            </p:cNvPr>
+            <p:cNvPicPr>
+              <a:picLocks noChangeAspect="1"/>
+            </p:cNvPicPr>
+            <p:nvPr/>
+          </p:nvPicPr>
+          <p:blipFill>
+            <a:blip r:embed="rId4">
+              <a:extLst>
+                <a:ext uri="{28A0092B-C50C-407E-A947-70E740481C1C}">
+                  <a14:useLocalDpi xmlns:a14="http://schemas.microsoft.com/office/drawing/2010/main" val="0"/>
+                </a:ext>
+              </a:extLst>
+            </a:blip>
+            <a:stretch>
+              <a:fillRect/>
+            </a:stretch>
+          </p:blipFill>
+          <p:spPr>
+            <a:xfrm>
+              <a:off x="6812084" y="2467504"/>
+              <a:ext cx="2693234" cy="2850426"/>
+            </a:xfrm>
+            <a:prstGeom prst="rect">
+              <a:avLst/>
+            </a:prstGeom>
+          </p:spPr>
+        </p:pic>
+      </p:grpSp>
     </p:spTree>
     <p:extLst>
       <p:ext uri="{BB962C8B-B14F-4D97-AF65-F5344CB8AC3E}">
-        <p14:creationId xmlns:p14="http://schemas.microsoft.com/office/powerpoint/2010/main" val="3435762078"/>
+        <p14:creationId xmlns:p14="http://schemas.microsoft.com/office/powerpoint/2010/main" val="2144920815"/>
       </p:ext>
     </p:extLst>
   </p:cSld>
@@ -6034,10 +7060,96 @@
       </p:grpSpPr>
       <p:sp>
         <p:nvSpPr>
+          <p:cNvPr id="2" name="Inhaltsplatzhalter 1">
+            <a:extLst>
+              <a:ext uri="{FF2B5EF4-FFF2-40B4-BE49-F238E27FC236}">
+                <a16:creationId xmlns:a16="http://schemas.microsoft.com/office/drawing/2014/main" id="{BF955AA3-35CB-6310-7E4F-95209193670B}"/>
+              </a:ext>
+            </a:extLst>
+          </p:cNvPr>
+          <p:cNvSpPr>
+            <a:spLocks noGrp="1"/>
+          </p:cNvSpPr>
+          <p:nvPr>
+            <p:ph idx="1"/>
+          </p:nvPr>
+        </p:nvSpPr>
+        <p:spPr/>
+        <p:txBody>
+          <a:bodyPr/>
+          <a:lstStyle/>
+          <a:p>
+            <a:r>
+              <a:rPr lang="de-DE" dirty="0"/>
+              <a:t>In Magics </a:t>
+            </a:r>
+          </a:p>
+          <a:p>
+            <a:pPr lvl="1"/>
+            <a:r>
+              <a:rPr lang="de-DE" dirty="0"/>
+              <a:t>Skalieren [Skalieren]</a:t>
+            </a:r>
+          </a:p>
+          <a:p>
+            <a:pPr lvl="1"/>
+            <a:r>
+              <a:rPr lang="de-DE" dirty="0"/>
+              <a:t>Schnitte [Vielfachschnitte] [Schneiden]</a:t>
+            </a:r>
+          </a:p>
+          <a:p>
+            <a:pPr lvl="1"/>
+            <a:r>
+              <a:rPr lang="de-DE" dirty="0"/>
+              <a:t>Löcher füllen [Lochfüllmodus]</a:t>
+            </a:r>
+          </a:p>
+          <a:p>
+            <a:pPr lvl="1"/>
+            <a:r>
+              <a:rPr lang="de-DE" dirty="0">
+                <a:solidFill>
+                  <a:srgbClr val="FF0000"/>
+                </a:solidFill>
+              </a:rPr>
+              <a:t>Extrusion und Offset</a:t>
+            </a:r>
+          </a:p>
+          <a:p>
+            <a:pPr lvl="1"/>
+            <a:r>
+              <a:rPr lang="de-DE" dirty="0">
+                <a:solidFill>
+                  <a:srgbClr val="FF0000"/>
+                </a:solidFill>
+              </a:rPr>
+              <a:t>Dreiecke optimieren [Dreiecke trimmen] [Netzverfeinerung]</a:t>
+            </a:r>
+          </a:p>
+          <a:p>
+            <a:pPr lvl="1"/>
+            <a:r>
+              <a:rPr lang="de-DE" dirty="0"/>
+              <a:t>Reparaturstatus verändern bis nur noch eine Shell und keine Probleme übrig sind [Schrumpffolie] [verschiedene Auto-</a:t>
+            </a:r>
+            <a:r>
+              <a:rPr lang="de-DE" dirty="0" err="1"/>
+              <a:t>Repair</a:t>
+            </a:r>
+            <a:r>
+              <a:rPr lang="de-DE" dirty="0"/>
+              <a:t>-Tools]</a:t>
+            </a:r>
+          </a:p>
+        </p:txBody>
+      </p:sp>
+      <p:sp>
+        <p:nvSpPr>
           <p:cNvPr id="3" name="Titel 2">
             <a:extLst>
               <a:ext uri="{FF2B5EF4-FFF2-40B4-BE49-F238E27FC236}">
-                <a16:creationId xmlns:a16="http://schemas.microsoft.com/office/drawing/2014/main" id="{41D17C19-0B97-4976-BF14-DCC052365CE5}"/>
+                <a16:creationId xmlns:a16="http://schemas.microsoft.com/office/drawing/2014/main" id="{304C2AF1-1370-3FDB-974B-B116FCA74B54}"/>
               </a:ext>
             </a:extLst>
           </p:cNvPr>
@@ -6054,220 +7166,12 @@
           <a:lstStyle/>
           <a:p>
             <a:r>
-              <a:rPr lang="de-DE" dirty="0"/>
-              <a:t>3. Aktueller Arbeitsstand</a:t>
-            </a:r>
-          </a:p>
-        </p:txBody>
-      </p:sp>
-      <p:pic>
-        <p:nvPicPr>
-          <p:cNvPr id="10" name="Inhaltsplatzhalter 9">
-            <a:extLst>
-              <a:ext uri="{FF2B5EF4-FFF2-40B4-BE49-F238E27FC236}">
-                <a16:creationId xmlns:a16="http://schemas.microsoft.com/office/drawing/2014/main" id="{2F82BF73-288C-1906-C49F-FFCF358F55F5}"/>
-              </a:ext>
-            </a:extLst>
-          </p:cNvPr>
-          <p:cNvPicPr>
-            <a:picLocks noGrp="1" noChangeAspect="1"/>
-          </p:cNvPicPr>
-          <p:nvPr>
-            <p:ph idx="1"/>
-          </p:nvPr>
-        </p:nvPicPr>
-        <p:blipFill>
-          <a:blip r:embed="rId2"/>
-          <a:stretch>
-            <a:fillRect/>
-          </a:stretch>
-        </p:blipFill>
-        <p:spPr>
-          <a:xfrm>
-            <a:off x="2314665" y="1159389"/>
-            <a:ext cx="1933004" cy="3470275"/>
-          </a:xfrm>
-        </p:spPr>
-      </p:pic>
-      <p:pic>
-        <p:nvPicPr>
-          <p:cNvPr id="8" name="Grafik 7">
-            <a:extLst>
-              <a:ext uri="{FF2B5EF4-FFF2-40B4-BE49-F238E27FC236}">
-                <a16:creationId xmlns:a16="http://schemas.microsoft.com/office/drawing/2014/main" id="{FD19025E-6EAA-4275-3380-069017AC2BF2}"/>
-              </a:ext>
-            </a:extLst>
-          </p:cNvPr>
-          <p:cNvPicPr>
-            <a:picLocks noChangeAspect="1"/>
-          </p:cNvPicPr>
-          <p:nvPr/>
-        </p:nvPicPr>
-        <p:blipFill>
-          <a:blip r:embed="rId3"/>
-          <a:stretch>
-            <a:fillRect/>
-          </a:stretch>
-        </p:blipFill>
-        <p:spPr>
-          <a:xfrm>
-            <a:off x="527434" y="1159389"/>
-            <a:ext cx="1787231" cy="3469945"/>
-          </a:xfrm>
-          <a:prstGeom prst="rect">
-            <a:avLst/>
-          </a:prstGeom>
-        </p:spPr>
-      </p:pic>
-      <p:sp>
-        <p:nvSpPr>
-          <p:cNvPr id="11" name="Textfeld 10">
-            <a:extLst>
-              <a:ext uri="{FF2B5EF4-FFF2-40B4-BE49-F238E27FC236}">
-                <a16:creationId xmlns:a16="http://schemas.microsoft.com/office/drawing/2014/main" id="{1D28E38E-8ECF-1EC8-E277-796F781DA73C}"/>
-              </a:ext>
-            </a:extLst>
-          </p:cNvPr>
-          <p:cNvSpPr txBox="1"/>
-          <p:nvPr/>
-        </p:nvSpPr>
-        <p:spPr>
-          <a:xfrm>
-            <a:off x="527434" y="4667994"/>
-            <a:ext cx="4538995" cy="523220"/>
-          </a:xfrm>
-          <a:prstGeom prst="rect">
-            <a:avLst/>
-          </a:prstGeom>
-          <a:noFill/>
-        </p:spPr>
-        <p:txBody>
-          <a:bodyPr wrap="square" rtlCol="0">
-            <a:spAutoFit/>
-          </a:bodyPr>
-          <a:lstStyle/>
-          <a:p>
-            <a:r>
-              <a:rPr lang="de-DE" sz="1400" dirty="0">
-                <a:latin typeface="Open Sans" pitchFamily="2" charset="0"/>
-                <a:ea typeface="Open Sans" pitchFamily="2" charset="0"/>
-                <a:cs typeface="Open Sans" pitchFamily="2" charset="0"/>
+              <a:rPr lang="de-DE" dirty="0">
+                <a:solidFill>
+                  <a:srgbClr val="FF0000"/>
+                </a:solidFill>
               </a:rPr>
-              <a:t>Abb. 2: Änderung Feuerleiter (links original, </a:t>
-            </a:r>
-            <a:br>
-              <a:rPr lang="de-DE" sz="1400" dirty="0">
-                <a:latin typeface="Open Sans" pitchFamily="2" charset="0"/>
-                <a:ea typeface="Open Sans" pitchFamily="2" charset="0"/>
-                <a:cs typeface="Open Sans" pitchFamily="2" charset="0"/>
-              </a:rPr>
-            </a:br>
-            <a:r>
-              <a:rPr lang="de-DE" sz="1400" dirty="0">
-                <a:latin typeface="Open Sans" pitchFamily="2" charset="0"/>
-                <a:ea typeface="Open Sans" pitchFamily="2" charset="0"/>
-                <a:cs typeface="Open Sans" pitchFamily="2" charset="0"/>
-              </a:rPr>
-              <a:t>rechts bearbeitet)</a:t>
-            </a:r>
-          </a:p>
-        </p:txBody>
-      </p:sp>
-      <p:pic>
-        <p:nvPicPr>
-          <p:cNvPr id="13" name="Grafik 12">
-            <a:extLst>
-              <a:ext uri="{FF2B5EF4-FFF2-40B4-BE49-F238E27FC236}">
-                <a16:creationId xmlns:a16="http://schemas.microsoft.com/office/drawing/2014/main" id="{CC347108-6754-F1A8-2CB6-D37BD94D22E8}"/>
-              </a:ext>
-            </a:extLst>
-          </p:cNvPr>
-          <p:cNvPicPr>
-            <a:picLocks noChangeAspect="1"/>
-          </p:cNvPicPr>
-          <p:nvPr/>
-        </p:nvPicPr>
-        <p:blipFill>
-          <a:blip r:embed="rId4"/>
-          <a:stretch>
-            <a:fillRect/>
-          </a:stretch>
-        </p:blipFill>
-        <p:spPr>
-          <a:xfrm>
-            <a:off x="6096000" y="1159388"/>
-            <a:ext cx="2759790" cy="3469945"/>
-          </a:xfrm>
-          <a:prstGeom prst="rect">
-            <a:avLst/>
-          </a:prstGeom>
-        </p:spPr>
-      </p:pic>
-      <p:pic>
-        <p:nvPicPr>
-          <p:cNvPr id="15" name="Grafik 14">
-            <a:extLst>
-              <a:ext uri="{FF2B5EF4-FFF2-40B4-BE49-F238E27FC236}">
-                <a16:creationId xmlns:a16="http://schemas.microsoft.com/office/drawing/2014/main" id="{980A97F8-154D-7988-9264-5DB38582AAB0}"/>
-              </a:ext>
-            </a:extLst>
-          </p:cNvPr>
-          <p:cNvPicPr>
-            <a:picLocks noChangeAspect="1"/>
-          </p:cNvPicPr>
-          <p:nvPr/>
-        </p:nvPicPr>
-        <p:blipFill>
-          <a:blip r:embed="rId5"/>
-          <a:stretch>
-            <a:fillRect/>
-          </a:stretch>
-        </p:blipFill>
-        <p:spPr>
-          <a:xfrm>
-            <a:off x="8861491" y="1159389"/>
-            <a:ext cx="2916849" cy="3469944"/>
-          </a:xfrm>
-          <a:prstGeom prst="rect">
-            <a:avLst/>
-          </a:prstGeom>
-        </p:spPr>
-      </p:pic>
-      <p:sp>
-        <p:nvSpPr>
-          <p:cNvPr id="16" name="Textfeld 15">
-            <a:extLst>
-              <a:ext uri="{FF2B5EF4-FFF2-40B4-BE49-F238E27FC236}">
-                <a16:creationId xmlns:a16="http://schemas.microsoft.com/office/drawing/2014/main" id="{B79298AC-4E80-9ADF-BC11-5EF0BAD22014}"/>
-              </a:ext>
-            </a:extLst>
-          </p:cNvPr>
-          <p:cNvSpPr txBox="1"/>
-          <p:nvPr/>
-        </p:nvSpPr>
-        <p:spPr>
-          <a:xfrm>
-            <a:off x="6096000" y="4677166"/>
-            <a:ext cx="5682340" cy="307777"/>
-          </a:xfrm>
-          <a:prstGeom prst="rect">
-            <a:avLst/>
-          </a:prstGeom>
-          <a:noFill/>
-        </p:spPr>
-        <p:txBody>
-          <a:bodyPr wrap="square" rtlCol="0">
-            <a:spAutoFit/>
-          </a:bodyPr>
-          <a:lstStyle/>
-          <a:p>
-            <a:r>
-              <a:rPr lang="de-DE" sz="1400" dirty="0">
-                <a:latin typeface="Open Sans" pitchFamily="2" charset="0"/>
-                <a:ea typeface="Open Sans" pitchFamily="2" charset="0"/>
-                <a:cs typeface="Open Sans" pitchFamily="2" charset="0"/>
-              </a:rPr>
-              <a:t>Abb. 3: Darstellung Fenster (links Revit, rechts AutoCAD)</a:t>
+              <a:t>3.3 Bearbeitung in Magics</a:t>
             </a:r>
           </a:p>
         </p:txBody>
@@ -6275,7 +7179,7 @@
     </p:spTree>
     <p:extLst>
       <p:ext uri="{BB962C8B-B14F-4D97-AF65-F5344CB8AC3E}">
-        <p14:creationId xmlns:p14="http://schemas.microsoft.com/office/powerpoint/2010/main" val="130291041"/>
+        <p14:creationId xmlns:p14="http://schemas.microsoft.com/office/powerpoint/2010/main" val="3435762078"/>
       </p:ext>
     </p:extLst>
   </p:cSld>

</xml_diff>

<commit_message>
Vortrag voerst fertig (Stand24.06.)
</commit_message>
<xml_diff>
--- a/Endvortrag.pptx
+++ b/Endvortrag.pptx
@@ -5,7 +5,7 @@
     <p:sldMasterId id="2147483648" r:id="rId1"/>
   </p:sldMasterIdLst>
   <p:notesMasterIdLst>
-    <p:notesMasterId r:id="rId14"/>
+    <p:notesMasterId r:id="rId21"/>
   </p:notesMasterIdLst>
   <p:sldIdLst>
     <p:sldId id="258" r:id="rId2"/>
@@ -14,12 +14,19 @@
     <p:sldId id="268" r:id="rId5"/>
     <p:sldId id="266" r:id="rId6"/>
     <p:sldId id="269" r:id="rId7"/>
-    <p:sldId id="270" r:id="rId8"/>
-    <p:sldId id="273" r:id="rId9"/>
-    <p:sldId id="271" r:id="rId10"/>
-    <p:sldId id="261" r:id="rId11"/>
-    <p:sldId id="265" r:id="rId12"/>
-    <p:sldId id="272" r:id="rId13"/>
+    <p:sldId id="273" r:id="rId8"/>
+    <p:sldId id="270" r:id="rId9"/>
+    <p:sldId id="274" r:id="rId10"/>
+    <p:sldId id="275" r:id="rId11"/>
+    <p:sldId id="271" r:id="rId12"/>
+    <p:sldId id="265" r:id="rId13"/>
+    <p:sldId id="279" r:id="rId14"/>
+    <p:sldId id="272" r:id="rId15"/>
+    <p:sldId id="276" r:id="rId16"/>
+    <p:sldId id="277" r:id="rId17"/>
+    <p:sldId id="278" r:id="rId18"/>
+    <p:sldId id="280" r:id="rId19"/>
+    <p:sldId id="281" r:id="rId20"/>
   </p:sldIdLst>
   <p:sldSz cx="12192000" cy="6858000"/>
   <p:notesSz cx="6858000" cy="9144000"/>
@@ -234,7 +241,7 @@
           <a:p>
             <a:fld id="{827C43CF-120A-484B-B881-0ADA2055594B}" type="datetimeFigureOut">
               <a:rPr lang="de-DE" smtClean="0"/>
-              <a:t>23.06.2023</a:t>
+              <a:t>24.06.2023</a:t>
             </a:fld>
             <a:endParaRPr lang="de-DE"/>
           </a:p>
@@ -499,6 +506,286 @@
     </a:lvl9pPr>
   </p:notesStyle>
 </p:notesMaster>
+</file>
+
+<file path=ppt/notesSlides/notesSlide1.xml><?xml version="1.0" encoding="utf-8"?>
+<p:notes xmlns:a="http://schemas.openxmlformats.org/drawingml/2006/main" xmlns:r="http://schemas.openxmlformats.org/officeDocument/2006/relationships" xmlns:p="http://schemas.openxmlformats.org/presentationml/2006/main">
+  <p:cSld>
+    <p:spTree>
+      <p:nvGrpSpPr>
+        <p:cNvPr id="1" name=""/>
+        <p:cNvGrpSpPr/>
+        <p:nvPr/>
+      </p:nvGrpSpPr>
+      <p:grpSpPr>
+        <a:xfrm>
+          <a:off x="0" y="0"/>
+          <a:ext cx="0" cy="0"/>
+          <a:chOff x="0" y="0"/>
+          <a:chExt cx="0" cy="0"/>
+        </a:xfrm>
+      </p:grpSpPr>
+      <p:sp>
+        <p:nvSpPr>
+          <p:cNvPr id="2" name="Folienbildplatzhalter 1"/>
+          <p:cNvSpPr>
+            <a:spLocks noGrp="1" noRot="1" noChangeAspect="1"/>
+          </p:cNvSpPr>
+          <p:nvPr>
+            <p:ph type="sldImg"/>
+          </p:nvPr>
+        </p:nvSpPr>
+        <p:spPr/>
+      </p:sp>
+      <p:sp>
+        <p:nvSpPr>
+          <p:cNvPr id="3" name="Notizenplatzhalter 2"/>
+          <p:cNvSpPr>
+            <a:spLocks noGrp="1"/>
+          </p:cNvSpPr>
+          <p:nvPr>
+            <p:ph type="body" idx="1"/>
+          </p:nvPr>
+        </p:nvSpPr>
+        <p:spPr/>
+        <p:txBody>
+          <a:bodyPr/>
+          <a:lstStyle/>
+          <a:p>
+            <a:endParaRPr lang="de-DE" dirty="0"/>
+          </a:p>
+        </p:txBody>
+      </p:sp>
+      <p:sp>
+        <p:nvSpPr>
+          <p:cNvPr id="4" name="Foliennummernplatzhalter 3"/>
+          <p:cNvSpPr>
+            <a:spLocks noGrp="1"/>
+          </p:cNvSpPr>
+          <p:nvPr>
+            <p:ph type="sldNum" sz="quarter" idx="5"/>
+          </p:nvPr>
+        </p:nvSpPr>
+        <p:spPr/>
+        <p:txBody>
+          <a:bodyPr/>
+          <a:lstStyle/>
+          <a:p>
+            <a:fld id="{BBDE6C57-0503-46DB-90D4-00DF5545ECB4}" type="slidenum">
+              <a:rPr lang="de-DE" smtClean="0"/>
+              <a:t>6</a:t>
+            </a:fld>
+            <a:endParaRPr lang="de-DE"/>
+          </a:p>
+        </p:txBody>
+      </p:sp>
+    </p:spTree>
+    <p:extLst>
+      <p:ext uri="{BB962C8B-B14F-4D97-AF65-F5344CB8AC3E}">
+        <p14:creationId xmlns:p14="http://schemas.microsoft.com/office/powerpoint/2010/main" val="582366182"/>
+      </p:ext>
+    </p:extLst>
+  </p:cSld>
+  <p:clrMapOvr>
+    <a:masterClrMapping/>
+  </p:clrMapOvr>
+</p:notes>
+</file>
+
+<file path=ppt/notesSlides/notesSlide2.xml><?xml version="1.0" encoding="utf-8"?>
+<p:notes xmlns:a="http://schemas.openxmlformats.org/drawingml/2006/main" xmlns:r="http://schemas.openxmlformats.org/officeDocument/2006/relationships" xmlns:p="http://schemas.openxmlformats.org/presentationml/2006/main">
+  <p:cSld>
+    <p:spTree>
+      <p:nvGrpSpPr>
+        <p:cNvPr id="1" name=""/>
+        <p:cNvGrpSpPr/>
+        <p:nvPr/>
+      </p:nvGrpSpPr>
+      <p:grpSpPr>
+        <a:xfrm>
+          <a:off x="0" y="0"/>
+          <a:ext cx="0" cy="0"/>
+          <a:chOff x="0" y="0"/>
+          <a:chExt cx="0" cy="0"/>
+        </a:xfrm>
+      </p:grpSpPr>
+      <p:sp>
+        <p:nvSpPr>
+          <p:cNvPr id="2" name="Folienbildplatzhalter 1"/>
+          <p:cNvSpPr>
+            <a:spLocks noGrp="1" noRot="1" noChangeAspect="1"/>
+          </p:cNvSpPr>
+          <p:nvPr>
+            <p:ph type="sldImg"/>
+          </p:nvPr>
+        </p:nvSpPr>
+        <p:spPr/>
+      </p:sp>
+      <p:sp>
+        <p:nvSpPr>
+          <p:cNvPr id="3" name="Notizenplatzhalter 2"/>
+          <p:cNvSpPr>
+            <a:spLocks noGrp="1"/>
+          </p:cNvSpPr>
+          <p:nvPr>
+            <p:ph type="body" idx="1"/>
+          </p:nvPr>
+        </p:nvSpPr>
+        <p:spPr/>
+        <p:txBody>
+          <a:bodyPr/>
+          <a:lstStyle/>
+          <a:p>
+            <a:r>
+              <a:rPr lang="de-DE" dirty="0" err="1"/>
+              <a:t>Hochkantpfosten</a:t>
+            </a:r>
+            <a:r>
+              <a:rPr lang="de-DE" dirty="0"/>
+              <a:t> der Geländer fehlten beim Export nach Magics </a:t>
+            </a:r>
+            <a:r>
+              <a:rPr lang="de-DE" dirty="0">
+                <a:sym typeface="Wingdings" panose="05000000000000000000" pitchFamily="2" charset="2"/>
+              </a:rPr>
+              <a:t> instabil</a:t>
+            </a:r>
+            <a:endParaRPr lang="de-DE" dirty="0"/>
+          </a:p>
+        </p:txBody>
+      </p:sp>
+      <p:sp>
+        <p:nvSpPr>
+          <p:cNvPr id="4" name="Foliennummernplatzhalter 3"/>
+          <p:cNvSpPr>
+            <a:spLocks noGrp="1"/>
+          </p:cNvSpPr>
+          <p:nvPr>
+            <p:ph type="sldNum" sz="quarter" idx="5"/>
+          </p:nvPr>
+        </p:nvSpPr>
+        <p:spPr/>
+        <p:txBody>
+          <a:bodyPr/>
+          <a:lstStyle/>
+          <a:p>
+            <a:fld id="{BBDE6C57-0503-46DB-90D4-00DF5545ECB4}" type="slidenum">
+              <a:rPr lang="de-DE" smtClean="0"/>
+              <a:t>10</a:t>
+            </a:fld>
+            <a:endParaRPr lang="de-DE"/>
+          </a:p>
+        </p:txBody>
+      </p:sp>
+    </p:spTree>
+    <p:extLst>
+      <p:ext uri="{BB962C8B-B14F-4D97-AF65-F5344CB8AC3E}">
+        <p14:creationId xmlns:p14="http://schemas.microsoft.com/office/powerpoint/2010/main" val="4111681388"/>
+      </p:ext>
+    </p:extLst>
+  </p:cSld>
+  <p:clrMapOvr>
+    <a:masterClrMapping/>
+  </p:clrMapOvr>
+</p:notes>
+</file>
+
+<file path=ppt/notesSlides/notesSlide3.xml><?xml version="1.0" encoding="utf-8"?>
+<p:notes xmlns:a="http://schemas.openxmlformats.org/drawingml/2006/main" xmlns:r="http://schemas.openxmlformats.org/officeDocument/2006/relationships" xmlns:p="http://schemas.openxmlformats.org/presentationml/2006/main">
+  <p:cSld>
+    <p:spTree>
+      <p:nvGrpSpPr>
+        <p:cNvPr id="1" name=""/>
+        <p:cNvGrpSpPr/>
+        <p:nvPr/>
+      </p:nvGrpSpPr>
+      <p:grpSpPr>
+        <a:xfrm>
+          <a:off x="0" y="0"/>
+          <a:ext cx="0" cy="0"/>
+          <a:chOff x="0" y="0"/>
+          <a:chExt cx="0" cy="0"/>
+        </a:xfrm>
+      </p:grpSpPr>
+      <p:sp>
+        <p:nvSpPr>
+          <p:cNvPr id="2" name="Folienbildplatzhalter 1"/>
+          <p:cNvSpPr>
+            <a:spLocks noGrp="1" noRot="1" noChangeAspect="1"/>
+          </p:cNvSpPr>
+          <p:nvPr>
+            <p:ph type="sldImg"/>
+          </p:nvPr>
+        </p:nvSpPr>
+        <p:spPr/>
+      </p:sp>
+      <p:sp>
+        <p:nvSpPr>
+          <p:cNvPr id="3" name="Notizenplatzhalter 2"/>
+          <p:cNvSpPr>
+            <a:spLocks noGrp="1"/>
+          </p:cNvSpPr>
+          <p:nvPr>
+            <p:ph type="body" idx="1"/>
+          </p:nvPr>
+        </p:nvSpPr>
+        <p:spPr/>
+        <p:txBody>
+          <a:bodyPr/>
+          <a:lstStyle/>
+          <a:p>
+            <a:r>
+              <a:rPr lang="de-DE" dirty="0" err="1"/>
+              <a:t>Hochkantpfosten</a:t>
+            </a:r>
+            <a:r>
+              <a:rPr lang="de-DE" dirty="0"/>
+              <a:t> der Geländer fehlten beim Export nach Magics </a:t>
+            </a:r>
+            <a:r>
+              <a:rPr lang="de-DE" dirty="0">
+                <a:sym typeface="Wingdings" panose="05000000000000000000" pitchFamily="2" charset="2"/>
+              </a:rPr>
+              <a:t> instabil</a:t>
+            </a:r>
+            <a:endParaRPr lang="de-DE" dirty="0"/>
+          </a:p>
+        </p:txBody>
+      </p:sp>
+      <p:sp>
+        <p:nvSpPr>
+          <p:cNvPr id="4" name="Foliennummernplatzhalter 3"/>
+          <p:cNvSpPr>
+            <a:spLocks noGrp="1"/>
+          </p:cNvSpPr>
+          <p:nvPr>
+            <p:ph type="sldNum" sz="quarter" idx="5"/>
+          </p:nvPr>
+        </p:nvSpPr>
+        <p:spPr/>
+        <p:txBody>
+          <a:bodyPr/>
+          <a:lstStyle/>
+          <a:p>
+            <a:fld id="{BBDE6C57-0503-46DB-90D4-00DF5545ECB4}" type="slidenum">
+              <a:rPr lang="de-DE" smtClean="0"/>
+              <a:t>11</a:t>
+            </a:fld>
+            <a:endParaRPr lang="de-DE"/>
+          </a:p>
+        </p:txBody>
+      </p:sp>
+    </p:spTree>
+    <p:extLst>
+      <p:ext uri="{BB962C8B-B14F-4D97-AF65-F5344CB8AC3E}">
+        <p14:creationId xmlns:p14="http://schemas.microsoft.com/office/powerpoint/2010/main" val="1653264176"/>
+      </p:ext>
+    </p:extLst>
+  </p:cSld>
+  <p:clrMapOvr>
+    <a:masterClrMapping/>
+  </p:clrMapOvr>
+</p:notes>
 </file>
 
 <file path=ppt/slideLayouts/slideLayout1.xml><?xml version="1.0" encoding="utf-8"?>
@@ -4633,10 +4920,68 @@
       </p:grpSpPr>
       <p:sp>
         <p:nvSpPr>
+          <p:cNvPr id="2" name="Inhaltsplatzhalter 1">
+            <a:extLst>
+              <a:ext uri="{FF2B5EF4-FFF2-40B4-BE49-F238E27FC236}">
+                <a16:creationId xmlns:a16="http://schemas.microsoft.com/office/drawing/2014/main" id="{BF955AA3-35CB-6310-7E4F-95209193670B}"/>
+              </a:ext>
+            </a:extLst>
+          </p:cNvPr>
+          <p:cNvSpPr>
+            <a:spLocks noGrp="1"/>
+          </p:cNvSpPr>
+          <p:nvPr>
+            <p:ph idx="1"/>
+          </p:nvPr>
+        </p:nvSpPr>
+        <p:spPr/>
+        <p:txBody>
+          <a:bodyPr/>
+          <a:lstStyle/>
+          <a:p>
+            <a:r>
+              <a:rPr lang="de-DE" dirty="0"/>
+              <a:t>Skalieren [Skalieren]</a:t>
+            </a:r>
+          </a:p>
+          <a:p>
+            <a:r>
+              <a:rPr lang="de-DE" dirty="0"/>
+              <a:t>Entfernung der Geländer [Löschen]</a:t>
+            </a:r>
+          </a:p>
+          <a:p>
+            <a:r>
+              <a:rPr lang="de-DE" dirty="0"/>
+              <a:t>Schnitte [Vielfachschnitte] [Schneiden]</a:t>
+            </a:r>
+          </a:p>
+          <a:p>
+            <a:r>
+              <a:rPr lang="de-DE" dirty="0"/>
+              <a:t>Löcher füllen [Lochfüllmodus]</a:t>
+            </a:r>
+          </a:p>
+          <a:p>
+            <a:r>
+              <a:rPr lang="de-DE" dirty="0"/>
+              <a:t>Extrusion an Dachkante [Extrusion]</a:t>
+            </a:r>
+          </a:p>
+          <a:p>
+            <a:pPr marL="457200" lvl="1" indent="0">
+              <a:buNone/>
+            </a:pPr>
+            <a:endParaRPr lang="de-DE" dirty="0"/>
+          </a:p>
+        </p:txBody>
+      </p:sp>
+      <p:sp>
+        <p:nvSpPr>
           <p:cNvPr id="3" name="Titel 2">
             <a:extLst>
               <a:ext uri="{FF2B5EF4-FFF2-40B4-BE49-F238E27FC236}">
-                <a16:creationId xmlns:a16="http://schemas.microsoft.com/office/drawing/2014/main" id="{41D17C19-0B97-4976-BF14-DCC052365CE5}"/>
+                <a16:creationId xmlns:a16="http://schemas.microsoft.com/office/drawing/2014/main" id="{304C2AF1-1370-3FDB-974B-B116FCA74B54}"/>
               </a:ext>
             </a:extLst>
           </p:cNvPr>
@@ -4654,269 +4999,110 @@
           <a:p>
             <a:r>
               <a:rPr lang="de-DE" dirty="0"/>
-              <a:t>3. Aktueller Arbeitsstand</a:t>
+              <a:t>3.3 Bearbeitung in Magics</a:t>
             </a:r>
           </a:p>
         </p:txBody>
       </p:sp>
-      <p:pic>
-        <p:nvPicPr>
-          <p:cNvPr id="10" name="Inhaltsplatzhalter 9">
+      <p:grpSp>
+        <p:nvGrpSpPr>
+          <p:cNvPr id="5" name="Gruppieren 4">
             <a:extLst>
               <a:ext uri="{FF2B5EF4-FFF2-40B4-BE49-F238E27FC236}">
-                <a16:creationId xmlns:a16="http://schemas.microsoft.com/office/drawing/2014/main" id="{2F82BF73-288C-1906-C49F-FFCF358F55F5}"/>
+                <a16:creationId xmlns:a16="http://schemas.microsoft.com/office/drawing/2014/main" id="{FDB78907-3E27-538D-CE76-652DE512A84A}"/>
               </a:ext>
             </a:extLst>
           </p:cNvPr>
-          <p:cNvPicPr>
-            <a:picLocks noGrp="1" noChangeAspect="1"/>
-          </p:cNvPicPr>
-          <p:nvPr>
-            <p:ph idx="1"/>
-          </p:nvPr>
-        </p:nvPicPr>
-        <p:blipFill>
-          <a:blip r:embed="rId2"/>
-          <a:stretch>
-            <a:fillRect/>
-          </a:stretch>
-        </p:blipFill>
-        <p:spPr>
+          <p:cNvGrpSpPr/>
+          <p:nvPr/>
+        </p:nvGrpSpPr>
+        <p:grpSpPr>
           <a:xfrm>
-            <a:off x="2314665" y="1159389"/>
-            <a:ext cx="1933004" cy="3470275"/>
+            <a:off x="5562975" y="1630763"/>
+            <a:ext cx="6203980" cy="3868878"/>
+            <a:chOff x="6807431" y="3146475"/>
+            <a:chExt cx="4538995" cy="2830573"/>
           </a:xfrm>
-        </p:spPr>
-      </p:pic>
-      <p:pic>
-        <p:nvPicPr>
-          <p:cNvPr id="8" name="Grafik 7">
-            <a:extLst>
-              <a:ext uri="{FF2B5EF4-FFF2-40B4-BE49-F238E27FC236}">
-                <a16:creationId xmlns:a16="http://schemas.microsoft.com/office/drawing/2014/main" id="{FD19025E-6EAA-4275-3380-069017AC2BF2}"/>
-              </a:ext>
-            </a:extLst>
-          </p:cNvPr>
-          <p:cNvPicPr>
-            <a:picLocks noChangeAspect="1"/>
-          </p:cNvPicPr>
-          <p:nvPr/>
-        </p:nvPicPr>
-        <p:blipFill>
-          <a:blip r:embed="rId3"/>
-          <a:stretch>
-            <a:fillRect/>
-          </a:stretch>
-        </p:blipFill>
-        <p:spPr>
-          <a:xfrm>
-            <a:off x="527434" y="1159389"/>
-            <a:ext cx="1787231" cy="3469945"/>
-          </a:xfrm>
-          <a:prstGeom prst="rect">
-            <a:avLst/>
-          </a:prstGeom>
-        </p:spPr>
-      </p:pic>
-      <p:sp>
-        <p:nvSpPr>
-          <p:cNvPr id="11" name="Textfeld 10">
-            <a:extLst>
-              <a:ext uri="{FF2B5EF4-FFF2-40B4-BE49-F238E27FC236}">
-                <a16:creationId xmlns:a16="http://schemas.microsoft.com/office/drawing/2014/main" id="{1D28E38E-8ECF-1EC8-E277-796F781DA73C}"/>
-              </a:ext>
-            </a:extLst>
-          </p:cNvPr>
-          <p:cNvSpPr txBox="1"/>
-          <p:nvPr/>
-        </p:nvSpPr>
-        <p:spPr>
-          <a:xfrm>
-            <a:off x="527434" y="4667994"/>
-            <a:ext cx="4538995" cy="954107"/>
-          </a:xfrm>
-          <a:prstGeom prst="rect">
-            <a:avLst/>
-          </a:prstGeom>
-          <a:noFill/>
-        </p:spPr>
-        <p:txBody>
-          <a:bodyPr wrap="square" rtlCol="0">
-            <a:spAutoFit/>
-          </a:bodyPr>
-          <a:lstStyle/>
-          <a:p>
-            <a:r>
-              <a:rPr lang="de-DE" sz="1400" dirty="0">
-                <a:latin typeface="Open Sans" pitchFamily="2" charset="0"/>
-                <a:ea typeface="Open Sans" pitchFamily="2" charset="0"/>
-                <a:cs typeface="Open Sans" pitchFamily="2" charset="0"/>
-              </a:rPr>
-              <a:t>Abb. 2: Änderung Feuerleiter (links original, </a:t>
-            </a:r>
-            <a:br>
-              <a:rPr lang="de-DE" sz="1400" dirty="0">
-                <a:latin typeface="Open Sans" pitchFamily="2" charset="0"/>
-                <a:ea typeface="Open Sans" pitchFamily="2" charset="0"/>
-                <a:cs typeface="Open Sans" pitchFamily="2" charset="0"/>
-              </a:rPr>
-            </a:br>
-            <a:r>
-              <a:rPr lang="de-DE" sz="1400" dirty="0">
-                <a:latin typeface="Open Sans" pitchFamily="2" charset="0"/>
-                <a:ea typeface="Open Sans" pitchFamily="2" charset="0"/>
-                <a:cs typeface="Open Sans" pitchFamily="2" charset="0"/>
-              </a:rPr>
-              <a:t>rechts bearbeitet)</a:t>
-            </a:r>
-          </a:p>
-          <a:p>
-            <a:endParaRPr lang="de-DE" sz="1400" dirty="0">
-              <a:latin typeface="Open Sans" pitchFamily="2" charset="0"/>
-              <a:ea typeface="Open Sans" pitchFamily="2" charset="0"/>
-              <a:cs typeface="Open Sans" pitchFamily="2" charset="0"/>
-            </a:endParaRPr>
-          </a:p>
-          <a:p>
-            <a:r>
-              <a:rPr lang="de-DE" sz="1400" dirty="0">
-                <a:solidFill>
-                  <a:srgbClr val="FF0000"/>
-                </a:solidFill>
-                <a:latin typeface="Open Sans" pitchFamily="2" charset="0"/>
-                <a:ea typeface="Open Sans" pitchFamily="2" charset="0"/>
-                <a:cs typeface="Open Sans" pitchFamily="2" charset="0"/>
-              </a:rPr>
-              <a:t>Bilder in Folien mit </a:t>
-            </a:r>
-            <a:r>
-              <a:rPr lang="de-DE" sz="1400" dirty="0" err="1">
-                <a:solidFill>
-                  <a:srgbClr val="FF0000"/>
-                </a:solidFill>
-                <a:latin typeface="Open Sans" pitchFamily="2" charset="0"/>
-                <a:ea typeface="Open Sans" pitchFamily="2" charset="0"/>
-                <a:cs typeface="Open Sans" pitchFamily="2" charset="0"/>
-              </a:rPr>
-              <a:t>text</a:t>
-            </a:r>
-            <a:r>
-              <a:rPr lang="de-DE" sz="1400" dirty="0">
-                <a:solidFill>
-                  <a:srgbClr val="FF0000"/>
-                </a:solidFill>
-                <a:latin typeface="Open Sans" pitchFamily="2" charset="0"/>
-                <a:ea typeface="Open Sans" pitchFamily="2" charset="0"/>
-                <a:cs typeface="Open Sans" pitchFamily="2" charset="0"/>
-              </a:rPr>
-              <a:t> einarbeiten</a:t>
-            </a:r>
-          </a:p>
-        </p:txBody>
-      </p:sp>
-      <p:pic>
-        <p:nvPicPr>
-          <p:cNvPr id="13" name="Grafik 12">
-            <a:extLst>
-              <a:ext uri="{FF2B5EF4-FFF2-40B4-BE49-F238E27FC236}">
-                <a16:creationId xmlns:a16="http://schemas.microsoft.com/office/drawing/2014/main" id="{CC347108-6754-F1A8-2CB6-D37BD94D22E8}"/>
-              </a:ext>
-            </a:extLst>
-          </p:cNvPr>
-          <p:cNvPicPr>
-            <a:picLocks noChangeAspect="1"/>
-          </p:cNvPicPr>
-          <p:nvPr/>
-        </p:nvPicPr>
-        <p:blipFill>
-          <a:blip r:embed="rId4"/>
-          <a:stretch>
-            <a:fillRect/>
-          </a:stretch>
-        </p:blipFill>
-        <p:spPr>
-          <a:xfrm>
-            <a:off x="6096000" y="1159388"/>
-            <a:ext cx="2759790" cy="3469945"/>
-          </a:xfrm>
-          <a:prstGeom prst="rect">
-            <a:avLst/>
-          </a:prstGeom>
-        </p:spPr>
-      </p:pic>
-      <p:pic>
-        <p:nvPicPr>
-          <p:cNvPr id="15" name="Grafik 14">
-            <a:extLst>
-              <a:ext uri="{FF2B5EF4-FFF2-40B4-BE49-F238E27FC236}">
-                <a16:creationId xmlns:a16="http://schemas.microsoft.com/office/drawing/2014/main" id="{980A97F8-154D-7988-9264-5DB38582AAB0}"/>
-              </a:ext>
-            </a:extLst>
-          </p:cNvPr>
-          <p:cNvPicPr>
-            <a:picLocks noChangeAspect="1"/>
-          </p:cNvPicPr>
-          <p:nvPr/>
-        </p:nvPicPr>
-        <p:blipFill>
-          <a:blip r:embed="rId5"/>
-          <a:stretch>
-            <a:fillRect/>
-          </a:stretch>
-        </p:blipFill>
-        <p:spPr>
-          <a:xfrm>
-            <a:off x="8861491" y="1159389"/>
-            <a:ext cx="2916849" cy="3469944"/>
-          </a:xfrm>
-          <a:prstGeom prst="rect">
-            <a:avLst/>
-          </a:prstGeom>
-        </p:spPr>
-      </p:pic>
-      <p:sp>
-        <p:nvSpPr>
-          <p:cNvPr id="16" name="Textfeld 15">
-            <a:extLst>
-              <a:ext uri="{FF2B5EF4-FFF2-40B4-BE49-F238E27FC236}">
-                <a16:creationId xmlns:a16="http://schemas.microsoft.com/office/drawing/2014/main" id="{B79298AC-4E80-9ADF-BC11-5EF0BAD22014}"/>
-              </a:ext>
-            </a:extLst>
-          </p:cNvPr>
-          <p:cNvSpPr txBox="1"/>
-          <p:nvPr/>
-        </p:nvSpPr>
-        <p:spPr>
-          <a:xfrm>
-            <a:off x="6096000" y="4677166"/>
-            <a:ext cx="5682340" cy="307777"/>
-          </a:xfrm>
-          <a:prstGeom prst="rect">
-            <a:avLst/>
-          </a:prstGeom>
-          <a:noFill/>
-        </p:spPr>
-        <p:txBody>
-          <a:bodyPr wrap="square" rtlCol="0">
-            <a:spAutoFit/>
-          </a:bodyPr>
-          <a:lstStyle/>
-          <a:p>
-            <a:r>
-              <a:rPr lang="de-DE" sz="1400" dirty="0">
-                <a:latin typeface="Open Sans" pitchFamily="2" charset="0"/>
-                <a:ea typeface="Open Sans" pitchFamily="2" charset="0"/>
-                <a:cs typeface="Open Sans" pitchFamily="2" charset="0"/>
-              </a:rPr>
-              <a:t>Abb. 3: Darstellung Fenster (links Revit, rechts AutoCAD)</a:t>
-            </a:r>
-          </a:p>
-        </p:txBody>
-      </p:sp>
+        </p:grpSpPr>
+        <p:sp>
+          <p:nvSpPr>
+            <p:cNvPr id="7" name="Textfeld 6">
+              <a:extLst>
+                <a:ext uri="{FF2B5EF4-FFF2-40B4-BE49-F238E27FC236}">
+                  <a16:creationId xmlns:a16="http://schemas.microsoft.com/office/drawing/2014/main" id="{FD0AFF03-4B06-C0CE-165B-039A8F03D682}"/>
+                </a:ext>
+              </a:extLst>
+            </p:cNvPr>
+            <p:cNvSpPr txBox="1"/>
+            <p:nvPr/>
+          </p:nvSpPr>
+          <p:spPr>
+            <a:xfrm>
+              <a:off x="6807431" y="5751870"/>
+              <a:ext cx="4538995" cy="225178"/>
+            </a:xfrm>
+            <a:prstGeom prst="rect">
+              <a:avLst/>
+            </a:prstGeom>
+            <a:noFill/>
+          </p:spPr>
+          <p:txBody>
+            <a:bodyPr wrap="square" rtlCol="0">
+              <a:spAutoFit/>
+            </a:bodyPr>
+            <a:lstStyle/>
+            <a:p>
+              <a:r>
+                <a:rPr lang="de-DE" sz="1400" dirty="0">
+                  <a:latin typeface="Open Sans" pitchFamily="2" charset="0"/>
+                  <a:ea typeface="Open Sans" pitchFamily="2" charset="0"/>
+                  <a:cs typeface="Open Sans" pitchFamily="2" charset="0"/>
+                </a:rPr>
+                <a:t>Abb. 7: Lücke an der Dachkante beim Vordach</a:t>
+              </a:r>
+            </a:p>
+          </p:txBody>
+        </p:sp>
+        <p:pic>
+          <p:nvPicPr>
+            <p:cNvPr id="8" name="Grafik 7">
+              <a:extLst>
+                <a:ext uri="{FF2B5EF4-FFF2-40B4-BE49-F238E27FC236}">
+                  <a16:creationId xmlns:a16="http://schemas.microsoft.com/office/drawing/2014/main" id="{461EAA49-E8CD-12CD-A4EB-DEBF2D116333}"/>
+                </a:ext>
+              </a:extLst>
+            </p:cNvPr>
+            <p:cNvPicPr>
+              <a:picLocks noChangeAspect="1"/>
+            </p:cNvPicPr>
+            <p:nvPr/>
+          </p:nvPicPr>
+          <p:blipFill>
+            <a:blip r:embed="rId3" cstate="print">
+              <a:extLst>
+                <a:ext uri="{28A0092B-C50C-407E-A947-70E740481C1C}">
+                  <a14:useLocalDpi xmlns:a14="http://schemas.microsoft.com/office/drawing/2010/main" val="0"/>
+                </a:ext>
+              </a:extLst>
+            </a:blip>
+            <a:srcRect/>
+            <a:stretch/>
+          </p:blipFill>
+          <p:spPr>
+            <a:xfrm rot="5400000">
+              <a:off x="6716584" y="3343853"/>
+              <a:ext cx="2458772" cy="2064015"/>
+            </a:xfrm>
+            <a:prstGeom prst="rect">
+              <a:avLst/>
+            </a:prstGeom>
+          </p:spPr>
+        </p:pic>
+      </p:grpSp>
     </p:spTree>
     <p:extLst>
       <p:ext uri="{BB962C8B-B14F-4D97-AF65-F5344CB8AC3E}">
-        <p14:creationId xmlns:p14="http://schemas.microsoft.com/office/powerpoint/2010/main" val="130291041"/>
+        <p14:creationId xmlns:p14="http://schemas.microsoft.com/office/powerpoint/2010/main" val="691578019"/>
       </p:ext>
     </p:extLst>
   </p:cSld>
@@ -4948,7 +5134,7 @@
           <p:cNvPr id="2" name="Inhaltsplatzhalter 1">
             <a:extLst>
               <a:ext uri="{FF2B5EF4-FFF2-40B4-BE49-F238E27FC236}">
-                <a16:creationId xmlns:a16="http://schemas.microsoft.com/office/drawing/2014/main" id="{FFC0B4D5-909B-43B4-B2D9-D1960C962473}"/>
+                <a16:creationId xmlns:a16="http://schemas.microsoft.com/office/drawing/2014/main" id="{BF955AA3-35CB-6310-7E4F-95209193670B}"/>
               </a:ext>
             </a:extLst>
           </p:cNvPr>
@@ -4959,120 +5145,52 @@
             <p:ph idx="1"/>
           </p:nvPr>
         </p:nvSpPr>
-        <p:spPr/>
+        <p:spPr>
+          <a:xfrm>
+            <a:off x="527434" y="1233996"/>
+            <a:ext cx="10515600" cy="3993241"/>
+          </a:xfrm>
+        </p:spPr>
         <p:txBody>
           <a:bodyPr/>
           <a:lstStyle/>
           <a:p>
             <a:r>
               <a:rPr lang="de-DE" dirty="0"/>
-              <a:t>Bearbeitung des Modells in Revit und AutoCAD </a:t>
-            </a:r>
-          </a:p>
-          <a:p>
-            <a:r>
-              <a:rPr lang="de-DE" dirty="0"/>
-              <a:t>Export ins STL-Format</a:t>
-            </a:r>
-          </a:p>
-          <a:p>
-            <a:r>
-              <a:rPr lang="de-DE" dirty="0"/>
-              <a:t>Weiterbearbeitung in </a:t>
+              <a:t>Extrusion von Sprossen [Extrusion]</a:t>
+            </a:r>
+          </a:p>
+          <a:p>
+            <a:r>
+              <a:rPr lang="de-DE" dirty="0"/>
+              <a:t>Dreiecke optimieren [Dreiecke trimmen] [Netzverfeinerung]</a:t>
+            </a:r>
+          </a:p>
+          <a:p>
+            <a:r>
+              <a:rPr lang="de-DE" dirty="0"/>
+              <a:t>Reparaturstatus verändern bis nur noch eine Shell und keine Probleme übrig sind [Schrumpffolie] [verschiedene Auto-</a:t>
             </a:r>
             <a:r>
               <a:rPr lang="de-DE" dirty="0" err="1"/>
-              <a:t>Materialise</a:t>
-            </a:r>
-            <a:r>
-              <a:rPr lang="de-DE" dirty="0"/>
-              <a:t> Magics</a:t>
-            </a:r>
-          </a:p>
-          <a:p>
-            <a:pPr marL="800100" lvl="1" indent="-342900">
-              <a:buFont typeface="+mj-lt"/>
-              <a:buAutoNum type="arabicPeriod"/>
-            </a:pPr>
-            <a:r>
-              <a:rPr lang="de-DE" dirty="0"/>
-              <a:t>Fehler beheben</a:t>
-            </a:r>
-          </a:p>
-          <a:p>
-            <a:pPr marL="800100" lvl="1" indent="-342900">
-              <a:buFont typeface="+mj-lt"/>
-              <a:buAutoNum type="arabicPeriod"/>
-            </a:pPr>
-            <a:r>
-              <a:rPr lang="de-DE" dirty="0"/>
-              <a:t>Skalierung </a:t>
-            </a:r>
-          </a:p>
-          <a:p>
-            <a:pPr marL="800100" lvl="1" indent="-342900">
-              <a:buFont typeface="+mj-lt"/>
-              <a:buAutoNum type="arabicPeriod"/>
-            </a:pPr>
-            <a:r>
-              <a:rPr lang="de-DE" dirty="0"/>
-              <a:t>Schnitte erstellen</a:t>
-            </a:r>
-          </a:p>
-          <a:p>
-            <a:pPr marL="800100" lvl="1" indent="-342900">
-              <a:buFont typeface="+mj-lt"/>
-              <a:buAutoNum type="arabicPeriod"/>
-            </a:pPr>
-            <a:r>
-              <a:rPr lang="de-DE" dirty="0"/>
-              <a:t>Schrumpffolie </a:t>
-            </a:r>
-          </a:p>
-          <a:p>
-            <a:pPr marL="800100" lvl="1" indent="-342900">
-              <a:buFont typeface="+mj-lt"/>
-              <a:buAutoNum type="arabicPeriod"/>
-            </a:pPr>
-            <a:r>
-              <a:rPr lang="de-DE" dirty="0"/>
-              <a:t>Modell im Bauraum anordnen</a:t>
-            </a:r>
-          </a:p>
-          <a:p>
-            <a:r>
-              <a:rPr lang="de-DE" dirty="0"/>
-              <a:t>Druck: ca. 20h + 20h Abkühlen </a:t>
-            </a:r>
-            <a:r>
-              <a:rPr lang="de-DE" dirty="0">
-                <a:sym typeface="Wingdings" panose="05000000000000000000" pitchFamily="2" charset="2"/>
-              </a:rPr>
-              <a:t> bis Ende Juni</a:t>
-            </a:r>
-            <a:endParaRPr lang="de-DE" dirty="0"/>
-          </a:p>
-          <a:p>
-            <a:r>
-              <a:rPr lang="de-DE" dirty="0"/>
-              <a:t>danach Entpacken und Reinigen der Bauteile</a:t>
-            </a:r>
-          </a:p>
-          <a:p>
-            <a:endParaRPr lang="de-DE" dirty="0"/>
-          </a:p>
-          <a:p>
-            <a:pPr marL="0" indent="0">
+              <a:t>Repair</a:t>
+            </a:r>
+            <a:r>
+              <a:rPr lang="de-DE" dirty="0"/>
+              <a:t>-Tools]</a:t>
+            </a:r>
+          </a:p>
+          <a:p>
+            <a:r>
+              <a:rPr lang="de-DE" dirty="0"/>
+              <a:t>Um Fehlberechnung der Schrumpffolie zu vermeiden Verdickung des Vordachs [Offset]</a:t>
+            </a:r>
+          </a:p>
+          <a:p>
+            <a:pPr marL="457200" lvl="1" indent="0">
               <a:buNone/>
             </a:pPr>
-            <a:r>
-              <a:rPr lang="de-DE" dirty="0">
-                <a:solidFill>
-                  <a:srgbClr val="FF0000"/>
-                </a:solidFill>
-              </a:rPr>
-              <a:t>Folie rausschmeißen?</a:t>
-            </a:r>
+            <a:endParaRPr lang="de-DE" dirty="0"/>
           </a:p>
         </p:txBody>
       </p:sp>
@@ -5081,7 +5199,7 @@
           <p:cNvPr id="3" name="Titel 2">
             <a:extLst>
               <a:ext uri="{FF2B5EF4-FFF2-40B4-BE49-F238E27FC236}">
-                <a16:creationId xmlns:a16="http://schemas.microsoft.com/office/drawing/2014/main" id="{2F916FFD-816A-458E-A4AB-A32CB6ECF4FA}"/>
+                <a16:creationId xmlns:a16="http://schemas.microsoft.com/office/drawing/2014/main" id="{304C2AF1-1370-3FDB-974B-B116FCA74B54}"/>
               </a:ext>
             </a:extLst>
           </p:cNvPr>
@@ -5099,15 +5217,185 @@
           <a:p>
             <a:r>
               <a:rPr lang="de-DE" dirty="0"/>
-              <a:t>4. Weiterer Zeitplan</a:t>
+              <a:t>3.3 Bearbeitung in Magics</a:t>
             </a:r>
           </a:p>
         </p:txBody>
       </p:sp>
+      <p:grpSp>
+        <p:nvGrpSpPr>
+          <p:cNvPr id="11" name="Gruppieren 10">
+            <a:extLst>
+              <a:ext uri="{FF2B5EF4-FFF2-40B4-BE49-F238E27FC236}">
+                <a16:creationId xmlns:a16="http://schemas.microsoft.com/office/drawing/2014/main" id="{7176E8B1-6AE2-FF96-6263-19507D36DD55}"/>
+              </a:ext>
+            </a:extLst>
+          </p:cNvPr>
+          <p:cNvGrpSpPr/>
+          <p:nvPr/>
+        </p:nvGrpSpPr>
+        <p:grpSpPr>
+          <a:xfrm>
+            <a:off x="4839054" y="2955601"/>
+            <a:ext cx="6203980" cy="3211428"/>
+            <a:chOff x="6282066" y="2897167"/>
+            <a:chExt cx="6203980" cy="3211428"/>
+          </a:xfrm>
+        </p:grpSpPr>
+        <p:grpSp>
+          <p:nvGrpSpPr>
+            <p:cNvPr id="9" name="Gruppieren 8">
+              <a:extLst>
+                <a:ext uri="{FF2B5EF4-FFF2-40B4-BE49-F238E27FC236}">
+                  <a16:creationId xmlns:a16="http://schemas.microsoft.com/office/drawing/2014/main" id="{ABD3C423-B8D0-5A6C-B81F-73BCB066902F}"/>
+                </a:ext>
+              </a:extLst>
+            </p:cNvPr>
+            <p:cNvGrpSpPr/>
+            <p:nvPr/>
+          </p:nvGrpSpPr>
+          <p:grpSpPr>
+            <a:xfrm>
+              <a:off x="6282066" y="2897167"/>
+              <a:ext cx="6203980" cy="3211428"/>
+              <a:chOff x="6672683" y="2018433"/>
+              <a:chExt cx="6203980" cy="3211428"/>
+            </a:xfrm>
+          </p:grpSpPr>
+          <p:sp>
+            <p:nvSpPr>
+              <p:cNvPr id="7" name="Textfeld 6">
+                <a:extLst>
+                  <a:ext uri="{FF2B5EF4-FFF2-40B4-BE49-F238E27FC236}">
+                    <a16:creationId xmlns:a16="http://schemas.microsoft.com/office/drawing/2014/main" id="{FD0AFF03-4B06-C0CE-165B-039A8F03D682}"/>
+                  </a:ext>
+                </a:extLst>
+              </p:cNvPr>
+              <p:cNvSpPr txBox="1"/>
+              <p:nvPr/>
+            </p:nvSpPr>
+            <p:spPr>
+              <a:xfrm>
+                <a:off x="6672683" y="4922084"/>
+                <a:ext cx="6203980" cy="307777"/>
+              </a:xfrm>
+              <a:prstGeom prst="rect">
+                <a:avLst/>
+              </a:prstGeom>
+              <a:noFill/>
+            </p:spPr>
+            <p:txBody>
+              <a:bodyPr wrap="square" rtlCol="0">
+                <a:spAutoFit/>
+              </a:bodyPr>
+              <a:lstStyle/>
+              <a:p>
+                <a:r>
+                  <a:rPr lang="de-DE" sz="1400" dirty="0">
+                    <a:latin typeface="Open Sans" pitchFamily="2" charset="0"/>
+                    <a:ea typeface="Open Sans" pitchFamily="2" charset="0"/>
+                    <a:cs typeface="Open Sans" pitchFamily="2" charset="0"/>
+                  </a:rPr>
+                  <a:t>Abb. 8: Extrusion von Sprossen</a:t>
+                </a:r>
+              </a:p>
+            </p:txBody>
+          </p:sp>
+          <p:pic>
+            <p:nvPicPr>
+              <p:cNvPr id="8" name="Grafik 7">
+                <a:extLst>
+                  <a:ext uri="{FF2B5EF4-FFF2-40B4-BE49-F238E27FC236}">
+                    <a16:creationId xmlns:a16="http://schemas.microsoft.com/office/drawing/2014/main" id="{461EAA49-E8CD-12CD-A4EB-DEBF2D116333}"/>
+                  </a:ext>
+                </a:extLst>
+              </p:cNvPr>
+              <p:cNvPicPr>
+                <a:picLocks noChangeAspect="1"/>
+              </p:cNvPicPr>
+              <p:nvPr/>
+            </p:nvPicPr>
+            <p:blipFill>
+              <a:blip r:embed="rId3" cstate="print">
+                <a:extLst>
+                  <a:ext uri="{28A0092B-C50C-407E-A947-70E740481C1C}">
+                    <a14:useLocalDpi xmlns:a14="http://schemas.microsoft.com/office/drawing/2010/main" val="0"/>
+                  </a:ext>
+                </a:extLst>
+              </a:blip>
+              <a:srcRect/>
+              <a:stretch/>
+            </p:blipFill>
+            <p:spPr>
+              <a:xfrm>
+                <a:off x="6672683" y="2018433"/>
+                <a:ext cx="2334595" cy="2821133"/>
+              </a:xfrm>
+              <a:prstGeom prst="rect">
+                <a:avLst/>
+              </a:prstGeom>
+            </p:spPr>
+          </p:pic>
+        </p:grpSp>
+        <p:sp>
+          <p:nvSpPr>
+            <p:cNvPr id="10" name="Ellipse 9">
+              <a:extLst>
+                <a:ext uri="{FF2B5EF4-FFF2-40B4-BE49-F238E27FC236}">
+                  <a16:creationId xmlns:a16="http://schemas.microsoft.com/office/drawing/2014/main" id="{7FEEDD29-13C0-4FB0-CDBE-51630521AF11}"/>
+                </a:ext>
+              </a:extLst>
+            </p:cNvPr>
+            <p:cNvSpPr/>
+            <p:nvPr/>
+          </p:nvSpPr>
+          <p:spPr>
+            <a:xfrm>
+              <a:off x="7501631" y="3357978"/>
+              <a:ext cx="443884" cy="443884"/>
+            </a:xfrm>
+            <a:prstGeom prst="ellipse">
+              <a:avLst/>
+            </a:prstGeom>
+            <a:noFill/>
+            <a:ln w="28575" cap="flat" cmpd="sng" algn="ctr">
+              <a:solidFill>
+                <a:schemeClr val="accent1"/>
+              </a:solidFill>
+              <a:prstDash val="solid"/>
+              <a:round/>
+              <a:headEnd type="none" w="med" len="med"/>
+              <a:tailEnd type="none" w="med" len="med"/>
+            </a:ln>
+          </p:spPr>
+          <p:style>
+            <a:lnRef idx="0">
+              <a:scrgbClr r="0" g="0" b="0"/>
+            </a:lnRef>
+            <a:fillRef idx="0">
+              <a:scrgbClr r="0" g="0" b="0"/>
+            </a:fillRef>
+            <a:effectRef idx="0">
+              <a:scrgbClr r="0" g="0" b="0"/>
+            </a:effectRef>
+            <a:fontRef idx="minor">
+              <a:schemeClr val="accent1"/>
+            </a:fontRef>
+          </p:style>
+          <p:txBody>
+            <a:bodyPr rtlCol="0" anchor="ctr"/>
+            <a:lstStyle/>
+            <a:p>
+              <a:pPr algn="ctr"/>
+              <a:endParaRPr lang="de-DE"/>
+            </a:p>
+          </p:txBody>
+        </p:sp>
+      </p:grpSp>
     </p:spTree>
     <p:extLst>
       <p:ext uri="{BB962C8B-B14F-4D97-AF65-F5344CB8AC3E}">
-        <p14:creationId xmlns:p14="http://schemas.microsoft.com/office/powerpoint/2010/main" val="2177359727"/>
+        <p14:creationId xmlns:p14="http://schemas.microsoft.com/office/powerpoint/2010/main" val="3435762078"/>
       </p:ext>
     </p:extLst>
   </p:cSld>
@@ -5156,33 +5444,33 @@
           <a:lstStyle/>
           <a:p>
             <a:r>
-              <a:rPr lang="de-DE" dirty="0">
-                <a:solidFill>
-                  <a:srgbClr val="FF0000"/>
-                </a:solidFill>
-              </a:rPr>
-              <a:t>Fehler bei Verteilung des Materials</a:t>
-            </a:r>
-          </a:p>
-          <a:p>
-            <a:r>
-              <a:rPr lang="de-DE" dirty="0">
-                <a:solidFill>
-                  <a:srgbClr val="FF0000"/>
-                </a:solidFill>
-              </a:rPr>
-              <a:t> Auspacken Bauraum</a:t>
-            </a:r>
-          </a:p>
-          <a:p>
-            <a:r>
-              <a:rPr lang="de-DE" dirty="0">
-                <a:solidFill>
-                  <a:srgbClr val="FF0000"/>
-                </a:solidFill>
-              </a:rPr>
-              <a:t>Einschätzung Qualität Probedruck</a:t>
-            </a:r>
+              <a:rPr lang="de-DE" dirty="0"/>
+              <a:t>FORMIGA P110 von Firma EOS GmbH</a:t>
+            </a:r>
+          </a:p>
+          <a:p>
+            <a:pPr lvl="1"/>
+            <a:r>
+              <a:rPr lang="de-DE" dirty="0"/>
+              <a:t>Selektiver Laser-Sinter-Drucker</a:t>
+            </a:r>
+          </a:p>
+          <a:p>
+            <a:pPr lvl="1"/>
+            <a:r>
+              <a:rPr lang="de-DE" dirty="0"/>
+              <a:t>Bauraumgröße 200 x 250 x 330 mm</a:t>
+            </a:r>
+          </a:p>
+          <a:p>
+            <a:pPr lvl="1"/>
+            <a:endParaRPr lang="de-DE" dirty="0"/>
+          </a:p>
+          <a:p>
+            <a:pPr marL="457200" lvl="1" indent="0">
+              <a:buNone/>
+            </a:pPr>
+            <a:endParaRPr lang="de-DE" dirty="0"/>
           </a:p>
         </p:txBody>
       </p:sp>
@@ -5209,7 +5497,427 @@
           <a:p>
             <a:r>
               <a:rPr lang="de-DE" dirty="0"/>
-              <a:t>4.1 Druckprozess - Probedruck</a:t>
+              <a:t>4.1 Drucker</a:t>
+            </a:r>
+          </a:p>
+        </p:txBody>
+      </p:sp>
+      <p:grpSp>
+        <p:nvGrpSpPr>
+          <p:cNvPr id="6" name="Gruppieren 5">
+            <a:extLst>
+              <a:ext uri="{FF2B5EF4-FFF2-40B4-BE49-F238E27FC236}">
+                <a16:creationId xmlns:a16="http://schemas.microsoft.com/office/drawing/2014/main" id="{3B81E447-BF11-4B96-0AC3-D57F9F0DB116}"/>
+              </a:ext>
+            </a:extLst>
+          </p:cNvPr>
+          <p:cNvGrpSpPr/>
+          <p:nvPr/>
+        </p:nvGrpSpPr>
+        <p:grpSpPr>
+          <a:xfrm>
+            <a:off x="5839765" y="1394942"/>
+            <a:ext cx="4538995" cy="4068116"/>
+            <a:chOff x="6807431" y="1991531"/>
+            <a:chExt cx="4538995" cy="4068116"/>
+          </a:xfrm>
+        </p:grpSpPr>
+        <p:sp>
+          <p:nvSpPr>
+            <p:cNvPr id="7" name="Textfeld 6">
+              <a:extLst>
+                <a:ext uri="{FF2B5EF4-FFF2-40B4-BE49-F238E27FC236}">
+                  <a16:creationId xmlns:a16="http://schemas.microsoft.com/office/drawing/2014/main" id="{F3BE429E-F222-2E78-4835-80565A5FFD69}"/>
+                </a:ext>
+              </a:extLst>
+            </p:cNvPr>
+            <p:cNvSpPr txBox="1"/>
+            <p:nvPr/>
+          </p:nvSpPr>
+          <p:spPr>
+            <a:xfrm>
+              <a:off x="6807431" y="5751870"/>
+              <a:ext cx="4538995" cy="307777"/>
+            </a:xfrm>
+            <a:prstGeom prst="rect">
+              <a:avLst/>
+            </a:prstGeom>
+            <a:noFill/>
+          </p:spPr>
+          <p:txBody>
+            <a:bodyPr wrap="square" rtlCol="0">
+              <a:spAutoFit/>
+            </a:bodyPr>
+            <a:lstStyle/>
+            <a:p>
+              <a:r>
+                <a:rPr lang="de-DE" sz="1400" dirty="0">
+                  <a:latin typeface="Open Sans" pitchFamily="2" charset="0"/>
+                  <a:ea typeface="Open Sans" pitchFamily="2" charset="0"/>
+                  <a:cs typeface="Open Sans" pitchFamily="2" charset="0"/>
+                </a:rPr>
+                <a:t>Abb. 9: ursprüngliches Modell in Revit</a:t>
+              </a:r>
+            </a:p>
+          </p:txBody>
+        </p:sp>
+        <p:pic>
+          <p:nvPicPr>
+            <p:cNvPr id="8" name="Grafik 7">
+              <a:extLst>
+                <a:ext uri="{FF2B5EF4-FFF2-40B4-BE49-F238E27FC236}">
+                  <a16:creationId xmlns:a16="http://schemas.microsoft.com/office/drawing/2014/main" id="{0399B5CE-E42E-57E4-30C4-6B12BE0CDAFC}"/>
+                </a:ext>
+              </a:extLst>
+            </p:cNvPr>
+            <p:cNvPicPr>
+              <a:picLocks noChangeAspect="1"/>
+            </p:cNvPicPr>
+            <p:nvPr/>
+          </p:nvPicPr>
+          <p:blipFill>
+            <a:blip r:embed="rId2">
+              <a:extLst>
+                <a:ext uri="{28A0092B-C50C-407E-A947-70E740481C1C}">
+                  <a14:useLocalDpi xmlns:a14="http://schemas.microsoft.com/office/drawing/2010/main" val="0"/>
+                </a:ext>
+              </a:extLst>
+            </a:blip>
+            <a:srcRect/>
+            <a:stretch/>
+          </p:blipFill>
+          <p:spPr>
+            <a:xfrm>
+              <a:off x="6925198" y="1991531"/>
+              <a:ext cx="3071057" cy="3760339"/>
+            </a:xfrm>
+            <a:prstGeom prst="rect">
+              <a:avLst/>
+            </a:prstGeom>
+          </p:spPr>
+        </p:pic>
+      </p:grpSp>
+    </p:spTree>
+    <p:extLst>
+      <p:ext uri="{BB962C8B-B14F-4D97-AF65-F5344CB8AC3E}">
+        <p14:creationId xmlns:p14="http://schemas.microsoft.com/office/powerpoint/2010/main" val="2177359727"/>
+      </p:ext>
+    </p:extLst>
+  </p:cSld>
+  <p:clrMapOvr>
+    <a:masterClrMapping/>
+  </p:clrMapOvr>
+</p:sld>
+</file>
+
+<file path=ppt/slides/slide13.xml><?xml version="1.0" encoding="utf-8"?>
+<p:sld xmlns:a="http://schemas.openxmlformats.org/drawingml/2006/main" xmlns:r="http://schemas.openxmlformats.org/officeDocument/2006/relationships" xmlns:p="http://schemas.openxmlformats.org/presentationml/2006/main">
+  <p:cSld>
+    <p:spTree>
+      <p:nvGrpSpPr>
+        <p:cNvPr id="1" name=""/>
+        <p:cNvGrpSpPr/>
+        <p:nvPr/>
+      </p:nvGrpSpPr>
+      <p:grpSpPr>
+        <a:xfrm>
+          <a:off x="0" y="0"/>
+          <a:ext cx="0" cy="0"/>
+          <a:chOff x="0" y="0"/>
+          <a:chExt cx="0" cy="0"/>
+        </a:xfrm>
+      </p:grpSpPr>
+      <p:sp>
+        <p:nvSpPr>
+          <p:cNvPr id="2" name="Inhaltsplatzhalter 1">
+            <a:extLst>
+              <a:ext uri="{FF2B5EF4-FFF2-40B4-BE49-F238E27FC236}">
+                <a16:creationId xmlns:a16="http://schemas.microsoft.com/office/drawing/2014/main" id="{FFC0B4D5-909B-43B4-B2D9-D1960C962473}"/>
+              </a:ext>
+            </a:extLst>
+          </p:cNvPr>
+          <p:cNvSpPr>
+            <a:spLocks noGrp="1"/>
+          </p:cNvSpPr>
+          <p:nvPr>
+            <p:ph idx="1"/>
+          </p:nvPr>
+        </p:nvSpPr>
+        <p:spPr/>
+        <p:txBody>
+          <a:bodyPr/>
+          <a:lstStyle/>
+          <a:p>
+            <a:r>
+              <a:rPr lang="de-DE" dirty="0">
+                <a:sym typeface="Wingdings" panose="05000000000000000000" pitchFamily="2" charset="2"/>
+              </a:rPr>
+              <a:t>Modell zu groß um in idealer Pose im Bauraum angeordnet zu werden </a:t>
+            </a:r>
+          </a:p>
+          <a:p>
+            <a:pPr lvl="1"/>
+            <a:r>
+              <a:rPr lang="de-DE" dirty="0">
+                <a:sym typeface="Wingdings" panose="05000000000000000000" pitchFamily="2" charset="2"/>
+              </a:rPr>
+              <a:t>Modell musste Vertikal gedruckt werden</a:t>
+            </a:r>
+          </a:p>
+          <a:p>
+            <a:r>
+              <a:rPr lang="de-DE" dirty="0"/>
+              <a:t>Feuerleiter nicht am Modell gedruckt um Schnitte zu vermeiden</a:t>
+            </a:r>
+          </a:p>
+          <a:p>
+            <a:endParaRPr lang="de-DE" dirty="0"/>
+          </a:p>
+          <a:p>
+            <a:pPr marL="457200" lvl="1" indent="0">
+              <a:buNone/>
+            </a:pPr>
+            <a:endParaRPr lang="de-DE" dirty="0"/>
+          </a:p>
+        </p:txBody>
+      </p:sp>
+      <p:sp>
+        <p:nvSpPr>
+          <p:cNvPr id="3" name="Titel 2">
+            <a:extLst>
+              <a:ext uri="{FF2B5EF4-FFF2-40B4-BE49-F238E27FC236}">
+                <a16:creationId xmlns:a16="http://schemas.microsoft.com/office/drawing/2014/main" id="{2F916FFD-816A-458E-A4AB-A32CB6ECF4FA}"/>
+              </a:ext>
+            </a:extLst>
+          </p:cNvPr>
+          <p:cNvSpPr>
+            <a:spLocks noGrp="1"/>
+          </p:cNvSpPr>
+          <p:nvPr>
+            <p:ph type="title"/>
+          </p:nvPr>
+        </p:nvSpPr>
+        <p:spPr/>
+        <p:txBody>
+          <a:bodyPr/>
+          <a:lstStyle/>
+          <a:p>
+            <a:r>
+              <a:rPr lang="de-DE" dirty="0"/>
+              <a:t>4.2 Anordnung im Bauraum</a:t>
+            </a:r>
+          </a:p>
+        </p:txBody>
+      </p:sp>
+      <p:grpSp>
+        <p:nvGrpSpPr>
+          <p:cNvPr id="4" name="Gruppieren 3">
+            <a:extLst>
+              <a:ext uri="{FF2B5EF4-FFF2-40B4-BE49-F238E27FC236}">
+                <a16:creationId xmlns:a16="http://schemas.microsoft.com/office/drawing/2014/main" id="{D304ACB2-CF4D-42AB-6137-41BCF6742B88}"/>
+              </a:ext>
+            </a:extLst>
+          </p:cNvPr>
+          <p:cNvGrpSpPr/>
+          <p:nvPr/>
+        </p:nvGrpSpPr>
+        <p:grpSpPr>
+          <a:xfrm>
+            <a:off x="8503066" y="1458207"/>
+            <a:ext cx="4538995" cy="4068116"/>
+            <a:chOff x="6807431" y="1991531"/>
+            <a:chExt cx="4538995" cy="4068116"/>
+          </a:xfrm>
+        </p:grpSpPr>
+        <p:sp>
+          <p:nvSpPr>
+            <p:cNvPr id="5" name="Textfeld 4">
+              <a:extLst>
+                <a:ext uri="{FF2B5EF4-FFF2-40B4-BE49-F238E27FC236}">
+                  <a16:creationId xmlns:a16="http://schemas.microsoft.com/office/drawing/2014/main" id="{3B0839CF-DE7F-FB66-267F-BEC768BDDB70}"/>
+                </a:ext>
+              </a:extLst>
+            </p:cNvPr>
+            <p:cNvSpPr txBox="1"/>
+            <p:nvPr/>
+          </p:nvSpPr>
+          <p:spPr>
+            <a:xfrm>
+              <a:off x="6807431" y="5751870"/>
+              <a:ext cx="4538995" cy="307777"/>
+            </a:xfrm>
+            <a:prstGeom prst="rect">
+              <a:avLst/>
+            </a:prstGeom>
+            <a:noFill/>
+          </p:spPr>
+          <p:txBody>
+            <a:bodyPr wrap="square" rtlCol="0">
+              <a:spAutoFit/>
+            </a:bodyPr>
+            <a:lstStyle/>
+            <a:p>
+              <a:r>
+                <a:rPr lang="de-DE" sz="1400" dirty="0">
+                  <a:latin typeface="Open Sans" pitchFamily="2" charset="0"/>
+                  <a:ea typeface="Open Sans" pitchFamily="2" charset="0"/>
+                  <a:cs typeface="Open Sans" pitchFamily="2" charset="0"/>
+                </a:rPr>
+                <a:t>Abb. 10: Bauraum nach Probedruck</a:t>
+              </a:r>
+            </a:p>
+          </p:txBody>
+        </p:sp>
+        <p:pic>
+          <p:nvPicPr>
+            <p:cNvPr id="9" name="Grafik 8">
+              <a:extLst>
+                <a:ext uri="{FF2B5EF4-FFF2-40B4-BE49-F238E27FC236}">
+                  <a16:creationId xmlns:a16="http://schemas.microsoft.com/office/drawing/2014/main" id="{457CB689-AD38-8AA7-2926-A38D51568CD5}"/>
+                </a:ext>
+              </a:extLst>
+            </p:cNvPr>
+            <p:cNvPicPr>
+              <a:picLocks noChangeAspect="1"/>
+            </p:cNvPicPr>
+            <p:nvPr/>
+          </p:nvPicPr>
+          <p:blipFill>
+            <a:blip r:embed="rId2" cstate="print">
+              <a:extLst>
+                <a:ext uri="{28A0092B-C50C-407E-A947-70E740481C1C}">
+                  <a14:useLocalDpi xmlns:a14="http://schemas.microsoft.com/office/drawing/2010/main" val="0"/>
+                </a:ext>
+              </a:extLst>
+            </a:blip>
+            <a:srcRect/>
+            <a:stretch/>
+          </p:blipFill>
+          <p:spPr>
+            <a:xfrm rot="5400000">
+              <a:off x="6337388" y="2461574"/>
+              <a:ext cx="3760339" cy="2820254"/>
+            </a:xfrm>
+            <a:prstGeom prst="rect">
+              <a:avLst/>
+            </a:prstGeom>
+          </p:spPr>
+        </p:pic>
+      </p:grpSp>
+    </p:spTree>
+    <p:extLst>
+      <p:ext uri="{BB962C8B-B14F-4D97-AF65-F5344CB8AC3E}">
+        <p14:creationId xmlns:p14="http://schemas.microsoft.com/office/powerpoint/2010/main" val="3012904312"/>
+      </p:ext>
+    </p:extLst>
+  </p:cSld>
+  <p:clrMapOvr>
+    <a:masterClrMapping/>
+  </p:clrMapOvr>
+</p:sld>
+</file>
+
+<file path=ppt/slides/slide14.xml><?xml version="1.0" encoding="utf-8"?>
+<p:sld xmlns:a="http://schemas.openxmlformats.org/drawingml/2006/main" xmlns:r="http://schemas.openxmlformats.org/officeDocument/2006/relationships" xmlns:p="http://schemas.openxmlformats.org/presentationml/2006/main">
+  <p:cSld>
+    <p:spTree>
+      <p:nvGrpSpPr>
+        <p:cNvPr id="1" name=""/>
+        <p:cNvGrpSpPr/>
+        <p:nvPr/>
+      </p:nvGrpSpPr>
+      <p:grpSpPr>
+        <a:xfrm>
+          <a:off x="0" y="0"/>
+          <a:ext cx="0" cy="0"/>
+          <a:chOff x="0" y="0"/>
+          <a:chExt cx="0" cy="0"/>
+        </a:xfrm>
+      </p:grpSpPr>
+      <p:sp>
+        <p:nvSpPr>
+          <p:cNvPr id="2" name="Inhaltsplatzhalter 1">
+            <a:extLst>
+              <a:ext uri="{FF2B5EF4-FFF2-40B4-BE49-F238E27FC236}">
+                <a16:creationId xmlns:a16="http://schemas.microsoft.com/office/drawing/2014/main" id="{FFC0B4D5-909B-43B4-B2D9-D1960C962473}"/>
+              </a:ext>
+            </a:extLst>
+          </p:cNvPr>
+          <p:cNvSpPr>
+            <a:spLocks noGrp="1"/>
+          </p:cNvSpPr>
+          <p:nvPr>
+            <p:ph idx="1"/>
+          </p:nvPr>
+        </p:nvSpPr>
+        <p:spPr/>
+        <p:txBody>
+          <a:bodyPr/>
+          <a:lstStyle/>
+          <a:p>
+            <a:r>
+              <a:rPr lang="de-DE" dirty="0"/>
+              <a:t>Fehler bei Verteilung des Materials</a:t>
+            </a:r>
+          </a:p>
+          <a:p>
+            <a:r>
+              <a:rPr lang="de-DE" dirty="0"/>
+              <a:t> Druckzeit 13 h</a:t>
+            </a:r>
+          </a:p>
+          <a:p>
+            <a:r>
+              <a:rPr lang="de-DE" dirty="0"/>
+              <a:t>Auspacken Bauraum nach 29 h </a:t>
+            </a:r>
+          </a:p>
+          <a:p>
+            <a:pPr lvl="1"/>
+            <a:r>
+              <a:rPr lang="de-DE" dirty="0"/>
+              <a:t>Auskühlzeit 16 h</a:t>
+            </a:r>
+          </a:p>
+          <a:p>
+            <a:pPr lvl="1"/>
+            <a:r>
+              <a:rPr lang="de-DE" dirty="0"/>
+              <a:t>Abgebrochene Sprossen an Außenfassade</a:t>
+            </a:r>
+          </a:p>
+          <a:p>
+            <a:r>
+              <a:rPr lang="de-DE" dirty="0"/>
+              <a:t>Freigabe für finalen Druck</a:t>
+            </a:r>
+          </a:p>
+        </p:txBody>
+      </p:sp>
+      <p:sp>
+        <p:nvSpPr>
+          <p:cNvPr id="3" name="Titel 2">
+            <a:extLst>
+              <a:ext uri="{FF2B5EF4-FFF2-40B4-BE49-F238E27FC236}">
+                <a16:creationId xmlns:a16="http://schemas.microsoft.com/office/drawing/2014/main" id="{2F916FFD-816A-458E-A4AB-A32CB6ECF4FA}"/>
+              </a:ext>
+            </a:extLst>
+          </p:cNvPr>
+          <p:cNvSpPr>
+            <a:spLocks noGrp="1"/>
+          </p:cNvSpPr>
+          <p:nvPr>
+            <p:ph type="title"/>
+          </p:nvPr>
+        </p:nvSpPr>
+        <p:spPr/>
+        <p:txBody>
+          <a:bodyPr/>
+          <a:lstStyle/>
+          <a:p>
+            <a:r>
+              <a:rPr lang="de-DE" dirty="0"/>
+              <a:t>4.3 Probedruck</a:t>
             </a:r>
           </a:p>
         </p:txBody>
@@ -5228,7 +5936,7 @@
         </p:nvGrpSpPr>
         <p:grpSpPr>
           <a:xfrm>
-            <a:off x="5181235" y="1243197"/>
+            <a:off x="5714176" y="1243198"/>
             <a:ext cx="6203980" cy="4069286"/>
             <a:chOff x="8033077" y="794454"/>
             <a:chExt cx="6203980" cy="4069286"/>
@@ -5288,26 +5996,7 @@
                     <a:ea typeface="Open Sans" pitchFamily="2" charset="0"/>
                     <a:cs typeface="Open Sans" pitchFamily="2" charset="0"/>
                   </a:rPr>
-                  <a:t>Abb. </a:t>
-                </a:r>
-                <a:r>
-                  <a:rPr lang="de-DE" sz="1400" dirty="0">
-                    <a:solidFill>
-                      <a:srgbClr val="FF0000"/>
-                    </a:solidFill>
-                    <a:latin typeface="Open Sans" pitchFamily="2" charset="0"/>
-                    <a:ea typeface="Open Sans" pitchFamily="2" charset="0"/>
-                    <a:cs typeface="Open Sans" pitchFamily="2" charset="0"/>
-                  </a:rPr>
-                  <a:t>XX</a:t>
-                </a:r>
-                <a:r>
-                  <a:rPr lang="de-DE" sz="1400" dirty="0">
-                    <a:latin typeface="Open Sans" pitchFamily="2" charset="0"/>
-                    <a:ea typeface="Open Sans" pitchFamily="2" charset="0"/>
-                    <a:cs typeface="Open Sans" pitchFamily="2" charset="0"/>
-                  </a:rPr>
-                  <a:t>: Fehler bei Materialverteilung</a:t>
+                  <a:t>Abb. 11: Fehler bei Materialverteilung</a:t>
                 </a:r>
               </a:p>
             </p:txBody>
@@ -5369,7 +6058,7 @@
               <a:avLst/>
             </a:prstGeom>
             <a:noFill/>
-            <a:ln w="9525" cap="flat" cmpd="sng" algn="ctr">
+            <a:ln w="28575" cap="flat" cmpd="sng" algn="ctr">
               <a:solidFill>
                 <a:schemeClr val="accent1"/>
               </a:solidFill>
@@ -5417,7 +6106,7 @@
         </p:nvGrpSpPr>
         <p:grpSpPr>
           <a:xfrm>
-            <a:off x="8524947" y="1243198"/>
+            <a:off x="9122102" y="1243199"/>
             <a:ext cx="6203980" cy="4069285"/>
             <a:chOff x="6807431" y="2999851"/>
             <a:chExt cx="4538995" cy="2977197"/>
@@ -5457,26 +6146,7 @@
                   <a:ea typeface="Open Sans" pitchFamily="2" charset="0"/>
                   <a:cs typeface="Open Sans" pitchFamily="2" charset="0"/>
                 </a:rPr>
-                <a:t>Abb. </a:t>
-              </a:r>
-              <a:r>
-                <a:rPr lang="de-DE" sz="1400" dirty="0">
-                  <a:solidFill>
-                    <a:srgbClr val="FF0000"/>
-                  </a:solidFill>
-                  <a:latin typeface="Open Sans" pitchFamily="2" charset="0"/>
-                  <a:ea typeface="Open Sans" pitchFamily="2" charset="0"/>
-                  <a:cs typeface="Open Sans" pitchFamily="2" charset="0"/>
-                </a:rPr>
-                <a:t>XX</a:t>
-              </a:r>
-              <a:r>
-                <a:rPr lang="de-DE" sz="1400" dirty="0">
-                  <a:latin typeface="Open Sans" pitchFamily="2" charset="0"/>
-                  <a:ea typeface="Open Sans" pitchFamily="2" charset="0"/>
-                  <a:cs typeface="Open Sans" pitchFamily="2" charset="0"/>
-                </a:rPr>
-                <a:t>: Auspacken Probedruck</a:t>
+                <a:t>Abb. 12: Auspacken Probedruck</a:t>
               </a:r>
             </a:p>
           </p:txBody>
@@ -5530,6 +6200,1345 @@
 </p:sld>
 </file>
 
+<file path=ppt/slides/slide15.xml><?xml version="1.0" encoding="utf-8"?>
+<p:sld xmlns:a="http://schemas.openxmlformats.org/drawingml/2006/main" xmlns:r="http://schemas.openxmlformats.org/officeDocument/2006/relationships" xmlns:p="http://schemas.openxmlformats.org/presentationml/2006/main">
+  <p:cSld>
+    <p:spTree>
+      <p:nvGrpSpPr>
+        <p:cNvPr id="1" name=""/>
+        <p:cNvGrpSpPr/>
+        <p:nvPr/>
+      </p:nvGrpSpPr>
+      <p:grpSpPr>
+        <a:xfrm>
+          <a:off x="0" y="0"/>
+          <a:ext cx="0" cy="0"/>
+          <a:chOff x="0" y="0"/>
+          <a:chExt cx="0" cy="0"/>
+        </a:xfrm>
+      </p:grpSpPr>
+      <p:sp>
+        <p:nvSpPr>
+          <p:cNvPr id="3" name="Titel 2">
+            <a:extLst>
+              <a:ext uri="{FF2B5EF4-FFF2-40B4-BE49-F238E27FC236}">
+                <a16:creationId xmlns:a16="http://schemas.microsoft.com/office/drawing/2014/main" id="{2F916FFD-816A-458E-A4AB-A32CB6ECF4FA}"/>
+              </a:ext>
+            </a:extLst>
+          </p:cNvPr>
+          <p:cNvSpPr>
+            <a:spLocks noGrp="1"/>
+          </p:cNvSpPr>
+          <p:nvPr>
+            <p:ph type="title"/>
+          </p:nvPr>
+        </p:nvSpPr>
+        <p:spPr/>
+        <p:txBody>
+          <a:bodyPr/>
+          <a:lstStyle/>
+          <a:p>
+            <a:r>
+              <a:rPr lang="de-DE" dirty="0"/>
+              <a:t>4.3 Probedruck</a:t>
+            </a:r>
+          </a:p>
+        </p:txBody>
+      </p:sp>
+      <p:grpSp>
+        <p:nvGrpSpPr>
+          <p:cNvPr id="7" name="Gruppieren 6">
+            <a:extLst>
+              <a:ext uri="{FF2B5EF4-FFF2-40B4-BE49-F238E27FC236}">
+                <a16:creationId xmlns:a16="http://schemas.microsoft.com/office/drawing/2014/main" id="{03B9D122-38F6-3A87-BA0F-7DB7706AC073}"/>
+              </a:ext>
+            </a:extLst>
+          </p:cNvPr>
+          <p:cNvGrpSpPr/>
+          <p:nvPr/>
+        </p:nvGrpSpPr>
+        <p:grpSpPr>
+          <a:xfrm>
+            <a:off x="700312" y="1137837"/>
+            <a:ext cx="6203980" cy="3604967"/>
+            <a:chOff x="316834" y="1858676"/>
+            <a:chExt cx="6203980" cy="3604967"/>
+          </a:xfrm>
+        </p:grpSpPr>
+        <p:sp>
+          <p:nvSpPr>
+            <p:cNvPr id="5" name="Textfeld 4">
+              <a:extLst>
+                <a:ext uri="{FF2B5EF4-FFF2-40B4-BE49-F238E27FC236}">
+                  <a16:creationId xmlns:a16="http://schemas.microsoft.com/office/drawing/2014/main" id="{6B92C27C-39E9-BE94-71E1-E9571547C89B}"/>
+                </a:ext>
+              </a:extLst>
+            </p:cNvPr>
+            <p:cNvSpPr txBox="1"/>
+            <p:nvPr/>
+          </p:nvSpPr>
+          <p:spPr>
+            <a:xfrm>
+              <a:off x="316834" y="5155866"/>
+              <a:ext cx="6203980" cy="307777"/>
+            </a:xfrm>
+            <a:prstGeom prst="rect">
+              <a:avLst/>
+            </a:prstGeom>
+            <a:noFill/>
+          </p:spPr>
+          <p:txBody>
+            <a:bodyPr wrap="square" rtlCol="0">
+              <a:spAutoFit/>
+            </a:bodyPr>
+            <a:lstStyle/>
+            <a:p>
+              <a:r>
+                <a:rPr lang="de-DE" sz="1400" dirty="0">
+                  <a:latin typeface="Open Sans" pitchFamily="2" charset="0"/>
+                  <a:ea typeface="Open Sans" pitchFamily="2" charset="0"/>
+                  <a:cs typeface="Open Sans" pitchFamily="2" charset="0"/>
+                </a:rPr>
+                <a:t>Abb. 13: Probedruck Dach</a:t>
+              </a:r>
+            </a:p>
+          </p:txBody>
+        </p:sp>
+        <p:pic>
+          <p:nvPicPr>
+            <p:cNvPr id="6" name="Grafik 5">
+              <a:extLst>
+                <a:ext uri="{FF2B5EF4-FFF2-40B4-BE49-F238E27FC236}">
+                  <a16:creationId xmlns:a16="http://schemas.microsoft.com/office/drawing/2014/main" id="{857FC714-A27E-4CCC-C164-C1FA8B5DF30C}"/>
+                </a:ext>
+              </a:extLst>
+            </p:cNvPr>
+            <p:cNvPicPr>
+              <a:picLocks noChangeAspect="1"/>
+            </p:cNvPicPr>
+            <p:nvPr/>
+          </p:nvPicPr>
+          <p:blipFill>
+            <a:blip r:embed="rId2" cstate="print">
+              <a:extLst>
+                <a:ext uri="{28A0092B-C50C-407E-A947-70E740481C1C}">
+                  <a14:useLocalDpi xmlns:a14="http://schemas.microsoft.com/office/drawing/2010/main" val="0"/>
+                </a:ext>
+              </a:extLst>
+            </a:blip>
+            <a:srcRect/>
+            <a:stretch/>
+          </p:blipFill>
+          <p:spPr>
+            <a:xfrm>
+              <a:off x="316834" y="1858676"/>
+              <a:ext cx="2466453" cy="3297190"/>
+            </a:xfrm>
+            <a:prstGeom prst="rect">
+              <a:avLst/>
+            </a:prstGeom>
+          </p:spPr>
+        </p:pic>
+      </p:grpSp>
+      <p:grpSp>
+        <p:nvGrpSpPr>
+          <p:cNvPr id="11" name="Gruppieren 10">
+            <a:extLst>
+              <a:ext uri="{FF2B5EF4-FFF2-40B4-BE49-F238E27FC236}">
+                <a16:creationId xmlns:a16="http://schemas.microsoft.com/office/drawing/2014/main" id="{48522FC5-1395-BC1C-CDF2-6574D9E1A69B}"/>
+              </a:ext>
+            </a:extLst>
+          </p:cNvPr>
+          <p:cNvGrpSpPr/>
+          <p:nvPr/>
+        </p:nvGrpSpPr>
+        <p:grpSpPr>
+          <a:xfrm>
+            <a:off x="3520867" y="1621243"/>
+            <a:ext cx="6203980" cy="3121561"/>
+            <a:chOff x="6789885" y="3693230"/>
+            <a:chExt cx="4538995" cy="2283817"/>
+          </a:xfrm>
+        </p:grpSpPr>
+        <p:sp>
+          <p:nvSpPr>
+            <p:cNvPr id="13" name="Textfeld 12">
+              <a:extLst>
+                <a:ext uri="{FF2B5EF4-FFF2-40B4-BE49-F238E27FC236}">
+                  <a16:creationId xmlns:a16="http://schemas.microsoft.com/office/drawing/2014/main" id="{2480BC14-736B-5D45-BC4E-29B3518CF911}"/>
+                </a:ext>
+              </a:extLst>
+            </p:cNvPr>
+            <p:cNvSpPr txBox="1"/>
+            <p:nvPr/>
+          </p:nvSpPr>
+          <p:spPr>
+            <a:xfrm>
+              <a:off x="6789885" y="5751869"/>
+              <a:ext cx="4538995" cy="225178"/>
+            </a:xfrm>
+            <a:prstGeom prst="rect">
+              <a:avLst/>
+            </a:prstGeom>
+            <a:noFill/>
+          </p:spPr>
+          <p:txBody>
+            <a:bodyPr wrap="square" rtlCol="0">
+              <a:spAutoFit/>
+            </a:bodyPr>
+            <a:lstStyle/>
+            <a:p>
+              <a:r>
+                <a:rPr lang="de-DE" sz="1400" dirty="0">
+                  <a:latin typeface="Open Sans" pitchFamily="2" charset="0"/>
+                  <a:ea typeface="Open Sans" pitchFamily="2" charset="0"/>
+                  <a:cs typeface="Open Sans" pitchFamily="2" charset="0"/>
+                </a:rPr>
+                <a:t>Abb. 14: Probedruck EG, OG und Feuerleiter</a:t>
+              </a:r>
+            </a:p>
+          </p:txBody>
+        </p:sp>
+        <p:pic>
+          <p:nvPicPr>
+            <p:cNvPr id="14" name="Grafik 13">
+              <a:extLst>
+                <a:ext uri="{FF2B5EF4-FFF2-40B4-BE49-F238E27FC236}">
+                  <a16:creationId xmlns:a16="http://schemas.microsoft.com/office/drawing/2014/main" id="{FA31DE9F-A28F-C3DA-947E-6DFA1AC07B04}"/>
+                </a:ext>
+              </a:extLst>
+            </p:cNvPr>
+            <p:cNvPicPr>
+              <a:picLocks noChangeAspect="1"/>
+            </p:cNvPicPr>
+            <p:nvPr/>
+          </p:nvPicPr>
+          <p:blipFill>
+            <a:blip r:embed="rId3" cstate="print">
+              <a:extLst>
+                <a:ext uri="{28A0092B-C50C-407E-A947-70E740481C1C}">
+                  <a14:useLocalDpi xmlns:a14="http://schemas.microsoft.com/office/drawing/2010/main" val="0"/>
+                </a:ext>
+              </a:extLst>
+            </a:blip>
+            <a:srcRect/>
+            <a:stretch/>
+          </p:blipFill>
+          <p:spPr>
+            <a:xfrm>
+              <a:off x="6789885" y="3693230"/>
+              <a:ext cx="2752019" cy="2058640"/>
+            </a:xfrm>
+            <a:prstGeom prst="rect">
+              <a:avLst/>
+            </a:prstGeom>
+          </p:spPr>
+        </p:pic>
+      </p:grpSp>
+      <p:grpSp>
+        <p:nvGrpSpPr>
+          <p:cNvPr id="10" name="Gruppieren 9">
+            <a:extLst>
+              <a:ext uri="{FF2B5EF4-FFF2-40B4-BE49-F238E27FC236}">
+                <a16:creationId xmlns:a16="http://schemas.microsoft.com/office/drawing/2014/main" id="{65CC6BD6-8AFA-6F6B-3424-C9F9206903DE}"/>
+              </a:ext>
+            </a:extLst>
+          </p:cNvPr>
+          <p:cNvGrpSpPr/>
+          <p:nvPr/>
+        </p:nvGrpSpPr>
+        <p:grpSpPr>
+          <a:xfrm>
+            <a:off x="7499543" y="1621243"/>
+            <a:ext cx="6203980" cy="3121561"/>
+            <a:chOff x="6789885" y="3693230"/>
+            <a:chExt cx="4538995" cy="2283817"/>
+          </a:xfrm>
+        </p:grpSpPr>
+        <p:sp>
+          <p:nvSpPr>
+            <p:cNvPr id="12" name="Textfeld 11">
+              <a:extLst>
+                <a:ext uri="{FF2B5EF4-FFF2-40B4-BE49-F238E27FC236}">
+                  <a16:creationId xmlns:a16="http://schemas.microsoft.com/office/drawing/2014/main" id="{424B4E14-6424-576E-D9F0-0350BAFC235A}"/>
+                </a:ext>
+              </a:extLst>
+            </p:cNvPr>
+            <p:cNvSpPr txBox="1"/>
+            <p:nvPr/>
+          </p:nvSpPr>
+          <p:spPr>
+            <a:xfrm>
+              <a:off x="6789885" y="5751869"/>
+              <a:ext cx="4538995" cy="225178"/>
+            </a:xfrm>
+            <a:prstGeom prst="rect">
+              <a:avLst/>
+            </a:prstGeom>
+            <a:noFill/>
+          </p:spPr>
+          <p:txBody>
+            <a:bodyPr wrap="square" rtlCol="0">
+              <a:spAutoFit/>
+            </a:bodyPr>
+            <a:lstStyle/>
+            <a:p>
+              <a:r>
+                <a:rPr lang="de-DE" sz="1400" dirty="0">
+                  <a:latin typeface="Open Sans" pitchFamily="2" charset="0"/>
+                  <a:ea typeface="Open Sans" pitchFamily="2" charset="0"/>
+                  <a:cs typeface="Open Sans" pitchFamily="2" charset="0"/>
+                </a:rPr>
+                <a:t>Abb. 15: Probedruck EG</a:t>
+              </a:r>
+            </a:p>
+          </p:txBody>
+        </p:sp>
+        <p:pic>
+          <p:nvPicPr>
+            <p:cNvPr id="15" name="Grafik 14">
+              <a:extLst>
+                <a:ext uri="{FF2B5EF4-FFF2-40B4-BE49-F238E27FC236}">
+                  <a16:creationId xmlns:a16="http://schemas.microsoft.com/office/drawing/2014/main" id="{B4E9A663-801D-EE54-3AD9-F44F367793FF}"/>
+                </a:ext>
+              </a:extLst>
+            </p:cNvPr>
+            <p:cNvPicPr>
+              <a:picLocks noChangeAspect="1"/>
+            </p:cNvPicPr>
+            <p:nvPr/>
+          </p:nvPicPr>
+          <p:blipFill>
+            <a:blip r:embed="rId4" cstate="print">
+              <a:extLst>
+                <a:ext uri="{28A0092B-C50C-407E-A947-70E740481C1C}">
+                  <a14:useLocalDpi xmlns:a14="http://schemas.microsoft.com/office/drawing/2010/main" val="0"/>
+                </a:ext>
+              </a:extLst>
+            </a:blip>
+            <a:srcRect/>
+            <a:stretch/>
+          </p:blipFill>
+          <p:spPr>
+            <a:xfrm>
+              <a:off x="6789885" y="3693230"/>
+              <a:ext cx="1539959" cy="2058640"/>
+            </a:xfrm>
+            <a:prstGeom prst="rect">
+              <a:avLst/>
+            </a:prstGeom>
+          </p:spPr>
+        </p:pic>
+      </p:grpSp>
+    </p:spTree>
+    <p:extLst>
+      <p:ext uri="{BB962C8B-B14F-4D97-AF65-F5344CB8AC3E}">
+        <p14:creationId xmlns:p14="http://schemas.microsoft.com/office/powerpoint/2010/main" val="2954412226"/>
+      </p:ext>
+    </p:extLst>
+  </p:cSld>
+  <p:clrMapOvr>
+    <a:masterClrMapping/>
+  </p:clrMapOvr>
+</p:sld>
+</file>
+
+<file path=ppt/slides/slide16.xml><?xml version="1.0" encoding="utf-8"?>
+<p:sld xmlns:a="http://schemas.openxmlformats.org/drawingml/2006/main" xmlns:r="http://schemas.openxmlformats.org/officeDocument/2006/relationships" xmlns:p="http://schemas.openxmlformats.org/presentationml/2006/main">
+  <p:cSld>
+    <p:spTree>
+      <p:nvGrpSpPr>
+        <p:cNvPr id="1" name=""/>
+        <p:cNvGrpSpPr/>
+        <p:nvPr/>
+      </p:nvGrpSpPr>
+      <p:grpSpPr>
+        <a:xfrm>
+          <a:off x="0" y="0"/>
+          <a:ext cx="0" cy="0"/>
+          <a:chOff x="0" y="0"/>
+          <a:chExt cx="0" cy="0"/>
+        </a:xfrm>
+      </p:grpSpPr>
+      <p:sp>
+        <p:nvSpPr>
+          <p:cNvPr id="2" name="Inhaltsplatzhalter 1">
+            <a:extLst>
+              <a:ext uri="{FF2B5EF4-FFF2-40B4-BE49-F238E27FC236}">
+                <a16:creationId xmlns:a16="http://schemas.microsoft.com/office/drawing/2014/main" id="{FFC0B4D5-909B-43B4-B2D9-D1960C962473}"/>
+              </a:ext>
+            </a:extLst>
+          </p:cNvPr>
+          <p:cNvSpPr>
+            <a:spLocks noGrp="1"/>
+          </p:cNvSpPr>
+          <p:nvPr>
+            <p:ph idx="1"/>
+          </p:nvPr>
+        </p:nvSpPr>
+        <p:spPr>
+          <a:xfrm>
+            <a:off x="527434" y="1757293"/>
+            <a:ext cx="11031292" cy="3469944"/>
+          </a:xfrm>
+        </p:spPr>
+        <p:txBody>
+          <a:bodyPr/>
+          <a:lstStyle/>
+          <a:p>
+            <a:r>
+              <a:rPr lang="de-DE" dirty="0"/>
+              <a:t>Druckzeit 18 h</a:t>
+            </a:r>
+          </a:p>
+          <a:p>
+            <a:r>
+              <a:rPr lang="de-DE" dirty="0"/>
+              <a:t>Auskühlzeit 29 h</a:t>
+            </a:r>
+          </a:p>
+          <a:p>
+            <a:r>
+              <a:rPr lang="de-DE" dirty="0"/>
+              <a:t>Auspacken am Absauger mit Pinsel, Nadel, Rakel, Sandstrahler und Druckluft</a:t>
+            </a:r>
+          </a:p>
+          <a:p>
+            <a:endParaRPr lang="de-DE" dirty="0"/>
+          </a:p>
+        </p:txBody>
+      </p:sp>
+      <p:sp>
+        <p:nvSpPr>
+          <p:cNvPr id="3" name="Titel 2">
+            <a:extLst>
+              <a:ext uri="{FF2B5EF4-FFF2-40B4-BE49-F238E27FC236}">
+                <a16:creationId xmlns:a16="http://schemas.microsoft.com/office/drawing/2014/main" id="{2F916FFD-816A-458E-A4AB-A32CB6ECF4FA}"/>
+              </a:ext>
+            </a:extLst>
+          </p:cNvPr>
+          <p:cNvSpPr>
+            <a:spLocks noGrp="1"/>
+          </p:cNvSpPr>
+          <p:nvPr>
+            <p:ph type="title"/>
+          </p:nvPr>
+        </p:nvSpPr>
+        <p:spPr/>
+        <p:txBody>
+          <a:bodyPr/>
+          <a:lstStyle/>
+          <a:p>
+            <a:r>
+              <a:rPr lang="de-DE" dirty="0"/>
+              <a:t>4.4 Finaldruck</a:t>
+            </a:r>
+          </a:p>
+        </p:txBody>
+      </p:sp>
+      <p:grpSp>
+        <p:nvGrpSpPr>
+          <p:cNvPr id="4" name="Gruppieren 3">
+            <a:extLst>
+              <a:ext uri="{FF2B5EF4-FFF2-40B4-BE49-F238E27FC236}">
+                <a16:creationId xmlns:a16="http://schemas.microsoft.com/office/drawing/2014/main" id="{591CE8B6-7721-02AC-D69B-49AE1634E415}"/>
+              </a:ext>
+            </a:extLst>
+          </p:cNvPr>
+          <p:cNvGrpSpPr/>
+          <p:nvPr/>
+        </p:nvGrpSpPr>
+        <p:grpSpPr>
+          <a:xfrm>
+            <a:off x="527434" y="4098909"/>
+            <a:ext cx="6203980" cy="2016260"/>
+            <a:chOff x="6579656" y="4506710"/>
+            <a:chExt cx="4538995" cy="1475150"/>
+          </a:xfrm>
+        </p:grpSpPr>
+        <p:sp>
+          <p:nvSpPr>
+            <p:cNvPr id="5" name="Textfeld 4">
+              <a:extLst>
+                <a:ext uri="{FF2B5EF4-FFF2-40B4-BE49-F238E27FC236}">
+                  <a16:creationId xmlns:a16="http://schemas.microsoft.com/office/drawing/2014/main" id="{6B92C27C-39E9-BE94-71E1-E9571547C89B}"/>
+                </a:ext>
+              </a:extLst>
+            </p:cNvPr>
+            <p:cNvSpPr txBox="1"/>
+            <p:nvPr/>
+          </p:nvSpPr>
+          <p:spPr>
+            <a:xfrm>
+              <a:off x="6579656" y="5756682"/>
+              <a:ext cx="4538995" cy="225178"/>
+            </a:xfrm>
+            <a:prstGeom prst="rect">
+              <a:avLst/>
+            </a:prstGeom>
+            <a:noFill/>
+          </p:spPr>
+          <p:txBody>
+            <a:bodyPr wrap="square" rtlCol="0">
+              <a:spAutoFit/>
+            </a:bodyPr>
+            <a:lstStyle/>
+            <a:p>
+              <a:r>
+                <a:rPr lang="de-DE" sz="1400" dirty="0">
+                  <a:latin typeface="Open Sans" pitchFamily="2" charset="0"/>
+                  <a:ea typeface="Open Sans" pitchFamily="2" charset="0"/>
+                  <a:cs typeface="Open Sans" pitchFamily="2" charset="0"/>
+                </a:rPr>
+                <a:t>Abb. 16: Druckluft</a:t>
+              </a:r>
+            </a:p>
+          </p:txBody>
+        </p:sp>
+        <p:pic>
+          <p:nvPicPr>
+            <p:cNvPr id="6" name="Grafik 5">
+              <a:extLst>
+                <a:ext uri="{FF2B5EF4-FFF2-40B4-BE49-F238E27FC236}">
+                  <a16:creationId xmlns:a16="http://schemas.microsoft.com/office/drawing/2014/main" id="{857FC714-A27E-4CCC-C164-C1FA8B5DF30C}"/>
+                </a:ext>
+              </a:extLst>
+            </p:cNvPr>
+            <p:cNvPicPr>
+              <a:picLocks noChangeAspect="1"/>
+            </p:cNvPicPr>
+            <p:nvPr/>
+          </p:nvPicPr>
+          <p:blipFill>
+            <a:blip r:embed="rId2" cstate="print">
+              <a:extLst>
+                <a:ext uri="{28A0092B-C50C-407E-A947-70E740481C1C}">
+                  <a14:useLocalDpi xmlns:a14="http://schemas.microsoft.com/office/drawing/2010/main" val="0"/>
+                </a:ext>
+              </a:extLst>
+            </a:blip>
+            <a:srcRect/>
+            <a:stretch/>
+          </p:blipFill>
+          <p:spPr>
+            <a:xfrm>
+              <a:off x="6579657" y="4506710"/>
+              <a:ext cx="2767022" cy="1245160"/>
+            </a:xfrm>
+            <a:prstGeom prst="rect">
+              <a:avLst/>
+            </a:prstGeom>
+          </p:spPr>
+        </p:pic>
+      </p:grpSp>
+      <p:grpSp>
+        <p:nvGrpSpPr>
+          <p:cNvPr id="11" name="Gruppieren 10">
+            <a:extLst>
+              <a:ext uri="{FF2B5EF4-FFF2-40B4-BE49-F238E27FC236}">
+                <a16:creationId xmlns:a16="http://schemas.microsoft.com/office/drawing/2014/main" id="{48522FC5-1395-BC1C-CDF2-6574D9E1A69B}"/>
+              </a:ext>
+            </a:extLst>
+          </p:cNvPr>
+          <p:cNvGrpSpPr/>
+          <p:nvPr/>
+        </p:nvGrpSpPr>
+        <p:grpSpPr>
+          <a:xfrm>
+            <a:off x="4741596" y="2987338"/>
+            <a:ext cx="6203980" cy="3128909"/>
+            <a:chOff x="6807431" y="3687855"/>
+            <a:chExt cx="4538995" cy="2289193"/>
+          </a:xfrm>
+        </p:grpSpPr>
+        <p:sp>
+          <p:nvSpPr>
+            <p:cNvPr id="13" name="Textfeld 12">
+              <a:extLst>
+                <a:ext uri="{FF2B5EF4-FFF2-40B4-BE49-F238E27FC236}">
+                  <a16:creationId xmlns:a16="http://schemas.microsoft.com/office/drawing/2014/main" id="{2480BC14-736B-5D45-BC4E-29B3518CF911}"/>
+                </a:ext>
+              </a:extLst>
+            </p:cNvPr>
+            <p:cNvSpPr txBox="1"/>
+            <p:nvPr/>
+          </p:nvSpPr>
+          <p:spPr>
+            <a:xfrm>
+              <a:off x="6807431" y="5751870"/>
+              <a:ext cx="4538995" cy="225178"/>
+            </a:xfrm>
+            <a:prstGeom prst="rect">
+              <a:avLst/>
+            </a:prstGeom>
+            <a:noFill/>
+          </p:spPr>
+          <p:txBody>
+            <a:bodyPr wrap="square" rtlCol="0">
+              <a:spAutoFit/>
+            </a:bodyPr>
+            <a:lstStyle/>
+            <a:p>
+              <a:r>
+                <a:rPr lang="de-DE" sz="1400" dirty="0">
+                  <a:latin typeface="Open Sans" pitchFamily="2" charset="0"/>
+                  <a:ea typeface="Open Sans" pitchFamily="2" charset="0"/>
+                  <a:cs typeface="Open Sans" pitchFamily="2" charset="0"/>
+                </a:rPr>
+                <a:t>Abb. 17: abgebrochene Sprosse</a:t>
+              </a:r>
+            </a:p>
+          </p:txBody>
+        </p:sp>
+        <p:pic>
+          <p:nvPicPr>
+            <p:cNvPr id="14" name="Grafik 13">
+              <a:extLst>
+                <a:ext uri="{FF2B5EF4-FFF2-40B4-BE49-F238E27FC236}">
+                  <a16:creationId xmlns:a16="http://schemas.microsoft.com/office/drawing/2014/main" id="{FA31DE9F-A28F-C3DA-947E-6DFA1AC07B04}"/>
+                </a:ext>
+              </a:extLst>
+            </p:cNvPr>
+            <p:cNvPicPr>
+              <a:picLocks noChangeAspect="1"/>
+            </p:cNvPicPr>
+            <p:nvPr/>
+          </p:nvPicPr>
+          <p:blipFill>
+            <a:blip r:embed="rId3" cstate="print">
+              <a:extLst>
+                <a:ext uri="{28A0092B-C50C-407E-A947-70E740481C1C}">
+                  <a14:useLocalDpi xmlns:a14="http://schemas.microsoft.com/office/drawing/2010/main" val="0"/>
+                </a:ext>
+              </a:extLst>
+            </a:blip>
+            <a:srcRect/>
+            <a:stretch/>
+          </p:blipFill>
+          <p:spPr>
+            <a:xfrm>
+              <a:off x="6841463" y="3687855"/>
+              <a:ext cx="1548010" cy="2064015"/>
+            </a:xfrm>
+            <a:prstGeom prst="rect">
+              <a:avLst/>
+            </a:prstGeom>
+          </p:spPr>
+        </p:pic>
+      </p:grpSp>
+      <p:grpSp>
+        <p:nvGrpSpPr>
+          <p:cNvPr id="7" name="Gruppieren 6">
+            <a:extLst>
+              <a:ext uri="{FF2B5EF4-FFF2-40B4-BE49-F238E27FC236}">
+                <a16:creationId xmlns:a16="http://schemas.microsoft.com/office/drawing/2014/main" id="{5EDAB88E-AD7A-AF47-1675-8A9D46FF1863}"/>
+              </a:ext>
+            </a:extLst>
+          </p:cNvPr>
+          <p:cNvGrpSpPr/>
+          <p:nvPr/>
+        </p:nvGrpSpPr>
+        <p:grpSpPr>
+          <a:xfrm>
+            <a:off x="7843586" y="4098908"/>
+            <a:ext cx="6203980" cy="2016261"/>
+            <a:chOff x="6579656" y="4506710"/>
+            <a:chExt cx="4538995" cy="1475151"/>
+          </a:xfrm>
+        </p:grpSpPr>
+        <p:sp>
+          <p:nvSpPr>
+            <p:cNvPr id="10" name="Textfeld 9">
+              <a:extLst>
+                <a:ext uri="{FF2B5EF4-FFF2-40B4-BE49-F238E27FC236}">
+                  <a16:creationId xmlns:a16="http://schemas.microsoft.com/office/drawing/2014/main" id="{32B7CF90-D682-F92C-6B06-E334693B77C8}"/>
+                </a:ext>
+              </a:extLst>
+            </p:cNvPr>
+            <p:cNvSpPr txBox="1"/>
+            <p:nvPr/>
+          </p:nvSpPr>
+          <p:spPr>
+            <a:xfrm>
+              <a:off x="6579656" y="5756683"/>
+              <a:ext cx="4538995" cy="225178"/>
+            </a:xfrm>
+            <a:prstGeom prst="rect">
+              <a:avLst/>
+            </a:prstGeom>
+            <a:noFill/>
+          </p:spPr>
+          <p:txBody>
+            <a:bodyPr wrap="square" rtlCol="0">
+              <a:spAutoFit/>
+            </a:bodyPr>
+            <a:lstStyle/>
+            <a:p>
+              <a:r>
+                <a:rPr lang="de-DE" sz="1400" dirty="0">
+                  <a:latin typeface="Open Sans" pitchFamily="2" charset="0"/>
+                  <a:ea typeface="Open Sans" pitchFamily="2" charset="0"/>
+                  <a:cs typeface="Open Sans" pitchFamily="2" charset="0"/>
+                </a:rPr>
+                <a:t>Abb. 18: Treppe im LGS</a:t>
+              </a:r>
+            </a:p>
+          </p:txBody>
+        </p:sp>
+        <p:pic>
+          <p:nvPicPr>
+            <p:cNvPr id="12" name="Grafik 11">
+              <a:extLst>
+                <a:ext uri="{FF2B5EF4-FFF2-40B4-BE49-F238E27FC236}">
+                  <a16:creationId xmlns:a16="http://schemas.microsoft.com/office/drawing/2014/main" id="{8A02CE77-44A0-3104-2F29-41064451424A}"/>
+                </a:ext>
+              </a:extLst>
+            </p:cNvPr>
+            <p:cNvPicPr>
+              <a:picLocks noChangeAspect="1"/>
+            </p:cNvPicPr>
+            <p:nvPr/>
+          </p:nvPicPr>
+          <p:blipFill>
+            <a:blip r:embed="rId4" cstate="print">
+              <a:extLst>
+                <a:ext uri="{28A0092B-C50C-407E-A947-70E740481C1C}">
+                  <a14:useLocalDpi xmlns:a14="http://schemas.microsoft.com/office/drawing/2010/main" val="0"/>
+                </a:ext>
+              </a:extLst>
+            </a:blip>
+            <a:srcRect/>
+            <a:stretch/>
+          </p:blipFill>
+          <p:spPr>
+            <a:xfrm>
+              <a:off x="6579656" y="4506710"/>
+              <a:ext cx="2767022" cy="1245160"/>
+            </a:xfrm>
+            <a:prstGeom prst="rect">
+              <a:avLst/>
+            </a:prstGeom>
+          </p:spPr>
+        </p:pic>
+      </p:grpSp>
+    </p:spTree>
+    <p:extLst>
+      <p:ext uri="{BB962C8B-B14F-4D97-AF65-F5344CB8AC3E}">
+        <p14:creationId xmlns:p14="http://schemas.microsoft.com/office/powerpoint/2010/main" val="1803994213"/>
+      </p:ext>
+    </p:extLst>
+  </p:cSld>
+  <p:clrMapOvr>
+    <a:masterClrMapping/>
+  </p:clrMapOvr>
+</p:sld>
+</file>
+
+<file path=ppt/slides/slide17.xml><?xml version="1.0" encoding="utf-8"?>
+<p:sld xmlns:a="http://schemas.openxmlformats.org/drawingml/2006/main" xmlns:r="http://schemas.openxmlformats.org/officeDocument/2006/relationships" xmlns:p="http://schemas.openxmlformats.org/presentationml/2006/main">
+  <p:cSld>
+    <p:spTree>
+      <p:nvGrpSpPr>
+        <p:cNvPr id="1" name=""/>
+        <p:cNvGrpSpPr/>
+        <p:nvPr/>
+      </p:nvGrpSpPr>
+      <p:grpSpPr>
+        <a:xfrm>
+          <a:off x="0" y="0"/>
+          <a:ext cx="0" cy="0"/>
+          <a:chOff x="0" y="0"/>
+          <a:chExt cx="0" cy="0"/>
+        </a:xfrm>
+      </p:grpSpPr>
+      <p:sp>
+        <p:nvSpPr>
+          <p:cNvPr id="3" name="Titel 2">
+            <a:extLst>
+              <a:ext uri="{FF2B5EF4-FFF2-40B4-BE49-F238E27FC236}">
+                <a16:creationId xmlns:a16="http://schemas.microsoft.com/office/drawing/2014/main" id="{37D7FB86-6863-477D-9CA5-197856AD356A}"/>
+              </a:ext>
+            </a:extLst>
+          </p:cNvPr>
+          <p:cNvSpPr>
+            <a:spLocks noGrp="1"/>
+          </p:cNvSpPr>
+          <p:nvPr>
+            <p:ph type="title"/>
+          </p:nvPr>
+        </p:nvSpPr>
+        <p:spPr/>
+        <p:txBody>
+          <a:bodyPr/>
+          <a:lstStyle/>
+          <a:p>
+            <a:r>
+              <a:rPr lang="de-DE" sz="2400" dirty="0"/>
+              <a:t>5. Bewertung des Drucks</a:t>
+            </a:r>
+          </a:p>
+        </p:txBody>
+      </p:sp>
+      <p:sp>
+        <p:nvSpPr>
+          <p:cNvPr id="4" name="Inhaltsplatzhalter 3">
+            <a:extLst>
+              <a:ext uri="{FF2B5EF4-FFF2-40B4-BE49-F238E27FC236}">
+                <a16:creationId xmlns:a16="http://schemas.microsoft.com/office/drawing/2014/main" id="{C657C353-E6AA-4720-8714-8C8766495ABC}"/>
+              </a:ext>
+            </a:extLst>
+          </p:cNvPr>
+          <p:cNvSpPr>
+            <a:spLocks noGrp="1"/>
+          </p:cNvSpPr>
+          <p:nvPr>
+            <p:ph idx="1"/>
+          </p:nvPr>
+        </p:nvSpPr>
+        <p:spPr/>
+        <p:txBody>
+          <a:bodyPr/>
+          <a:lstStyle/>
+          <a:p>
+            <a:r>
+              <a:rPr lang="de-DE" dirty="0">
+                <a:sym typeface="Wingdings" panose="05000000000000000000" pitchFamily="2" charset="2"/>
+              </a:rPr>
+              <a:t>Unter der Maßgabe die Geometrie weitestgehend zu erhalten, tauchen Probleme auf:</a:t>
+            </a:r>
+          </a:p>
+          <a:p>
+            <a:pPr lvl="1"/>
+            <a:r>
+              <a:rPr lang="de-DE" dirty="0">
+                <a:sym typeface="Wingdings" panose="05000000000000000000" pitchFamily="2" charset="2"/>
+              </a:rPr>
+              <a:t>Wände sehr dünn</a:t>
+            </a:r>
+          </a:p>
+          <a:p>
+            <a:pPr lvl="1"/>
+            <a:r>
+              <a:rPr lang="de-DE" dirty="0">
+                <a:sym typeface="Wingdings" panose="05000000000000000000" pitchFamily="2" charset="2"/>
+              </a:rPr>
+              <a:t>Druckauflösung muss beachtet werden (Pfosten, Stangen, u.Ä.)</a:t>
+            </a:r>
+          </a:p>
+          <a:p>
+            <a:r>
+              <a:rPr lang="de-DE" dirty="0">
+                <a:sym typeface="Wingdings" panose="05000000000000000000" pitchFamily="2" charset="2"/>
+              </a:rPr>
+              <a:t>Verzogenes Dach auch nach längerer Abkühlzeit nicht verbessert</a:t>
+            </a:r>
+          </a:p>
+          <a:p>
+            <a:r>
+              <a:rPr lang="de-DE" dirty="0">
+                <a:sym typeface="Wingdings" panose="05000000000000000000" pitchFamily="2" charset="2"/>
+              </a:rPr>
+              <a:t>Verschmelzung des Materials zwischen </a:t>
+            </a:r>
+            <a:r>
+              <a:rPr lang="de-DE" dirty="0" err="1">
+                <a:sym typeface="Wingdings" panose="05000000000000000000" pitchFamily="2" charset="2"/>
+              </a:rPr>
+              <a:t>Geländerstreben</a:t>
+            </a:r>
+            <a:r>
+              <a:rPr lang="de-DE" dirty="0">
+                <a:sym typeface="Wingdings" panose="05000000000000000000" pitchFamily="2" charset="2"/>
+              </a:rPr>
+              <a:t> an Feuerleiter</a:t>
+            </a:r>
+          </a:p>
+          <a:p>
+            <a:endParaRPr lang="de-DE" dirty="0">
+              <a:sym typeface="Wingdings" panose="05000000000000000000" pitchFamily="2" charset="2"/>
+            </a:endParaRPr>
+          </a:p>
+          <a:p>
+            <a:pPr marL="0" indent="0">
+              <a:buNone/>
+            </a:pPr>
+            <a:r>
+              <a:rPr lang="de-DE" dirty="0"/>
+              <a:t>Im Gesamten sind wir mit dem Druck sehr zufrieden. Die Details an Fenstern und Fassade sind gut erkennbar und es sind keine groben Druckfehler aufgetreten. Durch die entfernten Fensterscheiben, wirkt das Modell wertiger, als das Vorgängermodell. Die Stabilität von Elementen wie Treppen und der Feuerleiter sind ausreichend. Speziell die Treppen könnten mittels Supports an Stabilität gewinnen. Komplexere Schnitte könnten die Etagenstabilität zueinander und die Stabilität verschiedener Kleinteile ebenfalls erhöhen.</a:t>
+            </a:r>
+          </a:p>
+          <a:p>
+            <a:pPr marL="0" indent="0">
+              <a:buNone/>
+            </a:pPr>
+            <a:endParaRPr lang="de-DE" dirty="0">
+              <a:sym typeface="Wingdings" panose="05000000000000000000" pitchFamily="2" charset="2"/>
+            </a:endParaRPr>
+          </a:p>
+        </p:txBody>
+      </p:sp>
+    </p:spTree>
+    <p:extLst>
+      <p:ext uri="{BB962C8B-B14F-4D97-AF65-F5344CB8AC3E}">
+        <p14:creationId xmlns:p14="http://schemas.microsoft.com/office/powerpoint/2010/main" val="3092787310"/>
+      </p:ext>
+    </p:extLst>
+  </p:cSld>
+  <p:clrMapOvr>
+    <a:masterClrMapping/>
+  </p:clrMapOvr>
+</p:sld>
+</file>
+
+<file path=ppt/slides/slide18.xml><?xml version="1.0" encoding="utf-8"?>
+<p:sld xmlns:a="http://schemas.openxmlformats.org/drawingml/2006/main" xmlns:r="http://schemas.openxmlformats.org/officeDocument/2006/relationships" xmlns:p="http://schemas.openxmlformats.org/presentationml/2006/main">
+  <p:cSld>
+    <p:spTree>
+      <p:nvGrpSpPr>
+        <p:cNvPr id="1" name=""/>
+        <p:cNvGrpSpPr/>
+        <p:nvPr/>
+      </p:nvGrpSpPr>
+      <p:grpSpPr>
+        <a:xfrm>
+          <a:off x="0" y="0"/>
+          <a:ext cx="0" cy="0"/>
+          <a:chOff x="0" y="0"/>
+          <a:chExt cx="0" cy="0"/>
+        </a:xfrm>
+      </p:grpSpPr>
+      <p:sp>
+        <p:nvSpPr>
+          <p:cNvPr id="3" name="Titel 2">
+            <a:extLst>
+              <a:ext uri="{FF2B5EF4-FFF2-40B4-BE49-F238E27FC236}">
+                <a16:creationId xmlns:a16="http://schemas.microsoft.com/office/drawing/2014/main" id="{37D7FB86-6863-477D-9CA5-197856AD356A}"/>
+              </a:ext>
+            </a:extLst>
+          </p:cNvPr>
+          <p:cNvSpPr>
+            <a:spLocks noGrp="1"/>
+          </p:cNvSpPr>
+          <p:nvPr>
+            <p:ph type="title"/>
+          </p:nvPr>
+        </p:nvSpPr>
+        <p:spPr/>
+        <p:txBody>
+          <a:bodyPr/>
+          <a:lstStyle/>
+          <a:p>
+            <a:r>
+              <a:rPr lang="de-DE" dirty="0"/>
+              <a:t>6. Fazit</a:t>
+            </a:r>
+            <a:endParaRPr lang="de-DE" sz="2400" dirty="0"/>
+          </a:p>
+        </p:txBody>
+      </p:sp>
+      <p:sp>
+        <p:nvSpPr>
+          <p:cNvPr id="4" name="Inhaltsplatzhalter 3">
+            <a:extLst>
+              <a:ext uri="{FF2B5EF4-FFF2-40B4-BE49-F238E27FC236}">
+                <a16:creationId xmlns:a16="http://schemas.microsoft.com/office/drawing/2014/main" id="{C657C353-E6AA-4720-8714-8C8766495ABC}"/>
+              </a:ext>
+            </a:extLst>
+          </p:cNvPr>
+          <p:cNvSpPr>
+            <a:spLocks noGrp="1"/>
+          </p:cNvSpPr>
+          <p:nvPr>
+            <p:ph idx="1"/>
+          </p:nvPr>
+        </p:nvSpPr>
+        <p:spPr>
+          <a:xfrm>
+            <a:off x="527434" y="1180730"/>
+            <a:ext cx="10515600" cy="4793942"/>
+          </a:xfrm>
+        </p:spPr>
+        <p:txBody>
+          <a:bodyPr/>
+          <a:lstStyle/>
+          <a:p>
+            <a:r>
+              <a:rPr lang="de-DE" i="1" dirty="0"/>
+              <a:t>Wie müssen BIM Modelle vereinfacht werden, damit sie druckbar werden?</a:t>
+            </a:r>
+          </a:p>
+          <a:p>
+            <a:pPr lvl="1"/>
+            <a:r>
+              <a:rPr lang="de-DE" dirty="0"/>
+              <a:t>Zielstellung BIM: komplexe Modelle für komplexe Anwendungen aus Einzelteilen</a:t>
+            </a:r>
+          </a:p>
+          <a:p>
+            <a:pPr lvl="1"/>
+            <a:r>
+              <a:rPr lang="de-DE" dirty="0"/>
+              <a:t>Zielstellung 3D-Druck: einzelnes geschlossenes Modell</a:t>
+            </a:r>
+          </a:p>
+          <a:p>
+            <a:pPr lvl="1"/>
+            <a:r>
+              <a:rPr lang="de-DE" dirty="0"/>
+              <a:t>Vereinfachung durch Verringerung der Komplexität (BIM </a:t>
+            </a:r>
+            <a:r>
+              <a:rPr lang="de-DE" dirty="0">
+                <a:sym typeface="Wingdings" panose="05000000000000000000" pitchFamily="2" charset="2"/>
+              </a:rPr>
+              <a:t> CAD)</a:t>
+            </a:r>
+          </a:p>
+          <a:p>
+            <a:pPr lvl="1"/>
+            <a:r>
+              <a:rPr lang="de-DE" dirty="0">
+                <a:sym typeface="Wingdings" panose="05000000000000000000" pitchFamily="2" charset="2"/>
+              </a:rPr>
+              <a:t>Vereinfachung durch Zusammenfassen (CAD  .</a:t>
+            </a:r>
+            <a:r>
+              <a:rPr lang="de-DE" dirty="0" err="1">
+                <a:sym typeface="Wingdings" panose="05000000000000000000" pitchFamily="2" charset="2"/>
+              </a:rPr>
+              <a:t>stl</a:t>
+            </a:r>
+            <a:r>
+              <a:rPr lang="de-DE" dirty="0">
+                <a:sym typeface="Wingdings" panose="05000000000000000000" pitchFamily="2" charset="2"/>
+              </a:rPr>
+              <a:t>)</a:t>
+            </a:r>
+            <a:endParaRPr lang="de-DE" dirty="0"/>
+          </a:p>
+          <a:p>
+            <a:r>
+              <a:rPr lang="de-DE" i="1" dirty="0"/>
+              <a:t>Welche Softwaresysteme benötigt man, um einen 3D-Druck durchzuführen</a:t>
+            </a:r>
+            <a:r>
+              <a:rPr lang="de-DE" dirty="0"/>
+              <a:t>?</a:t>
+            </a:r>
+          </a:p>
+          <a:p>
+            <a:pPr lvl="1"/>
+            <a:r>
+              <a:rPr lang="de-DE" dirty="0"/>
+              <a:t>Unsere Lösung:</a:t>
+            </a:r>
+          </a:p>
+          <a:p>
+            <a:pPr lvl="2"/>
+            <a:r>
+              <a:rPr lang="de-DE" dirty="0"/>
+              <a:t>Autodesk Revit 2022</a:t>
+            </a:r>
+          </a:p>
+          <a:p>
+            <a:pPr lvl="2"/>
+            <a:r>
+              <a:rPr lang="de-DE" dirty="0"/>
+              <a:t>Autodesk AutoCAD 2023</a:t>
+            </a:r>
+          </a:p>
+          <a:p>
+            <a:pPr lvl="2"/>
+            <a:r>
+              <a:rPr lang="de-DE" dirty="0" err="1"/>
+              <a:t>Materialise</a:t>
+            </a:r>
+            <a:r>
+              <a:rPr lang="de-DE" dirty="0"/>
+              <a:t> Magics 26.0</a:t>
+            </a:r>
+          </a:p>
+          <a:p>
+            <a:pPr lvl="2"/>
+            <a:r>
+              <a:rPr lang="de-DE" dirty="0"/>
+              <a:t>PSW 3.6 FORMIG</a:t>
+            </a:r>
+          </a:p>
+          <a:p>
+            <a:pPr lvl="1"/>
+            <a:r>
+              <a:rPr lang="de-DE" dirty="0"/>
+              <a:t>Allgemein:</a:t>
+            </a:r>
+          </a:p>
+          <a:p>
+            <a:pPr lvl="2"/>
+            <a:r>
+              <a:rPr lang="de-DE" dirty="0"/>
+              <a:t>BIM Software</a:t>
+            </a:r>
+          </a:p>
+          <a:p>
+            <a:pPr lvl="2"/>
+            <a:r>
+              <a:rPr lang="de-DE" dirty="0"/>
+              <a:t>Optional CAD Software</a:t>
+            </a:r>
+          </a:p>
+          <a:p>
+            <a:pPr lvl="2"/>
+            <a:r>
+              <a:rPr lang="de-DE" dirty="0" err="1"/>
+              <a:t>Slicer</a:t>
+            </a:r>
+            <a:r>
+              <a:rPr lang="de-DE" dirty="0"/>
+              <a:t> Software</a:t>
+            </a:r>
+          </a:p>
+          <a:p>
+            <a:pPr lvl="2"/>
+            <a:endParaRPr lang="de-DE" dirty="0"/>
+          </a:p>
+          <a:p>
+            <a:pPr marL="914400" lvl="2" indent="0">
+              <a:buNone/>
+            </a:pPr>
+            <a:endParaRPr lang="de-DE" dirty="0"/>
+          </a:p>
+          <a:p>
+            <a:pPr marL="0" indent="0">
+              <a:buNone/>
+            </a:pPr>
+            <a:endParaRPr lang="de-DE" dirty="0"/>
+          </a:p>
+        </p:txBody>
+      </p:sp>
+    </p:spTree>
+    <p:extLst>
+      <p:ext uri="{BB962C8B-B14F-4D97-AF65-F5344CB8AC3E}">
+        <p14:creationId xmlns:p14="http://schemas.microsoft.com/office/powerpoint/2010/main" val="3047898956"/>
+      </p:ext>
+    </p:extLst>
+  </p:cSld>
+  <p:clrMapOvr>
+    <a:masterClrMapping/>
+  </p:clrMapOvr>
+</p:sld>
+</file>
+
+<file path=ppt/slides/slide19.xml><?xml version="1.0" encoding="utf-8"?>
+<p:sld xmlns:a="http://schemas.openxmlformats.org/drawingml/2006/main" xmlns:r="http://schemas.openxmlformats.org/officeDocument/2006/relationships" xmlns:p="http://schemas.openxmlformats.org/presentationml/2006/main">
+  <p:cSld>
+    <p:spTree>
+      <p:nvGrpSpPr>
+        <p:cNvPr id="1" name=""/>
+        <p:cNvGrpSpPr/>
+        <p:nvPr/>
+      </p:nvGrpSpPr>
+      <p:grpSpPr>
+        <a:xfrm>
+          <a:off x="0" y="0"/>
+          <a:ext cx="0" cy="0"/>
+          <a:chOff x="0" y="0"/>
+          <a:chExt cx="0" cy="0"/>
+        </a:xfrm>
+      </p:grpSpPr>
+      <p:sp>
+        <p:nvSpPr>
+          <p:cNvPr id="3" name="Titel 2">
+            <a:extLst>
+              <a:ext uri="{FF2B5EF4-FFF2-40B4-BE49-F238E27FC236}">
+                <a16:creationId xmlns:a16="http://schemas.microsoft.com/office/drawing/2014/main" id="{37D7FB86-6863-477D-9CA5-197856AD356A}"/>
+              </a:ext>
+            </a:extLst>
+          </p:cNvPr>
+          <p:cNvSpPr>
+            <a:spLocks noGrp="1"/>
+          </p:cNvSpPr>
+          <p:nvPr>
+            <p:ph type="title"/>
+          </p:nvPr>
+        </p:nvSpPr>
+        <p:spPr/>
+        <p:txBody>
+          <a:bodyPr/>
+          <a:lstStyle/>
+          <a:p>
+            <a:r>
+              <a:rPr lang="de-DE" dirty="0"/>
+              <a:t>Quellen</a:t>
+            </a:r>
+            <a:endParaRPr lang="de-DE" sz="2400" dirty="0"/>
+          </a:p>
+        </p:txBody>
+      </p:sp>
+      <p:sp>
+        <p:nvSpPr>
+          <p:cNvPr id="4" name="Inhaltsplatzhalter 3">
+            <a:extLst>
+              <a:ext uri="{FF2B5EF4-FFF2-40B4-BE49-F238E27FC236}">
+                <a16:creationId xmlns:a16="http://schemas.microsoft.com/office/drawing/2014/main" id="{C657C353-E6AA-4720-8714-8C8766495ABC}"/>
+              </a:ext>
+            </a:extLst>
+          </p:cNvPr>
+          <p:cNvSpPr>
+            <a:spLocks noGrp="1"/>
+          </p:cNvSpPr>
+          <p:nvPr>
+            <p:ph idx="1"/>
+          </p:nvPr>
+        </p:nvSpPr>
+        <p:spPr>
+          <a:xfrm>
+            <a:off x="527434" y="1180730"/>
+            <a:ext cx="10515600" cy="4793942"/>
+          </a:xfrm>
+        </p:spPr>
+        <p:txBody>
+          <a:bodyPr/>
+          <a:lstStyle/>
+          <a:p>
+            <a:r>
+              <a:rPr lang="de-DE" dirty="0"/>
+              <a:t>Abbildungen: privat </a:t>
+            </a:r>
+          </a:p>
+          <a:p>
+            <a:r>
+              <a:rPr lang="de-DE" dirty="0"/>
+              <a:t>AutoCAD Support: </a:t>
+            </a:r>
+            <a:r>
+              <a:rPr lang="de-DE" dirty="0">
+                <a:hlinkClick r:id="rId2"/>
+              </a:rPr>
+              <a:t>https://help.autodesk.com/view/ACD/2021/ENU/</a:t>
+            </a:r>
+            <a:r>
+              <a:rPr lang="de-DE" dirty="0"/>
+              <a:t> (24.06.2023)</a:t>
+            </a:r>
+          </a:p>
+          <a:p>
+            <a:r>
+              <a:rPr lang="de-DE" dirty="0"/>
+              <a:t>Daten zu </a:t>
+            </a:r>
+            <a:r>
+              <a:rPr lang="de-DE" dirty="0" err="1"/>
+              <a:t>Formiga</a:t>
+            </a:r>
+            <a:r>
+              <a:rPr lang="de-DE" dirty="0"/>
+              <a:t> P110: </a:t>
+            </a:r>
+            <a:r>
+              <a:rPr lang="de-DE" dirty="0">
+                <a:hlinkClick r:id="rId3"/>
+              </a:rPr>
+              <a:t>https://www.kuhn-stoff.de/fileadmin/benutzerdaten/kuhn-stoff-de/pdf/maschinen/EOS_Systemdatenblatt_FORMIGA_P110_de.pdf</a:t>
+            </a:r>
+            <a:r>
+              <a:rPr lang="de-DE" dirty="0"/>
+              <a:t> (24.06.2023)</a:t>
+            </a:r>
+          </a:p>
+          <a:p>
+            <a:r>
+              <a:rPr lang="de-DE" dirty="0" err="1"/>
+              <a:t>Bedienungsanleitung:</a:t>
+            </a:r>
+            <a:r>
+              <a:rPr lang="de-DE" dirty="0" err="1">
+                <a:hlinkClick r:id="rId4"/>
+              </a:rPr>
+              <a:t>https</a:t>
+            </a:r>
+            <a:r>
+              <a:rPr lang="de-DE" dirty="0">
+                <a:hlinkClick r:id="rId4"/>
+              </a:rPr>
+              <a:t>://3dagainstcorona.eos.info/</a:t>
+            </a:r>
+            <a:r>
+              <a:rPr lang="de-DE" dirty="0" err="1">
+                <a:hlinkClick r:id="rId4"/>
+              </a:rPr>
+              <a:t>subdomain</a:t>
+            </a:r>
+            <a:r>
+              <a:rPr lang="de-DE" dirty="0">
+                <a:hlinkClick r:id="rId4"/>
+              </a:rPr>
+              <a:t>/</a:t>
+            </a:r>
+            <a:r>
+              <a:rPr lang="de-DE" dirty="0" err="1">
+                <a:hlinkClick r:id="rId4"/>
+              </a:rPr>
+              <a:t>subdomain_corona</a:t>
+            </a:r>
+            <a:r>
+              <a:rPr lang="de-DE" dirty="0">
+                <a:hlinkClick r:id="rId4"/>
+              </a:rPr>
+              <a:t>/</a:t>
+            </a:r>
+            <a:r>
+              <a:rPr lang="de-DE" dirty="0" err="1">
+                <a:hlinkClick r:id="rId4"/>
+              </a:rPr>
+              <a:t>pdf</a:t>
+            </a:r>
+            <a:r>
+              <a:rPr lang="de-DE" dirty="0">
+                <a:hlinkClick r:id="rId4"/>
+              </a:rPr>
+              <a:t>/shield_parameter_sheet.pdf</a:t>
+            </a:r>
+            <a:r>
+              <a:rPr lang="de-DE" dirty="0"/>
+              <a:t> (24.06.2023)</a:t>
+            </a:r>
+          </a:p>
+          <a:p>
+            <a:endParaRPr lang="de-DE" dirty="0"/>
+          </a:p>
+          <a:p>
+            <a:pPr marL="0" indent="0">
+              <a:buNone/>
+            </a:pPr>
+            <a:endParaRPr lang="de-DE" dirty="0"/>
+          </a:p>
+          <a:p>
+            <a:pPr marL="914400" lvl="2" indent="0">
+              <a:buNone/>
+            </a:pPr>
+            <a:endParaRPr lang="de-DE" dirty="0"/>
+          </a:p>
+          <a:p>
+            <a:pPr marL="0" indent="0">
+              <a:buNone/>
+            </a:pPr>
+            <a:endParaRPr lang="de-DE" dirty="0"/>
+          </a:p>
+        </p:txBody>
+      </p:sp>
+    </p:spTree>
+    <p:extLst>
+      <p:ext uri="{BB962C8B-B14F-4D97-AF65-F5344CB8AC3E}">
+        <p14:creationId xmlns:p14="http://schemas.microsoft.com/office/powerpoint/2010/main" val="2476118190"/>
+      </p:ext>
+    </p:extLst>
+  </p:cSld>
+  <p:clrMapOvr>
+    <a:masterClrMapping/>
+  </p:clrMapOvr>
+</p:sld>
+</file>
+
 <file path=ppt/slides/slide2.xml><?xml version="1.0" encoding="utf-8"?>
 <p:sld xmlns:a="http://schemas.openxmlformats.org/drawingml/2006/main" xmlns:r="http://schemas.openxmlformats.org/officeDocument/2006/relationships" xmlns:p="http://schemas.openxmlformats.org/presentationml/2006/main">
   <p:cSld>
@@ -5559,7 +7568,7 @@
         </p:nvSpPr>
         <p:spPr>
           <a:xfrm>
-            <a:off x="527434" y="1203845"/>
+            <a:off x="518556" y="1115069"/>
             <a:ext cx="10515600" cy="3469944"/>
           </a:xfrm>
         </p:spPr>
@@ -5572,7 +7581,7 @@
               <a:buAutoNum type="arabicPeriod"/>
             </a:pPr>
             <a:r>
-              <a:rPr lang="de-DE" sz="2400" dirty="0"/>
+              <a:rPr lang="de-DE" dirty="0"/>
               <a:t>Vorstellung des Projekts</a:t>
             </a:r>
           </a:p>
@@ -5582,7 +7591,7 @@
               <a:buAutoNum type="arabicPeriod"/>
             </a:pPr>
             <a:r>
-              <a:rPr lang="de-DE" sz="2400" dirty="0"/>
+              <a:rPr lang="de-DE" dirty="0"/>
               <a:t>Forschungsfragen</a:t>
             </a:r>
           </a:p>
@@ -5592,16 +7601,8 @@
               <a:buAutoNum type="arabicPeriod"/>
             </a:pPr>
             <a:r>
-              <a:rPr lang="de-DE" sz="2400" dirty="0"/>
-              <a:t>Modellbereinigung </a:t>
-            </a:r>
-            <a:r>
-              <a:rPr lang="de-DE" sz="2400" dirty="0">
-                <a:solidFill>
-                  <a:srgbClr val="FF0000"/>
-                </a:solidFill>
-              </a:rPr>
-              <a:t>und Bearbeitung</a:t>
+              <a:rPr lang="de-DE" dirty="0"/>
+              <a:t>Ablauf - Modellbereinigung und Bearbeitung</a:t>
             </a:r>
           </a:p>
           <a:p>
@@ -5610,18 +7611,18 @@
               <a:buAutoNum type="arabicPeriod"/>
             </a:pPr>
             <a:r>
-              <a:rPr lang="de-DE" sz="2400" dirty="0"/>
+              <a:rPr lang="de-DE" dirty="0"/>
               <a:t>mit </a:t>
             </a:r>
             <a:r>
-              <a:rPr lang="de-DE" sz="2400" i="1" dirty="0"/>
+              <a:rPr lang="de-DE" i="1" dirty="0"/>
               <a:t>Autodesk </a:t>
             </a:r>
             <a:r>
-              <a:rPr lang="de-DE" sz="2400" i="1" dirty="0" err="1"/>
+              <a:rPr lang="de-DE" i="1" dirty="0" err="1"/>
               <a:t>Revit</a:t>
             </a:r>
-            <a:endParaRPr lang="de-DE" sz="2400" i="1" dirty="0"/>
+            <a:endParaRPr lang="de-DE" i="1" dirty="0"/>
           </a:p>
           <a:p>
             <a:pPr marL="800100" lvl="1" indent="-342900">
@@ -5629,11 +7630,11 @@
               <a:buAutoNum type="arabicPeriod"/>
             </a:pPr>
             <a:r>
-              <a:rPr lang="de-DE" sz="2400" dirty="0"/>
+              <a:rPr lang="de-DE" dirty="0"/>
               <a:t>mit </a:t>
             </a:r>
             <a:r>
-              <a:rPr lang="de-DE" sz="2400" i="1" dirty="0"/>
+              <a:rPr lang="de-DE" i="1" dirty="0"/>
               <a:t>Autodesk AutoCAD</a:t>
             </a:r>
           </a:p>
@@ -5643,15 +7644,15 @@
               <a:buAutoNum type="arabicPeriod"/>
             </a:pPr>
             <a:r>
-              <a:rPr lang="de-DE" sz="2400" dirty="0"/>
+              <a:rPr lang="de-DE" dirty="0"/>
               <a:t>mit </a:t>
             </a:r>
             <a:r>
-              <a:rPr lang="de-DE" sz="2400" i="1" dirty="0" err="1"/>
+              <a:rPr lang="de-DE" i="1" dirty="0" err="1"/>
               <a:t>Materialise</a:t>
             </a:r>
             <a:r>
-              <a:rPr lang="de-DE" sz="2400" i="1" dirty="0"/>
+              <a:rPr lang="de-DE" i="1" dirty="0"/>
               <a:t> Magics</a:t>
             </a:r>
           </a:p>
@@ -5661,7 +7662,7 @@
               <a:buAutoNum type="arabicPeriod"/>
             </a:pPr>
             <a:r>
-              <a:rPr lang="de-DE" sz="2400" dirty="0"/>
+              <a:rPr lang="de-DE" dirty="0"/>
               <a:t>Druckprozess</a:t>
             </a:r>
           </a:p>
@@ -5671,8 +7672,38 @@
               <a:buAutoNum type="arabicPeriod"/>
             </a:pPr>
             <a:r>
-              <a:rPr lang="de-DE" sz="2400" dirty="0"/>
+              <a:rPr lang="de-DE" dirty="0"/>
+              <a:t>Drucker</a:t>
+            </a:r>
+          </a:p>
+          <a:p>
+            <a:pPr marL="800100" lvl="1" indent="-342900">
+              <a:buFont typeface="+mj-lt"/>
+              <a:buAutoNum type="arabicPeriod"/>
+            </a:pPr>
+            <a:r>
+              <a:rPr lang="de-DE" dirty="0"/>
+              <a:t>Anordnung im Bauraum</a:t>
+            </a:r>
+          </a:p>
+          <a:p>
+            <a:pPr marL="800100" lvl="1" indent="-342900">
+              <a:buFont typeface="+mj-lt"/>
+              <a:buAutoNum type="arabicPeriod"/>
+            </a:pPr>
+            <a:r>
+              <a:rPr lang="de-DE" dirty="0"/>
               <a:t>Probedruck</a:t>
+            </a:r>
+          </a:p>
+          <a:p>
+            <a:pPr marL="800100" lvl="1" indent="-342900">
+              <a:buFont typeface="+mj-lt"/>
+              <a:buAutoNum type="arabicPeriod"/>
+            </a:pPr>
+            <a:r>
+              <a:rPr lang="de-DE" dirty="0"/>
+              <a:t>Finaldruck</a:t>
             </a:r>
           </a:p>
           <a:p>
@@ -5681,8 +7712,8 @@
               <a:buAutoNum type="arabicPeriod"/>
             </a:pPr>
             <a:r>
-              <a:rPr lang="de-DE" sz="2400" dirty="0"/>
-              <a:t>Nachbereitung</a:t>
+              <a:rPr lang="de-DE" dirty="0"/>
+              <a:t>Bewertung des Drucks</a:t>
             </a:r>
           </a:p>
           <a:p>
@@ -5691,17 +7722,7 @@
               <a:buAutoNum type="arabicPeriod"/>
             </a:pPr>
             <a:r>
-              <a:rPr lang="de-DE" sz="2400" dirty="0"/>
-              <a:t>Bewertung des Drucks</a:t>
-            </a:r>
-          </a:p>
-          <a:p>
-            <a:pPr marL="342900" indent="-342900">
-              <a:buFont typeface="+mj-lt"/>
-              <a:buAutoNum type="arabicPeriod"/>
-            </a:pPr>
-            <a:r>
-              <a:rPr lang="de-DE" sz="2400" dirty="0"/>
+              <a:rPr lang="de-DE" dirty="0"/>
               <a:t>Fazit</a:t>
             </a:r>
           </a:p>
@@ -5710,7 +7731,7 @@
               <a:buNone/>
             </a:pPr>
             <a:r>
-              <a:rPr lang="de-DE" sz="2400" dirty="0"/>
+              <a:rPr lang="de-DE" dirty="0"/>
               <a:t>Quellen</a:t>
             </a:r>
           </a:p>
@@ -5792,88 +7813,6 @@
             <a:r>
               <a:rPr lang="de-DE" dirty="0"/>
               <a:t>Aufbereitung und Bereinigung des Modells des Laborgebäude LGS für 3D-Druck</a:t>
-            </a:r>
-          </a:p>
-          <a:p>
-            <a:r>
-              <a:rPr lang="de-DE" dirty="0"/>
-              <a:t>Software: </a:t>
-            </a:r>
-            <a:r>
-              <a:rPr lang="de-DE" dirty="0">
-                <a:solidFill>
-                  <a:srgbClr val="FF0000"/>
-                </a:solidFill>
-              </a:rPr>
-              <a:t>Software erst nach den </a:t>
-            </a:r>
-            <a:r>
-              <a:rPr lang="de-DE" dirty="0" err="1">
-                <a:solidFill>
-                  <a:srgbClr val="FF0000"/>
-                </a:solidFill>
-              </a:rPr>
-              <a:t>Forshcungsfragen</a:t>
-            </a:r>
-            <a:r>
-              <a:rPr lang="de-DE" dirty="0">
-                <a:solidFill>
-                  <a:srgbClr val="FF0000"/>
-                </a:solidFill>
-              </a:rPr>
-              <a:t> vorstellen?</a:t>
-            </a:r>
-            <a:endParaRPr lang="de-DE" dirty="0"/>
-          </a:p>
-          <a:p>
-            <a:pPr lvl="1"/>
-            <a:r>
-              <a:rPr lang="de-DE" dirty="0"/>
-              <a:t>Autodesk </a:t>
-            </a:r>
-            <a:r>
-              <a:rPr lang="de-DE" dirty="0" err="1"/>
-              <a:t>Revit</a:t>
-            </a:r>
-            <a:r>
-              <a:rPr lang="de-DE" dirty="0"/>
-              <a:t> 2022</a:t>
-            </a:r>
-          </a:p>
-          <a:p>
-            <a:pPr lvl="1"/>
-            <a:r>
-              <a:rPr lang="de-DE" dirty="0"/>
-              <a:t>Autodesk AutoCAD 2023</a:t>
-            </a:r>
-          </a:p>
-          <a:p>
-            <a:pPr lvl="1"/>
-            <a:r>
-              <a:rPr lang="de-DE" dirty="0">
-                <a:solidFill>
-                  <a:srgbClr val="FF0000"/>
-                </a:solidFill>
-              </a:rPr>
-              <a:t>Autodesk AutoCAD Architecture 2023?</a:t>
-            </a:r>
-          </a:p>
-          <a:p>
-            <a:pPr lvl="1"/>
-            <a:r>
-              <a:rPr lang="de-DE" dirty="0" err="1"/>
-              <a:t>Materialise</a:t>
-            </a:r>
-            <a:r>
-              <a:rPr lang="de-DE" dirty="0"/>
-              <a:t> Magics 26.0</a:t>
-            </a:r>
-          </a:p>
-          <a:p>
-            <a:pPr lvl="1"/>
-            <a:r>
-              <a:rPr lang="de-DE" dirty="0"/>
-              <a:t>PSW 3.6 FORMIG</a:t>
             </a:r>
           </a:p>
           <a:p>
@@ -6191,8 +8130,8 @@
           <a:lstStyle/>
           <a:p>
             <a:r>
-              <a:rPr lang="de-DE" dirty="0"/>
-              <a:t>3. Aktueller Arbeitsstand und Erkenntnisse </a:t>
+              <a:rPr lang="de-DE" sz="2400" dirty="0"/>
+              <a:t>3. Ablauf - Modellbereinigung und Bearbeitung</a:t>
             </a:r>
           </a:p>
         </p:txBody>
@@ -6219,139 +8158,10 @@
           <a:lstStyle/>
           <a:p>
             <a:r>
-              <a:rPr lang="de-DE" dirty="0"/>
-              <a:t>Daten erhalten für Software Revit</a:t>
-            </a:r>
-          </a:p>
-          <a:p>
-            <a:pPr lvl="1"/>
-            <a:r>
-              <a:rPr lang="de-DE" dirty="0"/>
-              <a:t>Bearbeiten von </a:t>
-            </a:r>
-            <a:r>
               <a:rPr lang="de-DE" dirty="0">
                 <a:sym typeface="Wingdings" panose="05000000000000000000" pitchFamily="2" charset="2"/>
               </a:rPr>
-              <a:t>komplexen Bauteilen (</a:t>
-            </a:r>
-            <a:r>
-              <a:rPr lang="de-DE" dirty="0"/>
-              <a:t>Geländern, </a:t>
-            </a:r>
-            <a:r>
-              <a:rPr lang="de-DE" dirty="0">
-                <a:sym typeface="Wingdings" panose="05000000000000000000" pitchFamily="2" charset="2"/>
-              </a:rPr>
-              <a:t>Stützen, Fenster, Feuerleiter</a:t>
-            </a:r>
-            <a:r>
-              <a:rPr lang="de-DE" dirty="0"/>
-              <a:t>, …)</a:t>
-            </a:r>
-          </a:p>
-          <a:p>
-            <a:pPr lvl="1"/>
-            <a:r>
-              <a:rPr lang="de-DE" dirty="0"/>
-              <a:t>Entfernen nicht zu druckender Bereiche</a:t>
-            </a:r>
-          </a:p>
-          <a:p>
-            <a:r>
-              <a:rPr lang="de-DE" dirty="0"/>
-              <a:t>Export in Magics problematisch </a:t>
-            </a:r>
-            <a:endParaRPr lang="de-DE" dirty="0">
-              <a:sym typeface="Wingdings" panose="05000000000000000000" pitchFamily="2" charset="2"/>
-            </a:endParaRPr>
-          </a:p>
-          <a:p>
-            <a:pPr lvl="1"/>
-            <a:r>
-              <a:rPr lang="de-DE" dirty="0">
-                <a:sym typeface="Wingdings" panose="05000000000000000000" pitchFamily="2" charset="2"/>
-              </a:rPr>
-              <a:t>Datenverlust mit .</a:t>
-            </a:r>
-            <a:r>
-              <a:rPr lang="de-DE" dirty="0" err="1">
-                <a:sym typeface="Wingdings" panose="05000000000000000000" pitchFamily="2" charset="2"/>
-              </a:rPr>
-              <a:t>dwg</a:t>
-            </a:r>
-            <a:r>
-              <a:rPr lang="de-DE" dirty="0">
-                <a:sym typeface="Wingdings" panose="05000000000000000000" pitchFamily="2" charset="2"/>
-              </a:rPr>
-              <a:t> und .</a:t>
-            </a:r>
-            <a:r>
-              <a:rPr lang="de-DE" dirty="0" err="1">
-                <a:sym typeface="Wingdings" panose="05000000000000000000" pitchFamily="2" charset="2"/>
-              </a:rPr>
-              <a:t>fbx</a:t>
-            </a:r>
-            <a:r>
-              <a:rPr lang="de-DE" dirty="0">
-                <a:sym typeface="Wingdings" panose="05000000000000000000" pitchFamily="2" charset="2"/>
-              </a:rPr>
-              <a:t> </a:t>
-            </a:r>
-          </a:p>
-          <a:p>
-            <a:pPr lvl="1"/>
-            <a:r>
-              <a:rPr lang="de-DE" dirty="0">
-                <a:sym typeface="Wingdings" panose="05000000000000000000" pitchFamily="2" charset="2"/>
-              </a:rPr>
-              <a:t>Bearbeitung sehr Zeitaufwendig mit .</a:t>
-            </a:r>
-            <a:r>
-              <a:rPr lang="de-DE" dirty="0" err="1">
-                <a:sym typeface="Wingdings" panose="05000000000000000000" pitchFamily="2" charset="2"/>
-              </a:rPr>
-              <a:t>stl</a:t>
-            </a:r>
-            <a:r>
-              <a:rPr lang="de-DE" dirty="0">
-                <a:sym typeface="Wingdings" panose="05000000000000000000" pitchFamily="2" charset="2"/>
-              </a:rPr>
-              <a:t> Export von Revit</a:t>
-            </a:r>
-          </a:p>
-          <a:p>
-            <a:r>
-              <a:rPr lang="de-DE" dirty="0">
-                <a:sym typeface="Wingdings" panose="05000000000000000000" pitchFamily="2" charset="2"/>
-              </a:rPr>
-              <a:t>Export nach AutoCAD </a:t>
-            </a:r>
-          </a:p>
-          <a:p>
-            <a:pPr lvl="1"/>
-            <a:r>
-              <a:rPr lang="de-DE" dirty="0">
-                <a:sym typeface="Wingdings" panose="05000000000000000000" pitchFamily="2" charset="2"/>
-              </a:rPr>
-              <a:t>Fassadenfenster einfach löschbar</a:t>
-            </a:r>
-          </a:p>
-          <a:p>
-            <a:pPr lvl="1"/>
-            <a:r>
-              <a:rPr lang="de-DE" dirty="0">
-                <a:sym typeface="Wingdings" panose="05000000000000000000" pitchFamily="2" charset="2"/>
-              </a:rPr>
-              <a:t>Komplexe Bauteile leicht nachzubearbeiten </a:t>
-            </a:r>
-          </a:p>
-          <a:p>
-            <a:r>
-              <a:rPr lang="de-DE" dirty="0">
-                <a:sym typeface="Wingdings" panose="05000000000000000000" pitchFamily="2" charset="2"/>
-              </a:rPr>
-              <a:t>Revit Dateien mit </a:t>
+              <a:t>Versionierung mittels </a:t>
             </a:r>
             <a:r>
               <a:rPr lang="de-DE" dirty="0" err="1">
@@ -6363,64 +8173,78 @@
               <a:rPr lang="de-DE" dirty="0">
                 <a:sym typeface="Wingdings" panose="05000000000000000000" pitchFamily="2" charset="2"/>
               </a:rPr>
-              <a:t> </a:t>
-            </a:r>
-            <a:r>
-              <a:rPr lang="de-DE" dirty="0" err="1">
-                <a:sym typeface="Wingdings" panose="05000000000000000000" pitchFamily="2" charset="2"/>
-              </a:rPr>
-              <a:t>trackbar</a:t>
-            </a:r>
+              <a:t> ermöglicht:</a:t>
+            </a:r>
+          </a:p>
+          <a:p>
+            <a:pPr lvl="1"/>
             <a:r>
               <a:rPr lang="de-DE" dirty="0">
                 <a:sym typeface="Wingdings" panose="05000000000000000000" pitchFamily="2" charset="2"/>
               </a:rPr>
-              <a:t>, </a:t>
-            </a:r>
-            <a:r>
-              <a:rPr lang="de-DE" dirty="0" err="1">
-                <a:sym typeface="Wingdings" panose="05000000000000000000" pitchFamily="2" charset="2"/>
-              </a:rPr>
-              <a:t>mergen</a:t>
-            </a:r>
+              <a:t>Parallele Bearbeitung</a:t>
+            </a:r>
+          </a:p>
+          <a:p>
+            <a:pPr lvl="1"/>
             <a:r>
               <a:rPr lang="de-DE" dirty="0">
                 <a:sym typeface="Wingdings" panose="05000000000000000000" pitchFamily="2" charset="2"/>
               </a:rPr>
-              <a:t> problematisch </a:t>
+              <a:t>Zugriff auf aktuellen Stand</a:t>
+            </a:r>
+          </a:p>
+          <a:p>
+            <a:r>
+              <a:rPr lang="de-DE" dirty="0"/>
+              <a:t>Software:</a:t>
             </a:r>
           </a:p>
           <a:p>
             <a:pPr lvl="1"/>
             <a:r>
-              <a:rPr lang="de-DE" dirty="0">
-                <a:sym typeface="Wingdings" panose="05000000000000000000" pitchFamily="2" charset="2"/>
-              </a:rPr>
-              <a:t>Parallele Bearbeitung möglich</a:t>
+              <a:rPr lang="de-DE" dirty="0"/>
+              <a:t>Autodesk Revit 2022</a:t>
             </a:r>
           </a:p>
           <a:p>
             <a:pPr lvl="1"/>
             <a:r>
-              <a:rPr lang="de-DE" dirty="0">
-                <a:sym typeface="Wingdings" panose="05000000000000000000" pitchFamily="2" charset="2"/>
-              </a:rPr>
-              <a:t>Zugriff auf aktuellen Stand für alle gewährleistet</a:t>
+              <a:rPr lang="de-DE" dirty="0"/>
+              <a:t>Autodesk AutoCAD 2023</a:t>
+            </a:r>
+          </a:p>
+          <a:p>
+            <a:pPr lvl="1"/>
+            <a:r>
+              <a:rPr lang="de-DE" dirty="0" err="1"/>
+              <a:t>Materialise</a:t>
+            </a:r>
+            <a:r>
+              <a:rPr lang="de-DE" dirty="0"/>
+              <a:t> Magics 26.0</a:t>
+            </a:r>
+          </a:p>
+          <a:p>
+            <a:pPr lvl="1"/>
+            <a:r>
+              <a:rPr lang="de-DE" dirty="0"/>
+              <a:t>PSW 3.6 FORMIG</a:t>
             </a:r>
           </a:p>
           <a:p>
             <a:pPr marL="0" indent="0">
               <a:buNone/>
             </a:pPr>
-            <a:r>
-              <a:rPr lang="de-DE" dirty="0">
-                <a:solidFill>
-                  <a:srgbClr val="FF0000"/>
-                </a:solidFill>
-                <a:sym typeface="Wingdings" panose="05000000000000000000" pitchFamily="2" charset="2"/>
-              </a:rPr>
-              <a:t>Folie komplett rauschmeißen?</a:t>
-            </a:r>
+            <a:endParaRPr lang="de-DE" dirty="0"/>
+          </a:p>
+          <a:p>
+            <a:pPr marL="0" indent="0">
+              <a:buNone/>
+            </a:pPr>
+            <a:endParaRPr lang="de-DE" dirty="0">
+              <a:sym typeface="Wingdings" panose="05000000000000000000" pitchFamily="2" charset="2"/>
+            </a:endParaRPr>
           </a:p>
         </p:txBody>
       </p:sp>
@@ -6573,16 +8397,319 @@
           <a:lstStyle/>
           <a:p>
             <a:r>
-              <a:rPr lang="de-DE" dirty="0">
-                <a:solidFill>
-                  <a:srgbClr val="FF0000"/>
-                </a:solidFill>
-              </a:rPr>
+              <a:rPr lang="de-DE" dirty="0"/>
               <a:t>3.1 Bearbeitung in Revit</a:t>
             </a:r>
           </a:p>
         </p:txBody>
       </p:sp>
+      <p:grpSp>
+        <p:nvGrpSpPr>
+          <p:cNvPr id="11" name="Gruppieren 10">
+            <a:extLst>
+              <a:ext uri="{FF2B5EF4-FFF2-40B4-BE49-F238E27FC236}">
+                <a16:creationId xmlns:a16="http://schemas.microsoft.com/office/drawing/2014/main" id="{2EDA5BB1-9B59-29C7-7734-E9736EBE61E0}"/>
+              </a:ext>
+            </a:extLst>
+          </p:cNvPr>
+          <p:cNvGrpSpPr/>
+          <p:nvPr/>
+        </p:nvGrpSpPr>
+        <p:grpSpPr>
+          <a:xfrm>
+            <a:off x="7504788" y="4219240"/>
+            <a:ext cx="6203980" cy="2015993"/>
+            <a:chOff x="2411620" y="4092606"/>
+            <a:chExt cx="6203980" cy="2015993"/>
+          </a:xfrm>
+        </p:grpSpPr>
+        <p:grpSp>
+          <p:nvGrpSpPr>
+            <p:cNvPr id="5" name="Gruppieren 4">
+              <a:extLst>
+                <a:ext uri="{FF2B5EF4-FFF2-40B4-BE49-F238E27FC236}">
+                  <a16:creationId xmlns:a16="http://schemas.microsoft.com/office/drawing/2014/main" id="{C1A61816-4445-2ABA-59D9-E041183AC7C9}"/>
+                </a:ext>
+              </a:extLst>
+            </p:cNvPr>
+            <p:cNvGrpSpPr/>
+            <p:nvPr/>
+          </p:nvGrpSpPr>
+          <p:grpSpPr>
+            <a:xfrm>
+              <a:off x="2411620" y="4092606"/>
+              <a:ext cx="6203980" cy="2015993"/>
+              <a:chOff x="6807431" y="4502095"/>
+              <a:chExt cx="4538995" cy="1474953"/>
+            </a:xfrm>
+          </p:grpSpPr>
+          <p:sp>
+            <p:nvSpPr>
+              <p:cNvPr id="8" name="Textfeld 7">
+                <a:extLst>
+                  <a:ext uri="{FF2B5EF4-FFF2-40B4-BE49-F238E27FC236}">
+                    <a16:creationId xmlns:a16="http://schemas.microsoft.com/office/drawing/2014/main" id="{676DA25D-5BF2-4CB0-2724-64B3EBEB35E2}"/>
+                  </a:ext>
+                </a:extLst>
+              </p:cNvPr>
+              <p:cNvSpPr txBox="1"/>
+              <p:nvPr/>
+            </p:nvSpPr>
+            <p:spPr>
+              <a:xfrm>
+                <a:off x="6807431" y="5751870"/>
+                <a:ext cx="4538995" cy="225178"/>
+              </a:xfrm>
+              <a:prstGeom prst="rect">
+                <a:avLst/>
+              </a:prstGeom>
+              <a:noFill/>
+            </p:spPr>
+            <p:txBody>
+              <a:bodyPr wrap="square" rtlCol="0">
+                <a:spAutoFit/>
+              </a:bodyPr>
+              <a:lstStyle/>
+              <a:p>
+                <a:r>
+                  <a:rPr lang="de-DE" sz="1400" dirty="0">
+                    <a:latin typeface="Open Sans" pitchFamily="2" charset="0"/>
+                    <a:ea typeface="Open Sans" pitchFamily="2" charset="0"/>
+                    <a:cs typeface="Open Sans" pitchFamily="2" charset="0"/>
+                  </a:rPr>
+                  <a:t>Abb. 3: Bearbeitung Geländer</a:t>
+                </a:r>
+              </a:p>
+            </p:txBody>
+          </p:sp>
+          <p:pic>
+            <p:nvPicPr>
+              <p:cNvPr id="9" name="Grafik 8">
+                <a:extLst>
+                  <a:ext uri="{FF2B5EF4-FFF2-40B4-BE49-F238E27FC236}">
+                    <a16:creationId xmlns:a16="http://schemas.microsoft.com/office/drawing/2014/main" id="{E88EC128-D0E5-9FD4-5160-6041BF1A8FC7}"/>
+                  </a:ext>
+                </a:extLst>
+              </p:cNvPr>
+              <p:cNvPicPr>
+                <a:picLocks noChangeAspect="1"/>
+              </p:cNvPicPr>
+              <p:nvPr/>
+            </p:nvPicPr>
+            <p:blipFill rotWithShape="1">
+              <a:blip r:embed="rId3" cstate="print">
+                <a:extLst>
+                  <a:ext uri="{28A0092B-C50C-407E-A947-70E740481C1C}">
+                    <a14:useLocalDpi xmlns:a14="http://schemas.microsoft.com/office/drawing/2010/main" val="0"/>
+                  </a:ext>
+                </a:extLst>
+              </a:blip>
+              <a:srcRect l="32522" t="16800" r="23110" b="13007"/>
+              <a:stretch/>
+            </p:blipFill>
+            <p:spPr>
+              <a:xfrm>
+                <a:off x="6874655" y="4502095"/>
+                <a:ext cx="1286807" cy="1145141"/>
+              </a:xfrm>
+              <a:prstGeom prst="rect">
+                <a:avLst/>
+              </a:prstGeom>
+            </p:spPr>
+          </p:pic>
+        </p:grpSp>
+        <p:pic>
+          <p:nvPicPr>
+            <p:cNvPr id="10" name="Grafik 9">
+              <a:extLst>
+                <a:ext uri="{FF2B5EF4-FFF2-40B4-BE49-F238E27FC236}">
+                  <a16:creationId xmlns:a16="http://schemas.microsoft.com/office/drawing/2014/main" id="{CFEBAE02-1118-E6C8-5400-6A0BB7482EC3}"/>
+                </a:ext>
+              </a:extLst>
+            </p:cNvPr>
+            <p:cNvPicPr>
+              <a:picLocks noChangeAspect="1"/>
+            </p:cNvPicPr>
+            <p:nvPr/>
+          </p:nvPicPr>
+          <p:blipFill rotWithShape="1">
+            <a:blip r:embed="rId4" cstate="print">
+              <a:extLst>
+                <a:ext uri="{28A0092B-C50C-407E-A947-70E740481C1C}">
+                  <a14:useLocalDpi xmlns:a14="http://schemas.microsoft.com/office/drawing/2010/main" val="0"/>
+                </a:ext>
+              </a:extLst>
+            </a:blip>
+            <a:srcRect l="31440" t="19852" r="25490" b="12652"/>
+            <a:stretch/>
+          </p:blipFill>
+          <p:spPr>
+            <a:xfrm>
+              <a:off x="4262334" y="4092607"/>
+              <a:ext cx="1775646" cy="1565200"/>
+            </a:xfrm>
+            <a:prstGeom prst="rect">
+              <a:avLst/>
+            </a:prstGeom>
+          </p:spPr>
+        </p:pic>
+      </p:grpSp>
+      <p:grpSp>
+        <p:nvGrpSpPr>
+          <p:cNvPr id="16" name="Gruppieren 15">
+            <a:extLst>
+              <a:ext uri="{FF2B5EF4-FFF2-40B4-BE49-F238E27FC236}">
+                <a16:creationId xmlns:a16="http://schemas.microsoft.com/office/drawing/2014/main" id="{F53D5F0C-C5E2-7E00-5433-461E9C810861}"/>
+              </a:ext>
+            </a:extLst>
+          </p:cNvPr>
+          <p:cNvGrpSpPr/>
+          <p:nvPr/>
+        </p:nvGrpSpPr>
+        <p:grpSpPr>
+          <a:xfrm>
+            <a:off x="7551791" y="136065"/>
+            <a:ext cx="4538995" cy="4087495"/>
+            <a:chOff x="633966" y="1867211"/>
+            <a:chExt cx="4538995" cy="4087495"/>
+          </a:xfrm>
+        </p:grpSpPr>
+        <p:pic>
+          <p:nvPicPr>
+            <p:cNvPr id="12" name="Inhaltsplatzhalter 9">
+              <a:extLst>
+                <a:ext uri="{FF2B5EF4-FFF2-40B4-BE49-F238E27FC236}">
+                  <a16:creationId xmlns:a16="http://schemas.microsoft.com/office/drawing/2014/main" id="{6D6A5A34-56AE-458A-7141-EC00DE33E796}"/>
+                </a:ext>
+              </a:extLst>
+            </p:cNvPr>
+            <p:cNvPicPr>
+              <a:picLocks noChangeAspect="1"/>
+            </p:cNvPicPr>
+            <p:nvPr/>
+          </p:nvPicPr>
+          <p:blipFill>
+            <a:blip r:embed="rId5"/>
+            <a:stretch>
+              <a:fillRect/>
+            </a:stretch>
+          </p:blipFill>
+          <p:spPr>
+            <a:xfrm>
+              <a:off x="2421197" y="1867211"/>
+              <a:ext cx="1933004" cy="3470275"/>
+            </a:xfrm>
+            <a:prstGeom prst="rect">
+              <a:avLst/>
+            </a:prstGeom>
+          </p:spPr>
+        </p:pic>
+        <p:grpSp>
+          <p:nvGrpSpPr>
+            <p:cNvPr id="13" name="Gruppieren 12">
+              <a:extLst>
+                <a:ext uri="{FF2B5EF4-FFF2-40B4-BE49-F238E27FC236}">
+                  <a16:creationId xmlns:a16="http://schemas.microsoft.com/office/drawing/2014/main" id="{339E0F85-F5A8-0009-F2C3-851C703A854D}"/>
+                </a:ext>
+              </a:extLst>
+            </p:cNvPr>
+            <p:cNvGrpSpPr/>
+            <p:nvPr/>
+          </p:nvGrpSpPr>
+          <p:grpSpPr>
+            <a:xfrm>
+              <a:off x="633966" y="1867542"/>
+              <a:ext cx="4538995" cy="4087164"/>
+              <a:chOff x="527434" y="1159389"/>
+              <a:chExt cx="4538995" cy="4087164"/>
+            </a:xfrm>
+          </p:grpSpPr>
+          <p:pic>
+            <p:nvPicPr>
+              <p:cNvPr id="14" name="Grafik 13">
+                <a:extLst>
+                  <a:ext uri="{FF2B5EF4-FFF2-40B4-BE49-F238E27FC236}">
+                    <a16:creationId xmlns:a16="http://schemas.microsoft.com/office/drawing/2014/main" id="{A1FB4FB6-66B7-1214-66AB-ACE4E474B6B7}"/>
+                  </a:ext>
+                </a:extLst>
+              </p:cNvPr>
+              <p:cNvPicPr>
+                <a:picLocks noChangeAspect="1"/>
+              </p:cNvPicPr>
+              <p:nvPr/>
+            </p:nvPicPr>
+            <p:blipFill>
+              <a:blip r:embed="rId6"/>
+              <a:stretch>
+                <a:fillRect/>
+              </a:stretch>
+            </p:blipFill>
+            <p:spPr>
+              <a:xfrm>
+                <a:off x="527434" y="1159389"/>
+                <a:ext cx="1787231" cy="3469945"/>
+              </a:xfrm>
+              <a:prstGeom prst="rect">
+                <a:avLst/>
+              </a:prstGeom>
+            </p:spPr>
+          </p:pic>
+          <p:sp>
+            <p:nvSpPr>
+              <p:cNvPr id="15" name="Textfeld 14">
+                <a:extLst>
+                  <a:ext uri="{FF2B5EF4-FFF2-40B4-BE49-F238E27FC236}">
+                    <a16:creationId xmlns:a16="http://schemas.microsoft.com/office/drawing/2014/main" id="{845F7329-0BAC-065A-6056-C45F518DF153}"/>
+                  </a:ext>
+                </a:extLst>
+              </p:cNvPr>
+              <p:cNvSpPr txBox="1"/>
+              <p:nvPr/>
+            </p:nvSpPr>
+            <p:spPr>
+              <a:xfrm>
+                <a:off x="527434" y="4723333"/>
+                <a:ext cx="4538995" cy="523220"/>
+              </a:xfrm>
+              <a:prstGeom prst="rect">
+                <a:avLst/>
+              </a:prstGeom>
+              <a:noFill/>
+            </p:spPr>
+            <p:txBody>
+              <a:bodyPr wrap="square" rtlCol="0">
+                <a:spAutoFit/>
+              </a:bodyPr>
+              <a:lstStyle/>
+              <a:p>
+                <a:r>
+                  <a:rPr lang="de-DE" sz="1400" dirty="0">
+                    <a:latin typeface="Open Sans" pitchFamily="2" charset="0"/>
+                    <a:ea typeface="Open Sans" pitchFamily="2" charset="0"/>
+                    <a:cs typeface="Open Sans" pitchFamily="2" charset="0"/>
+                  </a:rPr>
+                  <a:t>Abb. 2: Änderung Feuerleiter (links original, </a:t>
+                </a:r>
+                <a:br>
+                  <a:rPr lang="de-DE" sz="1400" dirty="0">
+                    <a:latin typeface="Open Sans" pitchFamily="2" charset="0"/>
+                    <a:ea typeface="Open Sans" pitchFamily="2" charset="0"/>
+                    <a:cs typeface="Open Sans" pitchFamily="2" charset="0"/>
+                  </a:rPr>
+                </a:br>
+                <a:r>
+                  <a:rPr lang="de-DE" sz="1400" dirty="0">
+                    <a:latin typeface="Open Sans" pitchFamily="2" charset="0"/>
+                    <a:ea typeface="Open Sans" pitchFamily="2" charset="0"/>
+                    <a:cs typeface="Open Sans" pitchFamily="2" charset="0"/>
+                  </a:rPr>
+                  <a:t>rechts bearbeitet)</a:t>
+                </a:r>
+              </a:p>
+            </p:txBody>
+          </p:sp>
+        </p:grpSp>
+      </p:grpSp>
     </p:spTree>
     <p:extLst>
       <p:ext uri="{BB962C8B-B14F-4D97-AF65-F5344CB8AC3E}">
@@ -6636,66 +8763,8 @@
           <a:p>
             <a:r>
               <a:rPr lang="de-DE" dirty="0"/>
-              <a:t>In AutoCAD </a:t>
-            </a:r>
-          </a:p>
-          <a:p>
-            <a:pPr lvl="1"/>
-            <a:r>
-              <a:rPr lang="de-DE" dirty="0"/>
-              <a:t>Löschen von Fensterglas, Fassadenglas, Türen, Inneneinrichtung [Ebenen]</a:t>
-            </a:r>
-          </a:p>
-          <a:p>
-            <a:pPr lvl="1"/>
-            <a:r>
-              <a:rPr lang="de-DE" dirty="0"/>
-              <a:t>Umwandeln aller Blockreferenzen [FILTER] in Vielflächennetze [URSPRUNG]</a:t>
-            </a:r>
-          </a:p>
-          <a:p>
-            <a:pPr lvl="1"/>
-            <a:r>
-              <a:rPr lang="de-DE" dirty="0"/>
-              <a:t>Export der Vielflächennetze als .</a:t>
-            </a:r>
-            <a:r>
-              <a:rPr lang="de-DE" dirty="0" err="1"/>
-              <a:t>dxf</a:t>
-            </a:r>
-            <a:r>
-              <a:rPr lang="de-DE" dirty="0"/>
-              <a:t> </a:t>
-            </a:r>
-            <a:r>
-              <a:rPr lang="de-DE" dirty="0" err="1">
-                <a:solidFill>
-                  <a:srgbClr val="FF0000"/>
-                </a:solidFill>
-              </a:rPr>
-              <a:t>dxf</a:t>
-            </a:r>
-            <a:r>
-              <a:rPr lang="de-DE" dirty="0">
-                <a:solidFill>
-                  <a:srgbClr val="FF0000"/>
-                </a:solidFill>
-              </a:rPr>
-              <a:t>? Nicht </a:t>
-            </a:r>
-            <a:r>
-              <a:rPr lang="de-DE" dirty="0" err="1">
-                <a:solidFill>
-                  <a:srgbClr val="FF0000"/>
-                </a:solidFill>
-              </a:rPr>
-              <a:t>dwg</a:t>
-            </a:r>
-            <a:endParaRPr lang="de-DE" dirty="0"/>
-          </a:p>
-          <a:p>
-            <a:pPr lvl="1"/>
-            <a:endParaRPr lang="en-US" dirty="0"/>
+              <a:t>Erster Export nach Magics stark fehlerbehaftet</a:t>
+            </a:r>
           </a:p>
         </p:txBody>
       </p:sp>
@@ -6721,102 +8790,8 @@
           <a:lstStyle/>
           <a:p>
             <a:r>
-              <a:rPr lang="de-DE" dirty="0">
-                <a:solidFill>
-                  <a:srgbClr val="FF0000"/>
-                </a:solidFill>
-              </a:rPr>
+              <a:rPr lang="de-DE" dirty="0"/>
               <a:t>3.2 Bearbeitung in AutoCAD</a:t>
-            </a:r>
-          </a:p>
-        </p:txBody>
-      </p:sp>
-    </p:spTree>
-    <p:extLst>
-      <p:ext uri="{BB962C8B-B14F-4D97-AF65-F5344CB8AC3E}">
-        <p14:creationId xmlns:p14="http://schemas.microsoft.com/office/powerpoint/2010/main" val="366981012"/>
-      </p:ext>
-    </p:extLst>
-  </p:cSld>
-  <p:clrMapOvr>
-    <a:masterClrMapping/>
-  </p:clrMapOvr>
-</p:sld>
-</file>
-
-<file path=ppt/slides/slide8.xml><?xml version="1.0" encoding="utf-8"?>
-<p:sld xmlns:a="http://schemas.openxmlformats.org/drawingml/2006/main" xmlns:r="http://schemas.openxmlformats.org/officeDocument/2006/relationships" xmlns:p="http://schemas.openxmlformats.org/presentationml/2006/main">
-  <p:cSld>
-    <p:spTree>
-      <p:nvGrpSpPr>
-        <p:cNvPr id="1" name=""/>
-        <p:cNvGrpSpPr/>
-        <p:nvPr/>
-      </p:nvGrpSpPr>
-      <p:grpSpPr>
-        <a:xfrm>
-          <a:off x="0" y="0"/>
-          <a:ext cx="0" cy="0"/>
-          <a:chOff x="0" y="0"/>
-          <a:chExt cx="0" cy="0"/>
-        </a:xfrm>
-      </p:grpSpPr>
-      <p:sp>
-        <p:nvSpPr>
-          <p:cNvPr id="2" name="Inhaltsplatzhalter 1">
-            <a:extLst>
-              <a:ext uri="{FF2B5EF4-FFF2-40B4-BE49-F238E27FC236}">
-                <a16:creationId xmlns:a16="http://schemas.microsoft.com/office/drawing/2014/main" id="{BF955AA3-35CB-6310-7E4F-95209193670B}"/>
-              </a:ext>
-            </a:extLst>
-          </p:cNvPr>
-          <p:cNvSpPr>
-            <a:spLocks noGrp="1"/>
-          </p:cNvSpPr>
-          <p:nvPr>
-            <p:ph idx="1"/>
-          </p:nvPr>
-        </p:nvSpPr>
-        <p:spPr/>
-        <p:txBody>
-          <a:bodyPr/>
-          <a:lstStyle/>
-          <a:p>
-            <a:r>
-              <a:rPr lang="de-DE" dirty="0"/>
-              <a:t>Erster Export nach Magics stark fehlerbehaftet</a:t>
-            </a:r>
-          </a:p>
-        </p:txBody>
-      </p:sp>
-      <p:sp>
-        <p:nvSpPr>
-          <p:cNvPr id="3" name="Titel 2">
-            <a:extLst>
-              <a:ext uri="{FF2B5EF4-FFF2-40B4-BE49-F238E27FC236}">
-                <a16:creationId xmlns:a16="http://schemas.microsoft.com/office/drawing/2014/main" id="{304C2AF1-1370-3FDB-974B-B116FCA74B54}"/>
-              </a:ext>
-            </a:extLst>
-          </p:cNvPr>
-          <p:cNvSpPr>
-            <a:spLocks noGrp="1"/>
-          </p:cNvSpPr>
-          <p:nvPr>
-            <p:ph type="title"/>
-          </p:nvPr>
-        </p:nvSpPr>
-        <p:spPr/>
-        <p:txBody>
-          <a:bodyPr/>
-          <a:lstStyle/>
-          <a:p>
-            <a:r>
-              <a:rPr lang="de-DE" dirty="0">
-                <a:solidFill>
-                  <a:srgbClr val="FF0000"/>
-                </a:solidFill>
-              </a:rPr>
-              <a:t>3.3 Bearbeitung in Magics</a:t>
             </a:r>
           </a:p>
         </p:txBody>
@@ -6835,7 +8810,7 @@
         </p:nvGrpSpPr>
         <p:grpSpPr>
           <a:xfrm>
-            <a:off x="2491519" y="2485259"/>
+            <a:off x="527434" y="2431993"/>
             <a:ext cx="7208961" cy="3187931"/>
             <a:chOff x="2296357" y="2467504"/>
             <a:chExt cx="7208961" cy="3187931"/>
@@ -6895,26 +8870,7 @@
                     <a:ea typeface="Open Sans" pitchFamily="2" charset="0"/>
                     <a:cs typeface="Open Sans" pitchFamily="2" charset="0"/>
                   </a:rPr>
-                  <a:t>Abb. </a:t>
-                </a:r>
-                <a:r>
-                  <a:rPr lang="de-DE" sz="1400" dirty="0">
-                    <a:solidFill>
-                      <a:srgbClr val="FF0000"/>
-                    </a:solidFill>
-                    <a:latin typeface="Open Sans" pitchFamily="2" charset="0"/>
-                    <a:ea typeface="Open Sans" pitchFamily="2" charset="0"/>
-                    <a:cs typeface="Open Sans" pitchFamily="2" charset="0"/>
-                  </a:rPr>
-                  <a:t>XX</a:t>
-                </a:r>
-                <a:r>
-                  <a:rPr lang="de-DE" sz="1400" dirty="0">
-                    <a:latin typeface="Open Sans" pitchFamily="2" charset="0"/>
-                    <a:ea typeface="Open Sans" pitchFamily="2" charset="0"/>
-                    <a:cs typeface="Open Sans" pitchFamily="2" charset="0"/>
-                  </a:rPr>
-                  <a:t>: Stützen in Revit – AutoCAD – Magics </a:t>
+                  <a:t>Abb. 4: Stützen in Revit – AutoCAD – Magics </a:t>
                 </a:r>
               </a:p>
             </p:txBody>
@@ -7041,6 +8997,255 @@
 </p:sld>
 </file>
 
+<file path=ppt/slides/slide8.xml><?xml version="1.0" encoding="utf-8"?>
+<p:sld xmlns:a="http://schemas.openxmlformats.org/drawingml/2006/main" xmlns:r="http://schemas.openxmlformats.org/officeDocument/2006/relationships" xmlns:p="http://schemas.openxmlformats.org/presentationml/2006/main">
+  <p:cSld>
+    <p:spTree>
+      <p:nvGrpSpPr>
+        <p:cNvPr id="1" name=""/>
+        <p:cNvGrpSpPr/>
+        <p:nvPr/>
+      </p:nvGrpSpPr>
+      <p:grpSpPr>
+        <a:xfrm>
+          <a:off x="0" y="0"/>
+          <a:ext cx="0" cy="0"/>
+          <a:chOff x="0" y="0"/>
+          <a:chExt cx="0" cy="0"/>
+        </a:xfrm>
+      </p:grpSpPr>
+      <p:sp>
+        <p:nvSpPr>
+          <p:cNvPr id="2" name="Inhaltsplatzhalter 1">
+            <a:extLst>
+              <a:ext uri="{FF2B5EF4-FFF2-40B4-BE49-F238E27FC236}">
+                <a16:creationId xmlns:a16="http://schemas.microsoft.com/office/drawing/2014/main" id="{BF955AA3-35CB-6310-7E4F-95209193670B}"/>
+              </a:ext>
+            </a:extLst>
+          </p:cNvPr>
+          <p:cNvSpPr>
+            <a:spLocks noGrp="1"/>
+          </p:cNvSpPr>
+          <p:nvPr>
+            <p:ph idx="1"/>
+          </p:nvPr>
+        </p:nvSpPr>
+        <p:spPr>
+          <a:xfrm>
+            <a:off x="527434" y="1476584"/>
+            <a:ext cx="10515600" cy="3469944"/>
+          </a:xfrm>
+        </p:spPr>
+        <p:txBody>
+          <a:bodyPr/>
+          <a:lstStyle/>
+          <a:p>
+            <a:r>
+              <a:rPr lang="de-DE" dirty="0"/>
+              <a:t>Löschen von Fensterglas, Fassadenglas, Türen, Inneneinrichtung [Ebenen]</a:t>
+            </a:r>
+          </a:p>
+          <a:p>
+            <a:r>
+              <a:rPr lang="de-DE" dirty="0"/>
+              <a:t>Umwandeln aller Blockreferenzen [FILTER] in Vielflächennetze [URSPRUNG]</a:t>
+            </a:r>
+          </a:p>
+          <a:p>
+            <a:r>
+              <a:rPr lang="de-DE" dirty="0"/>
+              <a:t>Export der Vielflächennetze als .</a:t>
+            </a:r>
+            <a:r>
+              <a:rPr lang="de-DE" dirty="0" err="1"/>
+              <a:t>dxf</a:t>
+            </a:r>
+            <a:endParaRPr lang="en-US" dirty="0"/>
+          </a:p>
+        </p:txBody>
+      </p:sp>
+      <p:sp>
+        <p:nvSpPr>
+          <p:cNvPr id="3" name="Titel 2">
+            <a:extLst>
+              <a:ext uri="{FF2B5EF4-FFF2-40B4-BE49-F238E27FC236}">
+                <a16:creationId xmlns:a16="http://schemas.microsoft.com/office/drawing/2014/main" id="{304C2AF1-1370-3FDB-974B-B116FCA74B54}"/>
+              </a:ext>
+            </a:extLst>
+          </p:cNvPr>
+          <p:cNvSpPr>
+            <a:spLocks noGrp="1"/>
+          </p:cNvSpPr>
+          <p:nvPr>
+            <p:ph type="title"/>
+          </p:nvPr>
+        </p:nvSpPr>
+        <p:spPr/>
+        <p:txBody>
+          <a:bodyPr/>
+          <a:lstStyle/>
+          <a:p>
+            <a:r>
+              <a:rPr lang="de-DE" dirty="0"/>
+              <a:t>3.2 Bearbeitung in AutoCAD</a:t>
+            </a:r>
+          </a:p>
+        </p:txBody>
+      </p:sp>
+      <p:grpSp>
+        <p:nvGrpSpPr>
+          <p:cNvPr id="4" name="Gruppieren 3">
+            <a:extLst>
+              <a:ext uri="{FF2B5EF4-FFF2-40B4-BE49-F238E27FC236}">
+                <a16:creationId xmlns:a16="http://schemas.microsoft.com/office/drawing/2014/main" id="{D8581F39-D785-DB2C-D06F-353CA952373C}"/>
+              </a:ext>
+            </a:extLst>
+          </p:cNvPr>
+          <p:cNvGrpSpPr/>
+          <p:nvPr/>
+        </p:nvGrpSpPr>
+        <p:grpSpPr>
+          <a:xfrm>
+            <a:off x="527434" y="2805426"/>
+            <a:ext cx="5043935" cy="3430336"/>
+            <a:chOff x="6096000" y="1159388"/>
+            <a:chExt cx="5682340" cy="3864510"/>
+          </a:xfrm>
+        </p:grpSpPr>
+        <p:pic>
+          <p:nvPicPr>
+            <p:cNvPr id="5" name="Grafik 4">
+              <a:extLst>
+                <a:ext uri="{FF2B5EF4-FFF2-40B4-BE49-F238E27FC236}">
+                  <a16:creationId xmlns:a16="http://schemas.microsoft.com/office/drawing/2014/main" id="{95C18F0E-208B-87AF-7171-71EF4D9730AE}"/>
+                </a:ext>
+              </a:extLst>
+            </p:cNvPr>
+            <p:cNvPicPr>
+              <a:picLocks noChangeAspect="1"/>
+            </p:cNvPicPr>
+            <p:nvPr/>
+          </p:nvPicPr>
+          <p:blipFill>
+            <a:blip r:embed="rId2"/>
+            <a:stretch>
+              <a:fillRect/>
+            </a:stretch>
+          </p:blipFill>
+          <p:spPr>
+            <a:xfrm>
+              <a:off x="8861491" y="1159389"/>
+              <a:ext cx="2916849" cy="3469944"/>
+            </a:xfrm>
+            <a:prstGeom prst="rect">
+              <a:avLst/>
+            </a:prstGeom>
+          </p:spPr>
+        </p:pic>
+        <p:grpSp>
+          <p:nvGrpSpPr>
+            <p:cNvPr id="6" name="Gruppieren 5">
+              <a:extLst>
+                <a:ext uri="{FF2B5EF4-FFF2-40B4-BE49-F238E27FC236}">
+                  <a16:creationId xmlns:a16="http://schemas.microsoft.com/office/drawing/2014/main" id="{5286B410-106B-3F1F-099D-DD6109351350}"/>
+                </a:ext>
+              </a:extLst>
+            </p:cNvPr>
+            <p:cNvGrpSpPr/>
+            <p:nvPr/>
+          </p:nvGrpSpPr>
+          <p:grpSpPr>
+            <a:xfrm>
+              <a:off x="6096000" y="1159388"/>
+              <a:ext cx="5682340" cy="3864510"/>
+              <a:chOff x="6096000" y="1159388"/>
+              <a:chExt cx="5682340" cy="3864510"/>
+            </a:xfrm>
+          </p:grpSpPr>
+          <p:pic>
+            <p:nvPicPr>
+              <p:cNvPr id="7" name="Grafik 6">
+                <a:extLst>
+                  <a:ext uri="{FF2B5EF4-FFF2-40B4-BE49-F238E27FC236}">
+                    <a16:creationId xmlns:a16="http://schemas.microsoft.com/office/drawing/2014/main" id="{A327F3CE-E170-E4A3-7C25-CC6626609C66}"/>
+                  </a:ext>
+                </a:extLst>
+              </p:cNvPr>
+              <p:cNvPicPr>
+                <a:picLocks noChangeAspect="1"/>
+              </p:cNvPicPr>
+              <p:nvPr/>
+            </p:nvPicPr>
+            <p:blipFill>
+              <a:blip r:embed="rId3"/>
+              <a:stretch>
+                <a:fillRect/>
+              </a:stretch>
+            </p:blipFill>
+            <p:spPr>
+              <a:xfrm>
+                <a:off x="6096000" y="1159388"/>
+                <a:ext cx="2759790" cy="3469945"/>
+              </a:xfrm>
+              <a:prstGeom prst="rect">
+                <a:avLst/>
+              </a:prstGeom>
+            </p:spPr>
+          </p:pic>
+          <p:sp>
+            <p:nvSpPr>
+              <p:cNvPr id="8" name="Textfeld 7">
+                <a:extLst>
+                  <a:ext uri="{FF2B5EF4-FFF2-40B4-BE49-F238E27FC236}">
+                    <a16:creationId xmlns:a16="http://schemas.microsoft.com/office/drawing/2014/main" id="{81373F90-6F67-F877-D220-9BB89C1D4CE6}"/>
+                  </a:ext>
+                </a:extLst>
+              </p:cNvPr>
+              <p:cNvSpPr txBox="1"/>
+              <p:nvPr/>
+            </p:nvSpPr>
+            <p:spPr>
+              <a:xfrm>
+                <a:off x="6096000" y="4677166"/>
+                <a:ext cx="5682340" cy="346732"/>
+              </a:xfrm>
+              <a:prstGeom prst="rect">
+                <a:avLst/>
+              </a:prstGeom>
+              <a:noFill/>
+            </p:spPr>
+            <p:txBody>
+              <a:bodyPr wrap="square" rtlCol="0">
+                <a:spAutoFit/>
+              </a:bodyPr>
+              <a:lstStyle/>
+              <a:p>
+                <a:r>
+                  <a:rPr lang="de-DE" sz="1400" dirty="0">
+                    <a:latin typeface="Open Sans" pitchFamily="2" charset="0"/>
+                    <a:ea typeface="Open Sans" pitchFamily="2" charset="0"/>
+                    <a:cs typeface="Open Sans" pitchFamily="2" charset="0"/>
+                  </a:rPr>
+                  <a:t>Abb. 5: Darstellung Fenster (links Revit, rechts AutoCAD)</a:t>
+                </a:r>
+              </a:p>
+            </p:txBody>
+          </p:sp>
+        </p:grpSp>
+      </p:grpSp>
+    </p:spTree>
+    <p:extLst>
+      <p:ext uri="{BB962C8B-B14F-4D97-AF65-F5344CB8AC3E}">
+        <p14:creationId xmlns:p14="http://schemas.microsoft.com/office/powerpoint/2010/main" val="366981012"/>
+      </p:ext>
+    </p:extLst>
+  </p:cSld>
+  <p:clrMapOvr>
+    <a:masterClrMapping/>
+  </p:clrMapOvr>
+</p:sld>
+</file>
+
 <file path=ppt/slides/slide9.xml><?xml version="1.0" encoding="utf-8"?>
 <p:sld xmlns:a="http://schemas.openxmlformats.org/drawingml/2006/main" xmlns:r="http://schemas.openxmlformats.org/officeDocument/2006/relationships" xmlns:p="http://schemas.openxmlformats.org/presentationml/2006/main">
   <p:cSld>
@@ -7081,66 +9286,13 @@
           <a:p>
             <a:r>
               <a:rPr lang="de-DE" dirty="0"/>
-              <a:t>In Magics </a:t>
-            </a:r>
-          </a:p>
-          <a:p>
-            <a:pPr lvl="1"/>
-            <a:r>
-              <a:rPr lang="de-DE" dirty="0"/>
-              <a:t>Skalieren [Skalieren]</a:t>
-            </a:r>
-          </a:p>
-          <a:p>
-            <a:pPr lvl="1"/>
-            <a:r>
-              <a:rPr lang="de-DE" dirty="0"/>
-              <a:t>Schnitte [Vielfachschnitte] [Schneiden]</a:t>
-            </a:r>
-          </a:p>
-          <a:p>
-            <a:pPr lvl="1"/>
-            <a:r>
-              <a:rPr lang="de-DE" dirty="0"/>
-              <a:t>Löcher füllen [Lochfüllmodus]</a:t>
-            </a:r>
-          </a:p>
-          <a:p>
-            <a:pPr lvl="1"/>
-            <a:r>
-              <a:rPr lang="de-DE" dirty="0">
-                <a:solidFill>
-                  <a:srgbClr val="FF0000"/>
-                </a:solidFill>
-              </a:rPr>
-              <a:t>Extrusion und Offset</a:t>
-            </a:r>
-          </a:p>
-          <a:p>
-            <a:pPr lvl="1"/>
-            <a:r>
-              <a:rPr lang="de-DE" dirty="0">
-                <a:solidFill>
-                  <a:srgbClr val="FF0000"/>
-                </a:solidFill>
-              </a:rPr>
-              <a:t>Dreiecke optimieren [Dreiecke trimmen] [Netzverfeinerung]</a:t>
-            </a:r>
-          </a:p>
-          <a:p>
-            <a:pPr lvl="1"/>
-            <a:r>
-              <a:rPr lang="de-DE" dirty="0"/>
-              <a:t>Reparaturstatus verändern bis nur noch eine Shell und keine Probleme übrig sind [Schrumpffolie] [verschiedene Auto-</a:t>
+              <a:t>Export der Vielflächennetze als .</a:t>
             </a:r>
             <a:r>
               <a:rPr lang="de-DE" dirty="0" err="1"/>
-              <a:t>Repair</a:t>
-            </a:r>
-            <a:r>
-              <a:rPr lang="de-DE" dirty="0"/>
-              <a:t>-Tools]</a:t>
-            </a:r>
+              <a:t>dxf</a:t>
+            </a:r>
+            <a:endParaRPr lang="en-US" dirty="0"/>
           </a:p>
         </p:txBody>
       </p:sp>
@@ -7166,20 +9318,203 @@
           <a:lstStyle/>
           <a:p>
             <a:r>
-              <a:rPr lang="de-DE" dirty="0">
-                <a:solidFill>
-                  <a:srgbClr val="FF0000"/>
-                </a:solidFill>
-              </a:rPr>
-              <a:t>3.3 Bearbeitung in Magics</a:t>
+              <a:rPr lang="de-DE" dirty="0"/>
+              <a:t>3.2 Bearbeitung in AutoCAD</a:t>
             </a:r>
           </a:p>
         </p:txBody>
       </p:sp>
+      <p:grpSp>
+        <p:nvGrpSpPr>
+          <p:cNvPr id="4" name="Gruppieren 3">
+            <a:extLst>
+              <a:ext uri="{FF2B5EF4-FFF2-40B4-BE49-F238E27FC236}">
+                <a16:creationId xmlns:a16="http://schemas.microsoft.com/office/drawing/2014/main" id="{9558B25F-B47F-E91B-0663-CFBA9415FAB7}"/>
+              </a:ext>
+            </a:extLst>
+          </p:cNvPr>
+          <p:cNvGrpSpPr/>
+          <p:nvPr/>
+        </p:nvGrpSpPr>
+        <p:grpSpPr>
+          <a:xfrm>
+            <a:off x="527434" y="2431993"/>
+            <a:ext cx="7400821" cy="3187931"/>
+            <a:chOff x="527434" y="2431993"/>
+            <a:chExt cx="7400821" cy="3187931"/>
+          </a:xfrm>
+        </p:grpSpPr>
+        <p:grpSp>
+          <p:nvGrpSpPr>
+            <p:cNvPr id="5" name="Gruppieren 4">
+              <a:extLst>
+                <a:ext uri="{FF2B5EF4-FFF2-40B4-BE49-F238E27FC236}">
+                  <a16:creationId xmlns:a16="http://schemas.microsoft.com/office/drawing/2014/main" id="{D7F18251-0CD6-8FF2-919A-2DFCA5514EAC}"/>
+                </a:ext>
+              </a:extLst>
+            </p:cNvPr>
+            <p:cNvGrpSpPr/>
+            <p:nvPr/>
+          </p:nvGrpSpPr>
+          <p:grpSpPr>
+            <a:xfrm>
+              <a:off x="527434" y="2431995"/>
+              <a:ext cx="6203980" cy="3187929"/>
+              <a:chOff x="6807431" y="3644675"/>
+              <a:chExt cx="4538995" cy="2332373"/>
+            </a:xfrm>
+          </p:grpSpPr>
+          <p:sp>
+            <p:nvSpPr>
+              <p:cNvPr id="7" name="Textfeld 6">
+                <a:extLst>
+                  <a:ext uri="{FF2B5EF4-FFF2-40B4-BE49-F238E27FC236}">
+                    <a16:creationId xmlns:a16="http://schemas.microsoft.com/office/drawing/2014/main" id="{E639D9C9-E1EF-2688-72E0-4B9FA7C30624}"/>
+                  </a:ext>
+                </a:extLst>
+              </p:cNvPr>
+              <p:cNvSpPr txBox="1"/>
+              <p:nvPr/>
+            </p:nvSpPr>
+            <p:spPr>
+              <a:xfrm>
+                <a:off x="6807431" y="5751870"/>
+                <a:ext cx="4538995" cy="225178"/>
+              </a:xfrm>
+              <a:prstGeom prst="rect">
+                <a:avLst/>
+              </a:prstGeom>
+              <a:noFill/>
+            </p:spPr>
+            <p:txBody>
+              <a:bodyPr wrap="square" rtlCol="0">
+                <a:spAutoFit/>
+              </a:bodyPr>
+              <a:lstStyle/>
+              <a:p>
+                <a:r>
+                  <a:rPr lang="de-DE" sz="1400" dirty="0">
+                    <a:latin typeface="Open Sans" pitchFamily="2" charset="0"/>
+                    <a:ea typeface="Open Sans" pitchFamily="2" charset="0"/>
+                    <a:cs typeface="Open Sans" pitchFamily="2" charset="0"/>
+                  </a:rPr>
+                  <a:t>Abb. 6: Stützen in Revit – AutoCAD – Magics </a:t>
+                </a:r>
+              </a:p>
+            </p:txBody>
+          </p:sp>
+          <p:pic>
+            <p:nvPicPr>
+              <p:cNvPr id="8" name="Grafik 7">
+                <a:extLst>
+                  <a:ext uri="{FF2B5EF4-FFF2-40B4-BE49-F238E27FC236}">
+                    <a16:creationId xmlns:a16="http://schemas.microsoft.com/office/drawing/2014/main" id="{F2F65079-FFB8-B4C9-3D2A-DF150AEC64CB}"/>
+                  </a:ext>
+                </a:extLst>
+              </p:cNvPr>
+              <p:cNvPicPr>
+                <a:picLocks noChangeAspect="1"/>
+              </p:cNvPicPr>
+              <p:nvPr/>
+            </p:nvPicPr>
+            <p:blipFill>
+              <a:blip r:embed="rId2">
+                <a:extLst>
+                  <a:ext uri="{28A0092B-C50C-407E-A947-70E740481C1C}">
+                    <a14:useLocalDpi xmlns:a14="http://schemas.microsoft.com/office/drawing/2010/main" val="0"/>
+                  </a:ext>
+                </a:extLst>
+              </a:blip>
+              <a:srcRect/>
+              <a:stretch/>
+            </p:blipFill>
+            <p:spPr>
+              <a:xfrm>
+                <a:off x="6868852" y="3644675"/>
+                <a:ext cx="1595654" cy="2064015"/>
+              </a:xfrm>
+              <a:prstGeom prst="rect">
+                <a:avLst/>
+              </a:prstGeom>
+            </p:spPr>
+          </p:pic>
+        </p:grpSp>
+        <p:pic>
+          <p:nvPicPr>
+            <p:cNvPr id="10" name="Grafik 9">
+              <a:extLst>
+                <a:ext uri="{FF2B5EF4-FFF2-40B4-BE49-F238E27FC236}">
+                  <a16:creationId xmlns:a16="http://schemas.microsoft.com/office/drawing/2014/main" id="{2FE2ECFF-2427-865A-4A1C-CBCB49B75548}"/>
+                </a:ext>
+              </a:extLst>
+            </p:cNvPr>
+            <p:cNvPicPr>
+              <a:picLocks noChangeAspect="1"/>
+            </p:cNvPicPr>
+            <p:nvPr/>
+          </p:nvPicPr>
+          <p:blipFill>
+            <a:blip r:embed="rId3">
+              <a:extLst>
+                <a:ext uri="{28A0092B-C50C-407E-A947-70E740481C1C}">
+                  <a14:useLocalDpi xmlns:a14="http://schemas.microsoft.com/office/drawing/2010/main" val="0"/>
+                </a:ext>
+              </a:extLst>
+            </a:blip>
+            <a:stretch>
+              <a:fillRect/>
+            </a:stretch>
+          </p:blipFill>
+          <p:spPr>
+            <a:xfrm>
+              <a:off x="2792354" y="2431994"/>
+              <a:ext cx="2250807" cy="2850425"/>
+            </a:xfrm>
+            <a:prstGeom prst="rect">
+              <a:avLst/>
+            </a:prstGeom>
+          </p:spPr>
+        </p:pic>
+        <p:pic>
+          <p:nvPicPr>
+            <p:cNvPr id="12" name="Grafik 11">
+              <a:extLst>
+                <a:ext uri="{FF2B5EF4-FFF2-40B4-BE49-F238E27FC236}">
+                  <a16:creationId xmlns:a16="http://schemas.microsoft.com/office/drawing/2014/main" id="{78AF9891-8541-6220-BF14-8B6D1DA88BFF}"/>
+                </a:ext>
+              </a:extLst>
+            </p:cNvPr>
+            <p:cNvPicPr>
+              <a:picLocks noChangeAspect="1"/>
+            </p:cNvPicPr>
+            <p:nvPr/>
+          </p:nvPicPr>
+          <p:blipFill>
+            <a:blip r:embed="rId4" cstate="print">
+              <a:extLst>
+                <a:ext uri="{28A0092B-C50C-407E-A947-70E740481C1C}">
+                  <a14:useLocalDpi xmlns:a14="http://schemas.microsoft.com/office/drawing/2010/main" val="0"/>
+                </a:ext>
+              </a:extLst>
+            </a:blip>
+            <a:srcRect/>
+            <a:stretch/>
+          </p:blipFill>
+          <p:spPr>
+            <a:xfrm>
+              <a:off x="5043161" y="2431993"/>
+              <a:ext cx="2885094" cy="2850427"/>
+            </a:xfrm>
+            <a:prstGeom prst="rect">
+              <a:avLst/>
+            </a:prstGeom>
+          </p:spPr>
+        </p:pic>
+      </p:grpSp>
     </p:spTree>
     <p:extLst>
       <p:ext uri="{BB962C8B-B14F-4D97-AF65-F5344CB8AC3E}">
-        <p14:creationId xmlns:p14="http://schemas.microsoft.com/office/powerpoint/2010/main" val="3435762078"/>
+        <p14:creationId xmlns:p14="http://schemas.microsoft.com/office/powerpoint/2010/main" val="1313569502"/>
       </p:ext>
     </p:extLst>
   </p:cSld>

</xml_diff>